<commit_message>
updated B1 modify/delete term
</commit_message>
<xml_diff>
--- a/b1.pptx
+++ b/b1.pptx
@@ -6,6 +6,13 @@
   </p:sldMasterIdLst>
   <p:sldIdLst>
     <p:sldId id="256" r:id="rId2"/>
+    <p:sldId id="263" r:id="rId3"/>
+    <p:sldId id="257" r:id="rId4"/>
+    <p:sldId id="258" r:id="rId5"/>
+    <p:sldId id="259" r:id="rId6"/>
+    <p:sldId id="260" r:id="rId7"/>
+    <p:sldId id="261" r:id="rId8"/>
+    <p:sldId id="262" r:id="rId9"/>
   </p:sldIdLst>
   <p:sldSz cx="12192000" cy="6858000"/>
   <p:notesSz cx="6858000" cy="9144000"/>
@@ -104,7 +111,754 @@
       </a:defRPr>
     </a:lvl9pPr>
   </p:defaultTextStyle>
+  <p:extLst>
+    <p:ext uri="{EFAFB233-063F-42B5-8137-9DF3F51BA10A}">
+      <p15:sldGuideLst xmlns:p15="http://schemas.microsoft.com/office/powerpoint/2012/main"/>
+    </p:ext>
+  </p:extLst>
 </p:presentation>
+</file>
+
+<file path=ppt/revisionInfo.xml><?xml version="1.0" encoding="utf-8"?>
+<p1510:revInfo xmlns:a="http://schemas.openxmlformats.org/drawingml/2006/main" xmlns:r="http://schemas.openxmlformats.org/officeDocument/2006/relationships" xmlns:p1510="http://schemas.microsoft.com/office/powerpoint/2015/10/main">
+  <p1510:revLst>
+    <p1510:client id="{C5F0709F-BDA2-4D97-972B-42FAEC705165}" v="51" dt="2026-02-01T03:21:02.126"/>
+  </p1510:revLst>
+</p1510:revInfo>
+</file>
+
+<file path=ppt/changesInfos/changesInfo1.xml><?xml version="1.0" encoding="utf-8"?>
+<pc:chgInfo xmlns:a="http://schemas.openxmlformats.org/drawingml/2006/main" xmlns:r="http://schemas.openxmlformats.org/officeDocument/2006/relationships" xmlns:ac="http://schemas.microsoft.com/office/drawing/2013/main/command" xmlns:pc="http://schemas.microsoft.com/office/powerpoint/2013/main/command">
+  <pc:docChgLst>
+    <pc:chgData name="Ravi Potes Mangra" userId="f6c3e66e-970a-4dac-abef-28c459f30976" providerId="ADAL" clId="{B2C1E8EB-EB94-44CA-9F50-E86E778B07B8}"/>
+    <pc:docChg chg="undo custSel addSld modSld">
+      <pc:chgData name="Ravi Potes Mangra" userId="f6c3e66e-970a-4dac-abef-28c459f30976" providerId="ADAL" clId="{B2C1E8EB-EB94-44CA-9F50-E86E778B07B8}" dt="2026-02-01T03:21:10.097" v="850" actId="20577"/>
+      <pc:docMkLst>
+        <pc:docMk/>
+      </pc:docMkLst>
+      <pc:sldChg chg="addSp modSp mod">
+        <pc:chgData name="Ravi Potes Mangra" userId="f6c3e66e-970a-4dac-abef-28c459f30976" providerId="ADAL" clId="{B2C1E8EB-EB94-44CA-9F50-E86E778B07B8}" dt="2026-02-01T03:19:27.160" v="829" actId="1076"/>
+        <pc:sldMkLst>
+          <pc:docMk/>
+          <pc:sldMk cId="1383786992" sldId="256"/>
+        </pc:sldMkLst>
+        <pc:spChg chg="add mod">
+          <ac:chgData name="Ravi Potes Mangra" userId="f6c3e66e-970a-4dac-abef-28c459f30976" providerId="ADAL" clId="{B2C1E8EB-EB94-44CA-9F50-E86E778B07B8}" dt="2026-02-01T03:19:18.775" v="827" actId="1076"/>
+          <ac:spMkLst>
+            <pc:docMk/>
+            <pc:sldMk cId="1383786992" sldId="256"/>
+            <ac:spMk id="2" creationId="{3AB22F64-D73E-39DB-1D97-F710AF4F5BD2}"/>
+          </ac:spMkLst>
+        </pc:spChg>
+        <pc:spChg chg="mod">
+          <ac:chgData name="Ravi Potes Mangra" userId="f6c3e66e-970a-4dac-abef-28c459f30976" providerId="ADAL" clId="{B2C1E8EB-EB94-44CA-9F50-E86E778B07B8}" dt="2026-02-01T03:19:27.160" v="829" actId="1076"/>
+          <ac:spMkLst>
+            <pc:docMk/>
+            <pc:sldMk cId="1383786992" sldId="256"/>
+            <ac:spMk id="4" creationId="{7855B847-C6B6-1C38-052E-AB554261149F}"/>
+          </ac:spMkLst>
+        </pc:spChg>
+        <pc:spChg chg="mod">
+          <ac:chgData name="Ravi Potes Mangra" userId="f6c3e66e-970a-4dac-abef-28c459f30976" providerId="ADAL" clId="{B2C1E8EB-EB94-44CA-9F50-E86E778B07B8}" dt="2026-02-01T03:18:21.673" v="816" actId="1076"/>
+          <ac:spMkLst>
+            <pc:docMk/>
+            <pc:sldMk cId="1383786992" sldId="256"/>
+            <ac:spMk id="5" creationId="{DC022FEA-611A-FC85-50FA-F3B2208E0CC9}"/>
+          </ac:spMkLst>
+        </pc:spChg>
+        <pc:spChg chg="mod">
+          <ac:chgData name="Ravi Potes Mangra" userId="f6c3e66e-970a-4dac-abef-28c459f30976" providerId="ADAL" clId="{B2C1E8EB-EB94-44CA-9F50-E86E778B07B8}" dt="2026-02-01T03:18:21.673" v="816" actId="1076"/>
+          <ac:spMkLst>
+            <pc:docMk/>
+            <pc:sldMk cId="1383786992" sldId="256"/>
+            <ac:spMk id="6" creationId="{A938B1ED-F143-EBED-380A-82363B7F70F5}"/>
+          </ac:spMkLst>
+        </pc:spChg>
+        <pc:spChg chg="mod">
+          <ac:chgData name="Ravi Potes Mangra" userId="f6c3e66e-970a-4dac-abef-28c459f30976" providerId="ADAL" clId="{B2C1E8EB-EB94-44CA-9F50-E86E778B07B8}" dt="2026-02-01T03:18:21.673" v="816" actId="1076"/>
+          <ac:spMkLst>
+            <pc:docMk/>
+            <pc:sldMk cId="1383786992" sldId="256"/>
+            <ac:spMk id="8" creationId="{A86CE17F-1C91-71CD-6AFA-DE4A7FACCA15}"/>
+          </ac:spMkLst>
+        </pc:spChg>
+        <pc:spChg chg="mod">
+          <ac:chgData name="Ravi Potes Mangra" userId="f6c3e66e-970a-4dac-abef-28c459f30976" providerId="ADAL" clId="{B2C1E8EB-EB94-44CA-9F50-E86E778B07B8}" dt="2026-02-01T03:18:21.673" v="816" actId="1076"/>
+          <ac:spMkLst>
+            <pc:docMk/>
+            <pc:sldMk cId="1383786992" sldId="256"/>
+            <ac:spMk id="11" creationId="{BE226B3A-D154-142B-B4C8-A6F341259459}"/>
+          </ac:spMkLst>
+        </pc:spChg>
+        <pc:spChg chg="mod">
+          <ac:chgData name="Ravi Potes Mangra" userId="f6c3e66e-970a-4dac-abef-28c459f30976" providerId="ADAL" clId="{B2C1E8EB-EB94-44CA-9F50-E86E778B07B8}" dt="2026-02-01T03:18:21.673" v="816" actId="1076"/>
+          <ac:spMkLst>
+            <pc:docMk/>
+            <pc:sldMk cId="1383786992" sldId="256"/>
+            <ac:spMk id="12" creationId="{15C62E70-4F78-47F7-66D4-5495ABCDC7A4}"/>
+          </ac:spMkLst>
+        </pc:spChg>
+        <pc:spChg chg="mod">
+          <ac:chgData name="Ravi Potes Mangra" userId="f6c3e66e-970a-4dac-abef-28c459f30976" providerId="ADAL" clId="{B2C1E8EB-EB94-44CA-9F50-E86E778B07B8}" dt="2026-02-01T03:18:21.673" v="816" actId="1076"/>
+          <ac:spMkLst>
+            <pc:docMk/>
+            <pc:sldMk cId="1383786992" sldId="256"/>
+            <ac:spMk id="13" creationId="{1422CC3A-B2B8-649D-691D-83237FC324DF}"/>
+          </ac:spMkLst>
+        </pc:spChg>
+        <pc:spChg chg="mod">
+          <ac:chgData name="Ravi Potes Mangra" userId="f6c3e66e-970a-4dac-abef-28c459f30976" providerId="ADAL" clId="{B2C1E8EB-EB94-44CA-9F50-E86E778B07B8}" dt="2026-02-01T03:18:21.673" v="816" actId="1076"/>
+          <ac:spMkLst>
+            <pc:docMk/>
+            <pc:sldMk cId="1383786992" sldId="256"/>
+            <ac:spMk id="14" creationId="{CD43FA6D-CE9C-0FDA-ECAA-3E3370444C9F}"/>
+          </ac:spMkLst>
+        </pc:spChg>
+        <pc:spChg chg="mod">
+          <ac:chgData name="Ravi Potes Mangra" userId="f6c3e66e-970a-4dac-abef-28c459f30976" providerId="ADAL" clId="{B2C1E8EB-EB94-44CA-9F50-E86E778B07B8}" dt="2026-02-01T03:18:21.673" v="816" actId="1076"/>
+          <ac:spMkLst>
+            <pc:docMk/>
+            <pc:sldMk cId="1383786992" sldId="256"/>
+            <ac:spMk id="17" creationId="{6F4D7299-3CA1-40D1-E535-687F5692AB28}"/>
+          </ac:spMkLst>
+        </pc:spChg>
+        <pc:spChg chg="mod">
+          <ac:chgData name="Ravi Potes Mangra" userId="f6c3e66e-970a-4dac-abef-28c459f30976" providerId="ADAL" clId="{B2C1E8EB-EB94-44CA-9F50-E86E778B07B8}" dt="2026-02-01T03:18:21.673" v="816" actId="1076"/>
+          <ac:spMkLst>
+            <pc:docMk/>
+            <pc:sldMk cId="1383786992" sldId="256"/>
+            <ac:spMk id="18" creationId="{D6DCD758-7509-310E-394F-804C5239EC37}"/>
+          </ac:spMkLst>
+        </pc:spChg>
+        <pc:spChg chg="mod">
+          <ac:chgData name="Ravi Potes Mangra" userId="f6c3e66e-970a-4dac-abef-28c459f30976" providerId="ADAL" clId="{B2C1E8EB-EB94-44CA-9F50-E86E778B07B8}" dt="2026-02-01T03:18:21.673" v="816" actId="1076"/>
+          <ac:spMkLst>
+            <pc:docMk/>
+            <pc:sldMk cId="1383786992" sldId="256"/>
+            <ac:spMk id="19" creationId="{139453A1-F886-9251-A8E8-18CF26DB203D}"/>
+          </ac:spMkLst>
+        </pc:spChg>
+        <pc:spChg chg="mod">
+          <ac:chgData name="Ravi Potes Mangra" userId="f6c3e66e-970a-4dac-abef-28c459f30976" providerId="ADAL" clId="{B2C1E8EB-EB94-44CA-9F50-E86E778B07B8}" dt="2026-02-01T03:19:22.533" v="828" actId="14100"/>
+          <ac:spMkLst>
+            <pc:docMk/>
+            <pc:sldMk cId="1383786992" sldId="256"/>
+            <ac:spMk id="20" creationId="{4E7951CD-441D-85E5-9AC4-482180A7F6D9}"/>
+          </ac:spMkLst>
+        </pc:spChg>
+      </pc:sldChg>
+      <pc:sldChg chg="addSp delSp modSp new mod">
+        <pc:chgData name="Ravi Potes Mangra" userId="f6c3e66e-970a-4dac-abef-28c459f30976" providerId="ADAL" clId="{B2C1E8EB-EB94-44CA-9F50-E86E778B07B8}" dt="2026-02-01T03:21:10.097" v="850" actId="20577"/>
+        <pc:sldMkLst>
+          <pc:docMk/>
+          <pc:sldMk cId="4262359238" sldId="257"/>
+        </pc:sldMkLst>
+        <pc:spChg chg="add mod">
+          <ac:chgData name="Ravi Potes Mangra" userId="f6c3e66e-970a-4dac-abef-28c459f30976" providerId="ADAL" clId="{B2C1E8EB-EB94-44CA-9F50-E86E778B07B8}" dt="2026-01-31T21:10:14.125" v="545" actId="1076"/>
+          <ac:spMkLst>
+            <pc:docMk/>
+            <pc:sldMk cId="4262359238" sldId="257"/>
+            <ac:spMk id="2" creationId="{CCB0E521-6F20-8624-72FD-FAE1577B962D}"/>
+          </ac:spMkLst>
+        </pc:spChg>
+        <pc:spChg chg="add mod">
+          <ac:chgData name="Ravi Potes Mangra" userId="f6c3e66e-970a-4dac-abef-28c459f30976" providerId="ADAL" clId="{B2C1E8EB-EB94-44CA-9F50-E86E778B07B8}" dt="2026-02-01T02:07:25.192" v="664" actId="20577"/>
+          <ac:spMkLst>
+            <pc:docMk/>
+            <pc:sldMk cId="4262359238" sldId="257"/>
+            <ac:spMk id="3" creationId="{F6422FD3-C6CB-C9C1-E49E-C8FA9C951D78}"/>
+          </ac:spMkLst>
+        </pc:spChg>
+        <pc:spChg chg="add mod">
+          <ac:chgData name="Ravi Potes Mangra" userId="f6c3e66e-970a-4dac-abef-28c459f30976" providerId="ADAL" clId="{B2C1E8EB-EB94-44CA-9F50-E86E778B07B8}" dt="2026-02-01T03:20:58.935" v="840" actId="1076"/>
+          <ac:spMkLst>
+            <pc:docMk/>
+            <pc:sldMk cId="4262359238" sldId="257"/>
+            <ac:spMk id="4" creationId="{AC71F589-FDAE-BCB7-DEEE-529391E5FCFE}"/>
+          </ac:spMkLst>
+        </pc:spChg>
+        <pc:spChg chg="add del mod">
+          <ac:chgData name="Ravi Potes Mangra" userId="f6c3e66e-970a-4dac-abef-28c459f30976" providerId="ADAL" clId="{B2C1E8EB-EB94-44CA-9F50-E86E778B07B8}" dt="2026-01-31T20:51:51.264" v="40" actId="478"/>
+          <ac:spMkLst>
+            <pc:docMk/>
+            <pc:sldMk cId="4262359238" sldId="257"/>
+            <ac:spMk id="5" creationId="{BE28E83B-A63C-1D96-4D07-3F855F30C969}"/>
+          </ac:spMkLst>
+        </pc:spChg>
+        <pc:spChg chg="add del mod">
+          <ac:chgData name="Ravi Potes Mangra" userId="f6c3e66e-970a-4dac-abef-28c459f30976" providerId="ADAL" clId="{B2C1E8EB-EB94-44CA-9F50-E86E778B07B8}" dt="2026-01-31T20:51:51.771" v="41" actId="478"/>
+          <ac:spMkLst>
+            <pc:docMk/>
+            <pc:sldMk cId="4262359238" sldId="257"/>
+            <ac:spMk id="6" creationId="{E55EE77B-1B57-0E86-10A6-5AE52ED205F8}"/>
+          </ac:spMkLst>
+        </pc:spChg>
+        <pc:spChg chg="add del mod">
+          <ac:chgData name="Ravi Potes Mangra" userId="f6c3e66e-970a-4dac-abef-28c459f30976" providerId="ADAL" clId="{B2C1E8EB-EB94-44CA-9F50-E86E778B07B8}" dt="2026-01-31T20:51:52.143" v="42" actId="478"/>
+          <ac:spMkLst>
+            <pc:docMk/>
+            <pc:sldMk cId="4262359238" sldId="257"/>
+            <ac:spMk id="7" creationId="{563A36A4-F91B-A05D-7E1D-C478B5D3098D}"/>
+          </ac:spMkLst>
+        </pc:spChg>
+        <pc:spChg chg="add del mod">
+          <ac:chgData name="Ravi Potes Mangra" userId="f6c3e66e-970a-4dac-abef-28c459f30976" providerId="ADAL" clId="{B2C1E8EB-EB94-44CA-9F50-E86E778B07B8}" dt="2026-01-31T20:51:52.622" v="43" actId="478"/>
+          <ac:spMkLst>
+            <pc:docMk/>
+            <pc:sldMk cId="4262359238" sldId="257"/>
+            <ac:spMk id="8" creationId="{4F81B9C3-213F-934E-685C-651956EC002A}"/>
+          </ac:spMkLst>
+        </pc:spChg>
+        <pc:spChg chg="add del mod">
+          <ac:chgData name="Ravi Potes Mangra" userId="f6c3e66e-970a-4dac-abef-28c459f30976" providerId="ADAL" clId="{B2C1E8EB-EB94-44CA-9F50-E86E778B07B8}" dt="2026-01-31T20:51:52.998" v="44" actId="478"/>
+          <ac:spMkLst>
+            <pc:docMk/>
+            <pc:sldMk cId="4262359238" sldId="257"/>
+            <ac:spMk id="9" creationId="{1A632EE2-C942-049C-2BC7-B63E43931354}"/>
+          </ac:spMkLst>
+        </pc:spChg>
+        <pc:spChg chg="add mod">
+          <ac:chgData name="Ravi Potes Mangra" userId="f6c3e66e-970a-4dac-abef-28c459f30976" providerId="ADAL" clId="{B2C1E8EB-EB94-44CA-9F50-E86E778B07B8}" dt="2026-02-01T03:20:58.935" v="840" actId="1076"/>
+          <ac:spMkLst>
+            <pc:docMk/>
+            <pc:sldMk cId="4262359238" sldId="257"/>
+            <ac:spMk id="10" creationId="{FA88CC84-2451-5E39-5F40-DDFD1499D514}"/>
+          </ac:spMkLst>
+        </pc:spChg>
+        <pc:spChg chg="add mod">
+          <ac:chgData name="Ravi Potes Mangra" userId="f6c3e66e-970a-4dac-abef-28c459f30976" providerId="ADAL" clId="{B2C1E8EB-EB94-44CA-9F50-E86E778B07B8}" dt="2026-02-01T03:20:58.935" v="840" actId="1076"/>
+          <ac:spMkLst>
+            <pc:docMk/>
+            <pc:sldMk cId="4262359238" sldId="257"/>
+            <ac:spMk id="11" creationId="{0BB7FAF8-D00E-1ED0-AF2B-E2AB8203F630}"/>
+          </ac:spMkLst>
+        </pc:spChg>
+        <pc:spChg chg="add mod">
+          <ac:chgData name="Ravi Potes Mangra" userId="f6c3e66e-970a-4dac-abef-28c459f30976" providerId="ADAL" clId="{B2C1E8EB-EB94-44CA-9F50-E86E778B07B8}" dt="2026-02-01T03:20:58.935" v="840" actId="1076"/>
+          <ac:spMkLst>
+            <pc:docMk/>
+            <pc:sldMk cId="4262359238" sldId="257"/>
+            <ac:spMk id="12" creationId="{902B95B8-F1F3-4B08-D454-DE2E4CBB26D3}"/>
+          </ac:spMkLst>
+        </pc:spChg>
+        <pc:spChg chg="add mod">
+          <ac:chgData name="Ravi Potes Mangra" userId="f6c3e66e-970a-4dac-abef-28c459f30976" providerId="ADAL" clId="{B2C1E8EB-EB94-44CA-9F50-E86E778B07B8}" dt="2026-02-01T03:20:58.935" v="840" actId="1076"/>
+          <ac:spMkLst>
+            <pc:docMk/>
+            <pc:sldMk cId="4262359238" sldId="257"/>
+            <ac:spMk id="13" creationId="{CDE97DBA-3DF5-FB29-E890-2FFE9EB84EB3}"/>
+          </ac:spMkLst>
+        </pc:spChg>
+        <pc:spChg chg="add mod">
+          <ac:chgData name="Ravi Potes Mangra" userId="f6c3e66e-970a-4dac-abef-28c459f30976" providerId="ADAL" clId="{B2C1E8EB-EB94-44CA-9F50-E86E778B07B8}" dt="2026-02-01T03:20:58.935" v="840" actId="1076"/>
+          <ac:spMkLst>
+            <pc:docMk/>
+            <pc:sldMk cId="4262359238" sldId="257"/>
+            <ac:spMk id="14" creationId="{553B0AE4-93B5-7B26-BA76-0B87F6A076E9}"/>
+          </ac:spMkLst>
+        </pc:spChg>
+        <pc:spChg chg="add mod">
+          <ac:chgData name="Ravi Potes Mangra" userId="f6c3e66e-970a-4dac-abef-28c459f30976" providerId="ADAL" clId="{B2C1E8EB-EB94-44CA-9F50-E86E778B07B8}" dt="2026-01-31T20:53:47.678" v="102" actId="1076"/>
+          <ac:spMkLst>
+            <pc:docMk/>
+            <pc:sldMk cId="4262359238" sldId="257"/>
+            <ac:spMk id="15" creationId="{3A1CB025-AF32-411A-39B7-D13F9BC5F76D}"/>
+          </ac:spMkLst>
+        </pc:spChg>
+        <pc:spChg chg="add mod">
+          <ac:chgData name="Ravi Potes Mangra" userId="f6c3e66e-970a-4dac-abef-28c459f30976" providerId="ADAL" clId="{B2C1E8EB-EB94-44CA-9F50-E86E778B07B8}" dt="2026-02-01T03:18:53.860" v="821" actId="1076"/>
+          <ac:spMkLst>
+            <pc:docMk/>
+            <pc:sldMk cId="4262359238" sldId="257"/>
+            <ac:spMk id="16" creationId="{B1585E54-962B-8F95-0E4D-D537F236FF70}"/>
+          </ac:spMkLst>
+        </pc:spChg>
+        <pc:spChg chg="add mod">
+          <ac:chgData name="Ravi Potes Mangra" userId="f6c3e66e-970a-4dac-abef-28c459f30976" providerId="ADAL" clId="{B2C1E8EB-EB94-44CA-9F50-E86E778B07B8}" dt="2026-02-01T03:21:10.097" v="850" actId="20577"/>
+          <ac:spMkLst>
+            <pc:docMk/>
+            <pc:sldMk cId="4262359238" sldId="257"/>
+            <ac:spMk id="17" creationId="{A50FD091-1B33-5F2D-15FA-593E93CE1593}"/>
+          </ac:spMkLst>
+        </pc:spChg>
+      </pc:sldChg>
+      <pc:sldChg chg="addSp delSp modSp new mod">
+        <pc:chgData name="Ravi Potes Mangra" userId="f6c3e66e-970a-4dac-abef-28c459f30976" providerId="ADAL" clId="{B2C1E8EB-EB94-44CA-9F50-E86E778B07B8}" dt="2026-02-01T03:19:09.321" v="825" actId="1076"/>
+        <pc:sldMkLst>
+          <pc:docMk/>
+          <pc:sldMk cId="558483625" sldId="258"/>
+        </pc:sldMkLst>
+        <pc:spChg chg="add mod">
+          <ac:chgData name="Ravi Potes Mangra" userId="f6c3e66e-970a-4dac-abef-28c459f30976" providerId="ADAL" clId="{B2C1E8EB-EB94-44CA-9F50-E86E778B07B8}" dt="2026-01-31T21:02:09.273" v="381" actId="1076"/>
+          <ac:spMkLst>
+            <pc:docMk/>
+            <pc:sldMk cId="558483625" sldId="258"/>
+            <ac:spMk id="2" creationId="{6BD37EC0-4641-965A-3CAC-564384996A0E}"/>
+          </ac:spMkLst>
+        </pc:spChg>
+        <pc:spChg chg="add mod">
+          <ac:chgData name="Ravi Potes Mangra" userId="f6c3e66e-970a-4dac-abef-28c459f30976" providerId="ADAL" clId="{B2C1E8EB-EB94-44CA-9F50-E86E778B07B8}" dt="2026-02-01T03:19:09.321" v="825" actId="1076"/>
+          <ac:spMkLst>
+            <pc:docMk/>
+            <pc:sldMk cId="558483625" sldId="258"/>
+            <ac:spMk id="3" creationId="{C3FC460E-4334-37B2-20A7-7DD8F710C079}"/>
+          </ac:spMkLst>
+        </pc:spChg>
+        <pc:spChg chg="add mod">
+          <ac:chgData name="Ravi Potes Mangra" userId="f6c3e66e-970a-4dac-abef-28c459f30976" providerId="ADAL" clId="{B2C1E8EB-EB94-44CA-9F50-E86E778B07B8}" dt="2026-01-31T20:57:59.932" v="253" actId="1076"/>
+          <ac:spMkLst>
+            <pc:docMk/>
+            <pc:sldMk cId="558483625" sldId="258"/>
+            <ac:spMk id="4" creationId="{986BD357-79AA-EB8B-328C-77B7647747F8}"/>
+          </ac:spMkLst>
+        </pc:spChg>
+        <pc:spChg chg="add mod">
+          <ac:chgData name="Ravi Potes Mangra" userId="f6c3e66e-970a-4dac-abef-28c459f30976" providerId="ADAL" clId="{B2C1E8EB-EB94-44CA-9F50-E86E778B07B8}" dt="2026-01-31T20:58:23.400" v="296" actId="20577"/>
+          <ac:spMkLst>
+            <pc:docMk/>
+            <pc:sldMk cId="558483625" sldId="258"/>
+            <ac:spMk id="5" creationId="{47FEDB9E-6050-54DB-D07E-8B4184685777}"/>
+          </ac:spMkLst>
+        </pc:spChg>
+        <pc:spChg chg="add mod">
+          <ac:chgData name="Ravi Potes Mangra" userId="f6c3e66e-970a-4dac-abef-28c459f30976" providerId="ADAL" clId="{B2C1E8EB-EB94-44CA-9F50-E86E778B07B8}" dt="2026-01-31T20:57:45.507" v="252" actId="2710"/>
+          <ac:spMkLst>
+            <pc:docMk/>
+            <pc:sldMk cId="558483625" sldId="258"/>
+            <ac:spMk id="6" creationId="{13AC8412-CFBE-4B97-9090-20AF6FCC7E1E}"/>
+          </ac:spMkLst>
+        </pc:spChg>
+        <pc:spChg chg="add mod">
+          <ac:chgData name="Ravi Potes Mangra" userId="f6c3e66e-970a-4dac-abef-28c459f30976" providerId="ADAL" clId="{B2C1E8EB-EB94-44CA-9F50-E86E778B07B8}" dt="2026-01-31T21:01:54.718" v="378" actId="1076"/>
+          <ac:spMkLst>
+            <pc:docMk/>
+            <pc:sldMk cId="558483625" sldId="258"/>
+            <ac:spMk id="7" creationId="{6378953B-8389-D846-67BF-6ED3ED8D424D}"/>
+          </ac:spMkLst>
+        </pc:spChg>
+        <pc:spChg chg="add del mod">
+          <ac:chgData name="Ravi Potes Mangra" userId="f6c3e66e-970a-4dac-abef-28c459f30976" providerId="ADAL" clId="{B2C1E8EB-EB94-44CA-9F50-E86E778B07B8}" dt="2026-01-31T21:04:42.308" v="429" actId="478"/>
+          <ac:spMkLst>
+            <pc:docMk/>
+            <pc:sldMk cId="558483625" sldId="258"/>
+            <ac:spMk id="8" creationId="{5F11BB65-B3DB-8952-7053-3D5FADC45AC8}"/>
+          </ac:spMkLst>
+        </pc:spChg>
+        <pc:spChg chg="add del mod">
+          <ac:chgData name="Ravi Potes Mangra" userId="f6c3e66e-970a-4dac-abef-28c459f30976" providerId="ADAL" clId="{B2C1E8EB-EB94-44CA-9F50-E86E778B07B8}" dt="2026-01-31T21:05:10.798" v="449" actId="478"/>
+          <ac:spMkLst>
+            <pc:docMk/>
+            <pc:sldMk cId="558483625" sldId="258"/>
+            <ac:spMk id="9" creationId="{A306FB80-7040-5BD5-59A2-A6A996ACDB2E}"/>
+          </ac:spMkLst>
+        </pc:spChg>
+        <pc:spChg chg="add mod">
+          <ac:chgData name="Ravi Potes Mangra" userId="f6c3e66e-970a-4dac-abef-28c459f30976" providerId="ADAL" clId="{B2C1E8EB-EB94-44CA-9F50-E86E778B07B8}" dt="2026-01-31T20:58:27.968" v="297" actId="20577"/>
+          <ac:spMkLst>
+            <pc:docMk/>
+            <pc:sldMk cId="558483625" sldId="258"/>
+            <ac:spMk id="10" creationId="{96FDC118-AE7B-50DA-5781-77A60577172D}"/>
+          </ac:spMkLst>
+        </pc:spChg>
+        <pc:spChg chg="add mod">
+          <ac:chgData name="Ravi Potes Mangra" userId="f6c3e66e-970a-4dac-abef-28c459f30976" providerId="ADAL" clId="{B2C1E8EB-EB94-44CA-9F50-E86E778B07B8}" dt="2026-01-31T20:59:01.598" v="330" actId="20577"/>
+          <ac:spMkLst>
+            <pc:docMk/>
+            <pc:sldMk cId="558483625" sldId="258"/>
+            <ac:spMk id="11" creationId="{BC5CDB68-549A-384F-BA7E-55ED8ACCB72D}"/>
+          </ac:spMkLst>
+        </pc:spChg>
+        <pc:spChg chg="add mod">
+          <ac:chgData name="Ravi Potes Mangra" userId="f6c3e66e-970a-4dac-abef-28c459f30976" providerId="ADAL" clId="{B2C1E8EB-EB94-44CA-9F50-E86E778B07B8}" dt="2026-01-31T21:01:54.718" v="378" actId="1076"/>
+          <ac:spMkLst>
+            <pc:docMk/>
+            <pc:sldMk cId="558483625" sldId="258"/>
+            <ac:spMk id="12" creationId="{1D323981-4AA6-92AA-9D05-F82B7131DFFE}"/>
+          </ac:spMkLst>
+        </pc:spChg>
+        <pc:spChg chg="add mod">
+          <ac:chgData name="Ravi Potes Mangra" userId="f6c3e66e-970a-4dac-abef-28c459f30976" providerId="ADAL" clId="{B2C1E8EB-EB94-44CA-9F50-E86E778B07B8}" dt="2026-01-31T21:01:54.718" v="378" actId="1076"/>
+          <ac:spMkLst>
+            <pc:docMk/>
+            <pc:sldMk cId="558483625" sldId="258"/>
+            <ac:spMk id="13" creationId="{3B3CD1F1-6E1E-B35D-D1BE-D9D8BCF0A392}"/>
+          </ac:spMkLst>
+        </pc:spChg>
+        <pc:spChg chg="add mod">
+          <ac:chgData name="Ravi Potes Mangra" userId="f6c3e66e-970a-4dac-abef-28c459f30976" providerId="ADAL" clId="{B2C1E8EB-EB94-44CA-9F50-E86E778B07B8}" dt="2026-01-31T21:04:01.871" v="421" actId="20577"/>
+          <ac:spMkLst>
+            <pc:docMk/>
+            <pc:sldMk cId="558483625" sldId="258"/>
+            <ac:spMk id="14" creationId="{36B78476-E20D-1573-5F9B-EDF621BDF587}"/>
+          </ac:spMkLst>
+        </pc:spChg>
+        <pc:spChg chg="add mod">
+          <ac:chgData name="Ravi Potes Mangra" userId="f6c3e66e-970a-4dac-abef-28c459f30976" providerId="ADAL" clId="{B2C1E8EB-EB94-44CA-9F50-E86E778B07B8}" dt="2026-01-31T21:03:57.372" v="410" actId="20577"/>
+          <ac:spMkLst>
+            <pc:docMk/>
+            <pc:sldMk cId="558483625" sldId="258"/>
+            <ac:spMk id="15" creationId="{8BB44C06-0D6C-3BA4-6163-0B8DD1F24333}"/>
+          </ac:spMkLst>
+        </pc:spChg>
+        <pc:spChg chg="add mod">
+          <ac:chgData name="Ravi Potes Mangra" userId="f6c3e66e-970a-4dac-abef-28c459f30976" providerId="ADAL" clId="{B2C1E8EB-EB94-44CA-9F50-E86E778B07B8}" dt="2026-01-31T21:01:54.718" v="378" actId="1076"/>
+          <ac:spMkLst>
+            <pc:docMk/>
+            <pc:sldMk cId="558483625" sldId="258"/>
+            <ac:spMk id="16" creationId="{6888A43B-C1DE-115F-FC99-BBE749121B42}"/>
+          </ac:spMkLst>
+        </pc:spChg>
+        <pc:spChg chg="add mod">
+          <ac:chgData name="Ravi Potes Mangra" userId="f6c3e66e-970a-4dac-abef-28c459f30976" providerId="ADAL" clId="{B2C1E8EB-EB94-44CA-9F50-E86E778B07B8}" dt="2026-01-31T21:01:54.718" v="378" actId="1076"/>
+          <ac:spMkLst>
+            <pc:docMk/>
+            <pc:sldMk cId="558483625" sldId="258"/>
+            <ac:spMk id="17" creationId="{E586E2AF-C270-5566-0B25-772636524559}"/>
+          </ac:spMkLst>
+        </pc:spChg>
+        <pc:spChg chg="add mod">
+          <ac:chgData name="Ravi Potes Mangra" userId="f6c3e66e-970a-4dac-abef-28c459f30976" providerId="ADAL" clId="{B2C1E8EB-EB94-44CA-9F50-E86E778B07B8}" dt="2026-01-31T21:01:54.718" v="378" actId="1076"/>
+          <ac:spMkLst>
+            <pc:docMk/>
+            <pc:sldMk cId="558483625" sldId="258"/>
+            <ac:spMk id="18" creationId="{25CB93A8-D9C7-0CF4-EA34-B53A43654BE4}"/>
+          </ac:spMkLst>
+        </pc:spChg>
+        <pc:spChg chg="add mod">
+          <ac:chgData name="Ravi Potes Mangra" userId="f6c3e66e-970a-4dac-abef-28c459f30976" providerId="ADAL" clId="{B2C1E8EB-EB94-44CA-9F50-E86E778B07B8}" dt="2026-01-31T21:01:54.718" v="378" actId="1076"/>
+          <ac:spMkLst>
+            <pc:docMk/>
+            <pc:sldMk cId="558483625" sldId="258"/>
+            <ac:spMk id="19" creationId="{B495B742-0B29-3638-D74D-083FCACA700A}"/>
+          </ac:spMkLst>
+        </pc:spChg>
+        <pc:spChg chg="add mod">
+          <ac:chgData name="Ravi Potes Mangra" userId="f6c3e66e-970a-4dac-abef-28c459f30976" providerId="ADAL" clId="{B2C1E8EB-EB94-44CA-9F50-E86E778B07B8}" dt="2026-01-31T21:05:01.466" v="436" actId="1076"/>
+          <ac:spMkLst>
+            <pc:docMk/>
+            <pc:sldMk cId="558483625" sldId="258"/>
+            <ac:spMk id="20" creationId="{AA3F8B03-3DFD-8C05-24AB-A4D6110C35EF}"/>
+          </ac:spMkLst>
+        </pc:spChg>
+        <pc:spChg chg="add mod">
+          <ac:chgData name="Ravi Potes Mangra" userId="f6c3e66e-970a-4dac-abef-28c459f30976" providerId="ADAL" clId="{B2C1E8EB-EB94-44CA-9F50-E86E778B07B8}" dt="2026-01-31T21:09:12.613" v="539" actId="1076"/>
+          <ac:spMkLst>
+            <pc:docMk/>
+            <pc:sldMk cId="558483625" sldId="258"/>
+            <ac:spMk id="21" creationId="{639F4EAA-813B-554E-F5B5-133A7386F962}"/>
+          </ac:spMkLst>
+        </pc:spChg>
+        <pc:spChg chg="add mod">
+          <ac:chgData name="Ravi Potes Mangra" userId="f6c3e66e-970a-4dac-abef-28c459f30976" providerId="ADAL" clId="{B2C1E8EB-EB94-44CA-9F50-E86E778B07B8}" dt="2026-01-31T21:01:50.816" v="377" actId="1076"/>
+          <ac:spMkLst>
+            <pc:docMk/>
+            <pc:sldMk cId="558483625" sldId="258"/>
+            <ac:spMk id="22" creationId="{6583CCDF-751A-DA0E-EF24-1F83EACD68D2}"/>
+          </ac:spMkLst>
+        </pc:spChg>
+        <pc:spChg chg="add mod">
+          <ac:chgData name="Ravi Potes Mangra" userId="f6c3e66e-970a-4dac-abef-28c459f30976" providerId="ADAL" clId="{B2C1E8EB-EB94-44CA-9F50-E86E778B07B8}" dt="2026-01-31T21:01:50.816" v="377" actId="1076"/>
+          <ac:spMkLst>
+            <pc:docMk/>
+            <pc:sldMk cId="558483625" sldId="258"/>
+            <ac:spMk id="23" creationId="{0767B189-7246-2B44-062C-6EAD3A3F99DE}"/>
+          </ac:spMkLst>
+        </pc:spChg>
+        <pc:spChg chg="add del mod">
+          <ac:chgData name="Ravi Potes Mangra" userId="f6c3e66e-970a-4dac-abef-28c459f30976" providerId="ADAL" clId="{B2C1E8EB-EB94-44CA-9F50-E86E778B07B8}" dt="2026-01-31T21:03:50.559" v="390" actId="478"/>
+          <ac:spMkLst>
+            <pc:docMk/>
+            <pc:sldMk cId="558483625" sldId="258"/>
+            <ac:spMk id="24" creationId="{F1147E09-5228-4901-230E-7C9909064B97}"/>
+          </ac:spMkLst>
+        </pc:spChg>
+        <pc:spChg chg="add mod">
+          <ac:chgData name="Ravi Potes Mangra" userId="f6c3e66e-970a-4dac-abef-28c459f30976" providerId="ADAL" clId="{B2C1E8EB-EB94-44CA-9F50-E86E778B07B8}" dt="2026-01-31T21:04:34.141" v="427" actId="1076"/>
+          <ac:spMkLst>
+            <pc:docMk/>
+            <pc:sldMk cId="558483625" sldId="258"/>
+            <ac:spMk id="25" creationId="{60F0799F-E11C-FE0A-A052-FDDF471657D2}"/>
+          </ac:spMkLst>
+        </pc:spChg>
+        <pc:spChg chg="add mod">
+          <ac:chgData name="Ravi Potes Mangra" userId="f6c3e66e-970a-4dac-abef-28c459f30976" providerId="ADAL" clId="{B2C1E8EB-EB94-44CA-9F50-E86E778B07B8}" dt="2026-01-31T21:04:12.723" v="423" actId="207"/>
+          <ac:spMkLst>
+            <pc:docMk/>
+            <pc:sldMk cId="558483625" sldId="258"/>
+            <ac:spMk id="26" creationId="{35F3354C-E9F5-5A1B-ECDE-391C31642BD1}"/>
+          </ac:spMkLst>
+        </pc:spChg>
+        <pc:spChg chg="add mod">
+          <ac:chgData name="Ravi Potes Mangra" userId="f6c3e66e-970a-4dac-abef-28c459f30976" providerId="ADAL" clId="{B2C1E8EB-EB94-44CA-9F50-E86E778B07B8}" dt="2026-01-31T21:04:21.301" v="425" actId="1076"/>
+          <ac:spMkLst>
+            <pc:docMk/>
+            <pc:sldMk cId="558483625" sldId="258"/>
+            <ac:spMk id="27" creationId="{741AFD15-4E9C-644B-8EF5-3B4ECFB1486F}"/>
+          </ac:spMkLst>
+        </pc:spChg>
+        <pc:spChg chg="add mod">
+          <ac:chgData name="Ravi Potes Mangra" userId="f6c3e66e-970a-4dac-abef-28c459f30976" providerId="ADAL" clId="{B2C1E8EB-EB94-44CA-9F50-E86E778B07B8}" dt="2026-01-31T21:09:14.910" v="540" actId="1076"/>
+          <ac:spMkLst>
+            <pc:docMk/>
+            <pc:sldMk cId="558483625" sldId="258"/>
+            <ac:spMk id="28" creationId="{F683DCAC-B648-C3C7-90CA-27CD3D1A536D}"/>
+          </ac:spMkLst>
+        </pc:spChg>
+        <pc:spChg chg="add mod">
+          <ac:chgData name="Ravi Potes Mangra" userId="f6c3e66e-970a-4dac-abef-28c459f30976" providerId="ADAL" clId="{B2C1E8EB-EB94-44CA-9F50-E86E778B07B8}" dt="2026-01-31T21:09:06.931" v="538" actId="20577"/>
+          <ac:spMkLst>
+            <pc:docMk/>
+            <pc:sldMk cId="558483625" sldId="258"/>
+            <ac:spMk id="29" creationId="{27A4097D-563C-5BEB-180B-24C732BCADA5}"/>
+          </ac:spMkLst>
+        </pc:spChg>
+        <pc:spChg chg="add mod">
+          <ac:chgData name="Ravi Potes Mangra" userId="f6c3e66e-970a-4dac-abef-28c459f30976" providerId="ADAL" clId="{B2C1E8EB-EB94-44CA-9F50-E86E778B07B8}" dt="2026-01-31T21:09:21.914" v="543" actId="14100"/>
+          <ac:spMkLst>
+            <pc:docMk/>
+            <pc:sldMk cId="558483625" sldId="258"/>
+            <ac:spMk id="30" creationId="{9A25B762-2578-F135-C9E8-9F4CFD7ACF89}"/>
+          </ac:spMkLst>
+        </pc:spChg>
+      </pc:sldChg>
+      <pc:sldChg chg="addSp delSp modSp new mod">
+        <pc:chgData name="Ravi Potes Mangra" userId="f6c3e66e-970a-4dac-abef-28c459f30976" providerId="ADAL" clId="{B2C1E8EB-EB94-44CA-9F50-E86E778B07B8}" dt="2026-02-01T02:09:27.271" v="700" actId="1076"/>
+        <pc:sldMkLst>
+          <pc:docMk/>
+          <pc:sldMk cId="736734725" sldId="259"/>
+        </pc:sldMkLst>
+        <pc:spChg chg="add mod">
+          <ac:chgData name="Ravi Potes Mangra" userId="f6c3e66e-970a-4dac-abef-28c459f30976" providerId="ADAL" clId="{B2C1E8EB-EB94-44CA-9F50-E86E778B07B8}" dt="2026-01-31T21:10:34.832" v="584" actId="1076"/>
+          <ac:spMkLst>
+            <pc:docMk/>
+            <pc:sldMk cId="736734725" sldId="259"/>
+            <ac:spMk id="2" creationId="{0DE24D2C-8151-05B0-71A5-A98B07E4D30F}"/>
+          </ac:spMkLst>
+        </pc:spChg>
+        <pc:spChg chg="add mod">
+          <ac:chgData name="Ravi Potes Mangra" userId="f6c3e66e-970a-4dac-abef-28c459f30976" providerId="ADAL" clId="{B2C1E8EB-EB94-44CA-9F50-E86E778B07B8}" dt="2026-01-31T21:11:40.748" v="590" actId="1076"/>
+          <ac:spMkLst>
+            <pc:docMk/>
+            <pc:sldMk cId="736734725" sldId="259"/>
+            <ac:spMk id="3" creationId="{71A7C33F-B25B-9209-530A-17FD87828961}"/>
+          </ac:spMkLst>
+        </pc:spChg>
+        <pc:spChg chg="add mod">
+          <ac:chgData name="Ravi Potes Mangra" userId="f6c3e66e-970a-4dac-abef-28c459f30976" providerId="ADAL" clId="{B2C1E8EB-EB94-44CA-9F50-E86E778B07B8}" dt="2026-01-31T21:11:13.794" v="587" actId="1076"/>
+          <ac:spMkLst>
+            <pc:docMk/>
+            <pc:sldMk cId="736734725" sldId="259"/>
+            <ac:spMk id="4" creationId="{56CCB40F-337F-06BD-7ABC-A2346E98EED7}"/>
+          </ac:spMkLst>
+        </pc:spChg>
+        <pc:spChg chg="add mod">
+          <ac:chgData name="Ravi Potes Mangra" userId="f6c3e66e-970a-4dac-abef-28c459f30976" providerId="ADAL" clId="{B2C1E8EB-EB94-44CA-9F50-E86E778B07B8}" dt="2026-02-01T02:09:27.271" v="700" actId="1076"/>
+          <ac:spMkLst>
+            <pc:docMk/>
+            <pc:sldMk cId="736734725" sldId="259"/>
+            <ac:spMk id="7" creationId="{8EC42E25-97E1-9C11-109E-5F66D6CD9A42}"/>
+          </ac:spMkLst>
+        </pc:spChg>
+        <pc:spChg chg="add mod">
+          <ac:chgData name="Ravi Potes Mangra" userId="f6c3e66e-970a-4dac-abef-28c459f30976" providerId="ADAL" clId="{B2C1E8EB-EB94-44CA-9F50-E86E778B07B8}" dt="2026-02-01T02:09:27.271" v="700" actId="1076"/>
+          <ac:spMkLst>
+            <pc:docMk/>
+            <pc:sldMk cId="736734725" sldId="259"/>
+            <ac:spMk id="8" creationId="{6C0F801F-CB1F-9C2E-3125-EF1D921E457E}"/>
+          </ac:spMkLst>
+        </pc:spChg>
+        <pc:spChg chg="del mod">
+          <ac:chgData name="Ravi Potes Mangra" userId="f6c3e66e-970a-4dac-abef-28c459f30976" providerId="ADAL" clId="{B2C1E8EB-EB94-44CA-9F50-E86E778B07B8}" dt="2026-02-01T02:09:24.430" v="699" actId="478"/>
+          <ac:spMkLst>
+            <pc:docMk/>
+            <pc:sldMk cId="736734725" sldId="259"/>
+            <ac:spMk id="10" creationId="{CEAF44AE-2AA2-F728-3EEB-89CAB125848B}"/>
+          </ac:spMkLst>
+        </pc:spChg>
+        <pc:spChg chg="add mod">
+          <ac:chgData name="Ravi Potes Mangra" userId="f6c3e66e-970a-4dac-abef-28c459f30976" providerId="ADAL" clId="{B2C1E8EB-EB94-44CA-9F50-E86E778B07B8}" dt="2026-02-01T02:09:27.271" v="700" actId="1076"/>
+          <ac:spMkLst>
+            <pc:docMk/>
+            <pc:sldMk cId="736734725" sldId="259"/>
+            <ac:spMk id="12" creationId="{428AFBCD-0C7C-30DB-68D6-1B0FF0B8159F}"/>
+          </ac:spMkLst>
+        </pc:spChg>
+        <pc:spChg chg="add mod">
+          <ac:chgData name="Ravi Potes Mangra" userId="f6c3e66e-970a-4dac-abef-28c459f30976" providerId="ADAL" clId="{B2C1E8EB-EB94-44CA-9F50-E86E778B07B8}" dt="2026-02-01T02:09:27.271" v="700" actId="1076"/>
+          <ac:spMkLst>
+            <pc:docMk/>
+            <pc:sldMk cId="736734725" sldId="259"/>
+            <ac:spMk id="16" creationId="{4870A1F6-79DB-2F15-51A9-B31E132B39F9}"/>
+          </ac:spMkLst>
+        </pc:spChg>
+        <pc:spChg chg="mod">
+          <ac:chgData name="Ravi Potes Mangra" userId="f6c3e66e-970a-4dac-abef-28c459f30976" providerId="ADAL" clId="{B2C1E8EB-EB94-44CA-9F50-E86E778B07B8}" dt="2026-02-01T02:08:09.706" v="666" actId="1076"/>
+          <ac:spMkLst>
+            <pc:docMk/>
+            <pc:sldMk cId="736734725" sldId="259"/>
+            <ac:spMk id="17" creationId="{55F14826-3559-CA0F-E2B7-4370320F7A79}"/>
+          </ac:spMkLst>
+        </pc:spChg>
+        <pc:spChg chg="add mod">
+          <ac:chgData name="Ravi Potes Mangra" userId="f6c3e66e-970a-4dac-abef-28c459f30976" providerId="ADAL" clId="{B2C1E8EB-EB94-44CA-9F50-E86E778B07B8}" dt="2026-02-01T02:09:27.271" v="700" actId="1076"/>
+          <ac:spMkLst>
+            <pc:docMk/>
+            <pc:sldMk cId="736734725" sldId="259"/>
+            <ac:spMk id="18" creationId="{B1A1C0C8-2AAD-B135-4A76-9CBF20B6481F}"/>
+          </ac:spMkLst>
+        </pc:spChg>
+        <pc:spChg chg="add mod">
+          <ac:chgData name="Ravi Potes Mangra" userId="f6c3e66e-970a-4dac-abef-28c459f30976" providerId="ADAL" clId="{B2C1E8EB-EB94-44CA-9F50-E86E778B07B8}" dt="2026-02-01T02:09:27.271" v="700" actId="1076"/>
+          <ac:spMkLst>
+            <pc:docMk/>
+            <pc:sldMk cId="736734725" sldId="259"/>
+            <ac:spMk id="20" creationId="{5DEC751D-FEF9-2E97-AC82-05318E5C6666}"/>
+          </ac:spMkLst>
+        </pc:spChg>
+        <pc:spChg chg="add mod">
+          <ac:chgData name="Ravi Potes Mangra" userId="f6c3e66e-970a-4dac-abef-28c459f30976" providerId="ADAL" clId="{B2C1E8EB-EB94-44CA-9F50-E86E778B07B8}" dt="2026-02-01T02:09:27.271" v="700" actId="1076"/>
+          <ac:spMkLst>
+            <pc:docMk/>
+            <pc:sldMk cId="736734725" sldId="259"/>
+            <ac:spMk id="22" creationId="{2092905E-42E7-474A-F4A1-E7A4ABBFDE6C}"/>
+          </ac:spMkLst>
+        </pc:spChg>
+        <pc:spChg chg="add mod">
+          <ac:chgData name="Ravi Potes Mangra" userId="f6c3e66e-970a-4dac-abef-28c459f30976" providerId="ADAL" clId="{B2C1E8EB-EB94-44CA-9F50-E86E778B07B8}" dt="2026-02-01T02:09:27.271" v="700" actId="1076"/>
+          <ac:spMkLst>
+            <pc:docMk/>
+            <pc:sldMk cId="736734725" sldId="259"/>
+            <ac:spMk id="23" creationId="{05DE5635-BAA2-59B7-2934-62F14E624DED}"/>
+          </ac:spMkLst>
+        </pc:spChg>
+        <pc:spChg chg="add mod">
+          <ac:chgData name="Ravi Potes Mangra" userId="f6c3e66e-970a-4dac-abef-28c459f30976" providerId="ADAL" clId="{B2C1E8EB-EB94-44CA-9F50-E86E778B07B8}" dt="2026-02-01T02:09:27.271" v="700" actId="1076"/>
+          <ac:spMkLst>
+            <pc:docMk/>
+            <pc:sldMk cId="736734725" sldId="259"/>
+            <ac:spMk id="24" creationId="{D58235B9-5C16-C710-7975-5E7383672CA0}"/>
+          </ac:spMkLst>
+        </pc:spChg>
+        <pc:spChg chg="add mod">
+          <ac:chgData name="Ravi Potes Mangra" userId="f6c3e66e-970a-4dac-abef-28c459f30976" providerId="ADAL" clId="{B2C1E8EB-EB94-44CA-9F50-E86E778B07B8}" dt="2026-01-31T21:11:55.444" v="603" actId="1076"/>
+          <ac:spMkLst>
+            <pc:docMk/>
+            <pc:sldMk cId="736734725" sldId="259"/>
+            <ac:spMk id="25" creationId="{0E2BB12F-4858-E825-0DBE-5ED4135EA713}"/>
+          </ac:spMkLst>
+        </pc:spChg>
+        <pc:spChg chg="add mod">
+          <ac:chgData name="Ravi Potes Mangra" userId="f6c3e66e-970a-4dac-abef-28c459f30976" providerId="ADAL" clId="{B2C1E8EB-EB94-44CA-9F50-E86E778B07B8}" dt="2026-02-01T02:09:27.271" v="700" actId="1076"/>
+          <ac:spMkLst>
+            <pc:docMk/>
+            <pc:sldMk cId="736734725" sldId="259"/>
+            <ac:spMk id="26" creationId="{ABEF90B0-974C-F254-8BFE-F6756AB6069E}"/>
+          </ac:spMkLst>
+        </pc:spChg>
+      </pc:sldChg>
+      <pc:sldChg chg="new">
+        <pc:chgData name="Ravi Potes Mangra" userId="f6c3e66e-970a-4dac-abef-28c459f30976" providerId="ADAL" clId="{B2C1E8EB-EB94-44CA-9F50-E86E778B07B8}" dt="2026-01-31T21:13:23.509" v="604" actId="680"/>
+        <pc:sldMkLst>
+          <pc:docMk/>
+          <pc:sldMk cId="213476011" sldId="260"/>
+        </pc:sldMkLst>
+      </pc:sldChg>
+      <pc:sldChg chg="new">
+        <pc:chgData name="Ravi Potes Mangra" userId="f6c3e66e-970a-4dac-abef-28c459f30976" providerId="ADAL" clId="{B2C1E8EB-EB94-44CA-9F50-E86E778B07B8}" dt="2026-01-31T21:47:15.689" v="605" actId="680"/>
+        <pc:sldMkLst>
+          <pc:docMk/>
+          <pc:sldMk cId="2366562482" sldId="261"/>
+        </pc:sldMkLst>
+      </pc:sldChg>
+      <pc:sldChg chg="new">
+        <pc:chgData name="Ravi Potes Mangra" userId="f6c3e66e-970a-4dac-abef-28c459f30976" providerId="ADAL" clId="{B2C1E8EB-EB94-44CA-9F50-E86E778B07B8}" dt="2026-01-31T21:47:15.784" v="606" actId="680"/>
+        <pc:sldMkLst>
+          <pc:docMk/>
+          <pc:sldMk cId="3733978778" sldId="262"/>
+        </pc:sldMkLst>
+      </pc:sldChg>
+      <pc:sldChg chg="addSp modSp new mod">
+        <pc:chgData name="Ravi Potes Mangra" userId="f6c3e66e-970a-4dac-abef-28c459f30976" providerId="ADAL" clId="{B2C1E8EB-EB94-44CA-9F50-E86E778B07B8}" dt="2026-02-01T03:20:39.460" v="839" actId="1076"/>
+        <pc:sldMkLst>
+          <pc:docMk/>
+          <pc:sldMk cId="4120626109" sldId="263"/>
+        </pc:sldMkLst>
+        <pc:spChg chg="add mod">
+          <ac:chgData name="Ravi Potes Mangra" userId="f6c3e66e-970a-4dac-abef-28c459f30976" providerId="ADAL" clId="{B2C1E8EB-EB94-44CA-9F50-E86E778B07B8}" dt="2026-02-01T03:20:39.460" v="839" actId="1076"/>
+          <ac:spMkLst>
+            <pc:docMk/>
+            <pc:sldMk cId="4120626109" sldId="263"/>
+            <ac:spMk id="2" creationId="{36A7F0F6-EFBF-C6C2-E8E0-9F028DA514EB}"/>
+          </ac:spMkLst>
+        </pc:spChg>
+        <pc:spChg chg="add mod">
+          <ac:chgData name="Ravi Potes Mangra" userId="f6c3e66e-970a-4dac-abef-28c459f30976" providerId="ADAL" clId="{B2C1E8EB-EB94-44CA-9F50-E86E778B07B8}" dt="2026-02-01T02:11:54.472" v="726" actId="1076"/>
+          <ac:spMkLst>
+            <pc:docMk/>
+            <pc:sldMk cId="4120626109" sldId="263"/>
+            <ac:spMk id="3" creationId="{530679A3-3D79-EA5C-B80B-EF36C7E8EA56}"/>
+          </ac:spMkLst>
+        </pc:spChg>
+        <pc:spChg chg="add mod">
+          <ac:chgData name="Ravi Potes Mangra" userId="f6c3e66e-970a-4dac-abef-28c459f30976" providerId="ADAL" clId="{B2C1E8EB-EB94-44CA-9F50-E86E778B07B8}" dt="2026-02-01T02:12:09.013" v="739" actId="20577"/>
+          <ac:spMkLst>
+            <pc:docMk/>
+            <pc:sldMk cId="4120626109" sldId="263"/>
+            <ac:spMk id="4" creationId="{AB60F40C-87F0-411D-2AD0-C94C62A9786B}"/>
+          </ac:spMkLst>
+        </pc:spChg>
+        <pc:spChg chg="add mod">
+          <ac:chgData name="Ravi Potes Mangra" userId="f6c3e66e-970a-4dac-abef-28c459f30976" providerId="ADAL" clId="{B2C1E8EB-EB94-44CA-9F50-E86E778B07B8}" dt="2026-02-01T02:12:24.560" v="756" actId="20577"/>
+          <ac:spMkLst>
+            <pc:docMk/>
+            <pc:sldMk cId="4120626109" sldId="263"/>
+            <ac:spMk id="5" creationId="{9803A4DF-D167-9B22-36DB-86CDA45A569C}"/>
+          </ac:spMkLst>
+        </pc:spChg>
+        <pc:spChg chg="add mod">
+          <ac:chgData name="Ravi Potes Mangra" userId="f6c3e66e-970a-4dac-abef-28c459f30976" providerId="ADAL" clId="{B2C1E8EB-EB94-44CA-9F50-E86E778B07B8}" dt="2026-02-01T02:12:35.008" v="770" actId="1076"/>
+          <ac:spMkLst>
+            <pc:docMk/>
+            <pc:sldMk cId="4120626109" sldId="263"/>
+            <ac:spMk id="6" creationId="{D6E71A10-A70C-0663-9B16-D3B3D1E41420}"/>
+          </ac:spMkLst>
+        </pc:spChg>
+        <pc:spChg chg="add mod">
+          <ac:chgData name="Ravi Potes Mangra" userId="f6c3e66e-970a-4dac-abef-28c459f30976" providerId="ADAL" clId="{B2C1E8EB-EB94-44CA-9F50-E86E778B07B8}" dt="2026-02-01T02:12:43.920" v="776" actId="1076"/>
+          <ac:spMkLst>
+            <pc:docMk/>
+            <pc:sldMk cId="4120626109" sldId="263"/>
+            <ac:spMk id="7" creationId="{2A578000-AA8E-8495-3106-19FC2D267745}"/>
+          </ac:spMkLst>
+        </pc:spChg>
+        <pc:spChg chg="add mod">
+          <ac:chgData name="Ravi Potes Mangra" userId="f6c3e66e-970a-4dac-abef-28c459f30976" providerId="ADAL" clId="{B2C1E8EB-EB94-44CA-9F50-E86E778B07B8}" dt="2026-02-01T02:12:42.036" v="775" actId="1076"/>
+          <ac:spMkLst>
+            <pc:docMk/>
+            <pc:sldMk cId="4120626109" sldId="263"/>
+            <ac:spMk id="8" creationId="{9B147552-BEA4-EB48-5094-27CBCFF252C7}"/>
+          </ac:spMkLst>
+        </pc:spChg>
+        <pc:spChg chg="add mod">
+          <ac:chgData name="Ravi Potes Mangra" userId="f6c3e66e-970a-4dac-abef-28c459f30976" providerId="ADAL" clId="{B2C1E8EB-EB94-44CA-9F50-E86E778B07B8}" dt="2026-02-01T02:12:58.631" v="786" actId="20577"/>
+          <ac:spMkLst>
+            <pc:docMk/>
+            <pc:sldMk cId="4120626109" sldId="263"/>
+            <ac:spMk id="9" creationId="{5F7E0BC9-3DFB-2BD0-13DF-C54ADB261B02}"/>
+          </ac:spMkLst>
+        </pc:spChg>
+        <pc:spChg chg="add mod">
+          <ac:chgData name="Ravi Potes Mangra" userId="f6c3e66e-970a-4dac-abef-28c459f30976" providerId="ADAL" clId="{B2C1E8EB-EB94-44CA-9F50-E86E778B07B8}" dt="2026-02-01T02:13:05.161" v="793" actId="1076"/>
+          <ac:spMkLst>
+            <pc:docMk/>
+            <pc:sldMk cId="4120626109" sldId="263"/>
+            <ac:spMk id="10" creationId="{9988E0EF-31D1-460B-9095-6A1B266010D4}"/>
+          </ac:spMkLst>
+        </pc:spChg>
+      </pc:sldChg>
+    </pc:docChg>
+  </pc:docChgLst>
+</pc:chgInfo>
 </file>
 
 <file path=ppt/slideLayouts/slideLayout1.xml><?xml version="1.0" encoding="utf-8"?>
@@ -3335,7 +4089,7 @@
         </p:nvSpPr>
         <p:spPr>
           <a:xfrm>
-            <a:off x="3535680" y="289560"/>
+            <a:off x="1715269" y="568525"/>
             <a:ext cx="5120640" cy="646331"/>
           </a:xfrm>
           <a:prstGeom prst="rect">
@@ -3375,7 +4129,7 @@
         </p:nvSpPr>
         <p:spPr>
           <a:xfrm>
-            <a:off x="1767840" y="1278374"/>
+            <a:off x="1793007" y="1882381"/>
             <a:ext cx="8877300" cy="518160"/>
           </a:xfrm>
           <a:prstGeom prst="rect">
@@ -3421,7 +4175,7 @@
         </p:nvSpPr>
         <p:spPr>
           <a:xfrm>
-            <a:off x="2171700" y="1383268"/>
+            <a:off x="2196867" y="1987275"/>
             <a:ext cx="1165860" cy="369332"/>
           </a:xfrm>
           <a:prstGeom prst="rect">
@@ -3460,7 +4214,7 @@
         </p:nvSpPr>
         <p:spPr>
           <a:xfrm>
-            <a:off x="5619750" y="1352788"/>
+            <a:off x="5644917" y="1956795"/>
             <a:ext cx="1630680" cy="369332"/>
           </a:xfrm>
           <a:prstGeom prst="rect">
@@ -3499,7 +4253,7 @@
         </p:nvSpPr>
         <p:spPr>
           <a:xfrm>
-            <a:off x="9235440" y="1351002"/>
+            <a:off x="9260607" y="1955009"/>
             <a:ext cx="1630680" cy="369332"/>
           </a:xfrm>
           <a:prstGeom prst="rect">
@@ -3538,7 +4292,7 @@
         </p:nvSpPr>
         <p:spPr>
           <a:xfrm>
-            <a:off x="1767840" y="2223254"/>
+            <a:off x="1793007" y="2827261"/>
             <a:ext cx="8877300" cy="518160"/>
           </a:xfrm>
           <a:prstGeom prst="rect">
@@ -3584,7 +4338,7 @@
         </p:nvSpPr>
         <p:spPr>
           <a:xfrm>
-            <a:off x="2171700" y="2328148"/>
+            <a:off x="2196867" y="2932155"/>
             <a:ext cx="1165860" cy="369332"/>
           </a:xfrm>
           <a:prstGeom prst="rect">
@@ -3623,7 +4377,7 @@
         </p:nvSpPr>
         <p:spPr>
           <a:xfrm>
-            <a:off x="5619750" y="2297668"/>
+            <a:off x="5644917" y="2901675"/>
             <a:ext cx="1630680" cy="369332"/>
           </a:xfrm>
           <a:prstGeom prst="rect">
@@ -3662,7 +4416,7 @@
         </p:nvSpPr>
         <p:spPr>
           <a:xfrm>
-            <a:off x="9235440" y="2295882"/>
+            <a:off x="9260607" y="2899889"/>
             <a:ext cx="1630680" cy="369332"/>
           </a:xfrm>
           <a:prstGeom prst="rect">
@@ -3701,7 +4455,7 @@
         </p:nvSpPr>
         <p:spPr>
           <a:xfrm>
-            <a:off x="1767840" y="3223736"/>
+            <a:off x="1793007" y="3827743"/>
             <a:ext cx="8877300" cy="518160"/>
           </a:xfrm>
           <a:prstGeom prst="rect">
@@ -3747,7 +4501,7 @@
         </p:nvSpPr>
         <p:spPr>
           <a:xfrm>
-            <a:off x="2179320" y="3328630"/>
+            <a:off x="2204487" y="3932637"/>
             <a:ext cx="1165860" cy="369332"/>
           </a:xfrm>
           <a:prstGeom prst="rect">
@@ -3786,7 +4540,7 @@
         </p:nvSpPr>
         <p:spPr>
           <a:xfrm>
-            <a:off x="5619750" y="3298150"/>
+            <a:off x="5644917" y="3902157"/>
             <a:ext cx="1630680" cy="369332"/>
           </a:xfrm>
           <a:prstGeom prst="rect">
@@ -3825,7 +4579,7 @@
         </p:nvSpPr>
         <p:spPr>
           <a:xfrm>
-            <a:off x="9235440" y="3296364"/>
+            <a:off x="9260607" y="3900371"/>
             <a:ext cx="1630680" cy="369332"/>
           </a:xfrm>
           <a:prstGeom prst="rect">
@@ -3864,8 +4618,8 @@
         </p:nvSpPr>
         <p:spPr>
           <a:xfrm>
-            <a:off x="8263890" y="266224"/>
-            <a:ext cx="1943100" cy="436602"/>
+            <a:off x="7458547" y="213360"/>
+            <a:ext cx="1560352" cy="436602"/>
           </a:xfrm>
           <a:prstGeom prst="rect">
             <a:avLst/>
@@ -3899,10 +4653,3368 @@
           </a:p>
         </p:txBody>
       </p:sp>
+      <p:sp>
+        <p:nvSpPr>
+          <p:cNvPr id="2" name="Rectangle 1">
+            <a:extLst>
+              <a:ext uri="{FF2B5EF4-FFF2-40B4-BE49-F238E27FC236}">
+                <a16:creationId xmlns:a16="http://schemas.microsoft.com/office/drawing/2014/main" id="{3AB22F64-D73E-39DB-1D97-F710AF4F5BD2}"/>
+              </a:ext>
+            </a:extLst>
+          </p:cNvPr>
+          <p:cNvSpPr/>
+          <p:nvPr/>
+        </p:nvSpPr>
+        <p:spPr>
+          <a:xfrm>
+            <a:off x="7458547" y="762715"/>
+            <a:ext cx="1560352" cy="430947"/>
+          </a:xfrm>
+          <a:prstGeom prst="rect">
+            <a:avLst/>
+          </a:prstGeom>
+        </p:spPr>
+        <p:style>
+          <a:lnRef idx="2">
+            <a:schemeClr val="accent1">
+              <a:shade val="15000"/>
+            </a:schemeClr>
+          </a:lnRef>
+          <a:fillRef idx="1">
+            <a:schemeClr val="accent1"/>
+          </a:fillRef>
+          <a:effectRef idx="0">
+            <a:schemeClr val="accent1"/>
+          </a:effectRef>
+          <a:fontRef idx="minor">
+            <a:schemeClr val="lt1"/>
+          </a:fontRef>
+        </p:style>
+        <p:txBody>
+          <a:bodyPr rtlCol="0" anchor="ctr"/>
+          <a:lstStyle/>
+          <a:p>
+            <a:pPr algn="ctr"/>
+            <a:r>
+              <a:rPr lang="en-US" dirty="0"/>
+              <a:t>Delete Term</a:t>
+            </a:r>
+          </a:p>
+        </p:txBody>
+      </p:sp>
     </p:spTree>
     <p:extLst>
       <p:ext uri="{BB962C8B-B14F-4D97-AF65-F5344CB8AC3E}">
         <p14:creationId xmlns:p14="http://schemas.microsoft.com/office/powerpoint/2010/main" val="1383786992"/>
+      </p:ext>
+    </p:extLst>
+  </p:cSld>
+  <p:clrMapOvr>
+    <a:masterClrMapping/>
+  </p:clrMapOvr>
+</p:sld>
+</file>
+
+<file path=ppt/slides/slide2.xml><?xml version="1.0" encoding="utf-8"?>
+<p:sld xmlns:a="http://schemas.openxmlformats.org/drawingml/2006/main" xmlns:r="http://schemas.openxmlformats.org/officeDocument/2006/relationships" xmlns:p="http://schemas.openxmlformats.org/presentationml/2006/main">
+  <p:cSld>
+    <p:spTree>
+      <p:nvGrpSpPr>
+        <p:cNvPr id="1" name=""/>
+        <p:cNvGrpSpPr/>
+        <p:nvPr/>
+      </p:nvGrpSpPr>
+      <p:grpSpPr>
+        <a:xfrm>
+          <a:off x="0" y="0"/>
+          <a:ext cx="0" cy="0"/>
+          <a:chOff x="0" y="0"/>
+          <a:chExt cx="0" cy="0"/>
+        </a:xfrm>
+      </p:grpSpPr>
+      <p:sp>
+        <p:nvSpPr>
+          <p:cNvPr id="2" name="TextBox 1">
+            <a:extLst>
+              <a:ext uri="{FF2B5EF4-FFF2-40B4-BE49-F238E27FC236}">
+                <a16:creationId xmlns:a16="http://schemas.microsoft.com/office/drawing/2014/main" id="{36A7F0F6-EFBF-C6C2-E8E0-9F028DA514EB}"/>
+              </a:ext>
+            </a:extLst>
+          </p:cNvPr>
+          <p:cNvSpPr txBox="1"/>
+          <p:nvPr/>
+        </p:nvSpPr>
+        <p:spPr>
+          <a:xfrm>
+            <a:off x="4636315" y="454696"/>
+            <a:ext cx="2242658" cy="369332"/>
+          </a:xfrm>
+          <a:prstGeom prst="rect">
+            <a:avLst/>
+          </a:prstGeom>
+          <a:noFill/>
+        </p:spPr>
+        <p:txBody>
+          <a:bodyPr wrap="square" rtlCol="0">
+            <a:spAutoFit/>
+          </a:bodyPr>
+          <a:lstStyle/>
+          <a:p>
+            <a:r>
+              <a:rPr lang="en-US" dirty="0"/>
+              <a:t>Add/Modify Term  </a:t>
+            </a:r>
+          </a:p>
+        </p:txBody>
+      </p:sp>
+      <p:sp>
+        <p:nvSpPr>
+          <p:cNvPr id="3" name="Rectangle 2">
+            <a:extLst>
+              <a:ext uri="{FF2B5EF4-FFF2-40B4-BE49-F238E27FC236}">
+                <a16:creationId xmlns:a16="http://schemas.microsoft.com/office/drawing/2014/main" id="{530679A3-3D79-EA5C-B80B-EF36C7E8EA56}"/>
+              </a:ext>
+            </a:extLst>
+          </p:cNvPr>
+          <p:cNvSpPr/>
+          <p:nvPr/>
+        </p:nvSpPr>
+        <p:spPr>
+          <a:xfrm>
+            <a:off x="2827090" y="1333849"/>
+            <a:ext cx="6023296" cy="402672"/>
+          </a:xfrm>
+          <a:prstGeom prst="rect">
+            <a:avLst/>
+          </a:prstGeom>
+        </p:spPr>
+        <p:style>
+          <a:lnRef idx="2">
+            <a:schemeClr val="accent1">
+              <a:shade val="15000"/>
+            </a:schemeClr>
+          </a:lnRef>
+          <a:fillRef idx="1">
+            <a:schemeClr val="accent1"/>
+          </a:fillRef>
+          <a:effectRef idx="0">
+            <a:schemeClr val="accent1"/>
+          </a:effectRef>
+          <a:fontRef idx="minor">
+            <a:schemeClr val="lt1"/>
+          </a:fontRef>
+        </p:style>
+        <p:txBody>
+          <a:bodyPr rtlCol="0" anchor="ctr"/>
+          <a:lstStyle/>
+          <a:p>
+            <a:pPr algn="ctr"/>
+            <a:endParaRPr lang="en-US"/>
+          </a:p>
+        </p:txBody>
+      </p:sp>
+      <p:sp>
+        <p:nvSpPr>
+          <p:cNvPr id="4" name="TextBox 3">
+            <a:extLst>
+              <a:ext uri="{FF2B5EF4-FFF2-40B4-BE49-F238E27FC236}">
+                <a16:creationId xmlns:a16="http://schemas.microsoft.com/office/drawing/2014/main" id="{AB60F40C-87F0-411D-2AD0-C94C62A9786B}"/>
+              </a:ext>
+            </a:extLst>
+          </p:cNvPr>
+          <p:cNvSpPr txBox="1"/>
+          <p:nvPr/>
+        </p:nvSpPr>
+        <p:spPr>
+          <a:xfrm>
+            <a:off x="713064" y="1333849"/>
+            <a:ext cx="1593908" cy="369332"/>
+          </a:xfrm>
+          <a:prstGeom prst="rect">
+            <a:avLst/>
+          </a:prstGeom>
+          <a:noFill/>
+        </p:spPr>
+        <p:txBody>
+          <a:bodyPr wrap="square" rtlCol="0">
+            <a:spAutoFit/>
+          </a:bodyPr>
+          <a:lstStyle/>
+          <a:p>
+            <a:r>
+              <a:rPr lang="en-US" dirty="0"/>
+              <a:t>Term number:</a:t>
+            </a:r>
+          </a:p>
+        </p:txBody>
+      </p:sp>
+      <p:sp>
+        <p:nvSpPr>
+          <p:cNvPr id="5" name="TextBox 4">
+            <a:extLst>
+              <a:ext uri="{FF2B5EF4-FFF2-40B4-BE49-F238E27FC236}">
+                <a16:creationId xmlns:a16="http://schemas.microsoft.com/office/drawing/2014/main" id="{9803A4DF-D167-9B22-36DB-86CDA45A569C}"/>
+              </a:ext>
+            </a:extLst>
+          </p:cNvPr>
+          <p:cNvSpPr txBox="1"/>
+          <p:nvPr/>
+        </p:nvSpPr>
+        <p:spPr>
+          <a:xfrm>
+            <a:off x="713064" y="2157368"/>
+            <a:ext cx="1593908" cy="369332"/>
+          </a:xfrm>
+          <a:prstGeom prst="rect">
+            <a:avLst/>
+          </a:prstGeom>
+          <a:noFill/>
+        </p:spPr>
+        <p:txBody>
+          <a:bodyPr wrap="square" rtlCol="0">
+            <a:spAutoFit/>
+          </a:bodyPr>
+          <a:lstStyle/>
+          <a:p>
+            <a:r>
+              <a:rPr lang="en-US" dirty="0"/>
+              <a:t>Start Date:</a:t>
+            </a:r>
+          </a:p>
+        </p:txBody>
+      </p:sp>
+      <p:sp>
+        <p:nvSpPr>
+          <p:cNvPr id="6" name="TextBox 5">
+            <a:extLst>
+              <a:ext uri="{FF2B5EF4-FFF2-40B4-BE49-F238E27FC236}">
+                <a16:creationId xmlns:a16="http://schemas.microsoft.com/office/drawing/2014/main" id="{D6E71A10-A70C-0663-9B16-D3B3D1E41420}"/>
+              </a:ext>
+            </a:extLst>
+          </p:cNvPr>
+          <p:cNvSpPr txBox="1"/>
+          <p:nvPr/>
+        </p:nvSpPr>
+        <p:spPr>
+          <a:xfrm>
+            <a:off x="713064" y="2880111"/>
+            <a:ext cx="1593908" cy="369332"/>
+          </a:xfrm>
+          <a:prstGeom prst="rect">
+            <a:avLst/>
+          </a:prstGeom>
+          <a:noFill/>
+        </p:spPr>
+        <p:txBody>
+          <a:bodyPr wrap="square" rtlCol="0">
+            <a:spAutoFit/>
+          </a:bodyPr>
+          <a:lstStyle/>
+          <a:p>
+            <a:r>
+              <a:rPr lang="en-US" dirty="0"/>
+              <a:t>End date:</a:t>
+            </a:r>
+          </a:p>
+        </p:txBody>
+      </p:sp>
+      <p:sp>
+        <p:nvSpPr>
+          <p:cNvPr id="7" name="Rectangle 6">
+            <a:extLst>
+              <a:ext uri="{FF2B5EF4-FFF2-40B4-BE49-F238E27FC236}">
+                <a16:creationId xmlns:a16="http://schemas.microsoft.com/office/drawing/2014/main" id="{2A578000-AA8E-8495-3106-19FC2D267745}"/>
+              </a:ext>
+            </a:extLst>
+          </p:cNvPr>
+          <p:cNvSpPr/>
+          <p:nvPr/>
+        </p:nvSpPr>
+        <p:spPr>
+          <a:xfrm>
+            <a:off x="2827090" y="2044062"/>
+            <a:ext cx="6023296" cy="402672"/>
+          </a:xfrm>
+          <a:prstGeom prst="rect">
+            <a:avLst/>
+          </a:prstGeom>
+        </p:spPr>
+        <p:style>
+          <a:lnRef idx="2">
+            <a:schemeClr val="accent1">
+              <a:shade val="15000"/>
+            </a:schemeClr>
+          </a:lnRef>
+          <a:fillRef idx="1">
+            <a:schemeClr val="accent1"/>
+          </a:fillRef>
+          <a:effectRef idx="0">
+            <a:schemeClr val="accent1"/>
+          </a:effectRef>
+          <a:fontRef idx="minor">
+            <a:schemeClr val="lt1"/>
+          </a:fontRef>
+        </p:style>
+        <p:txBody>
+          <a:bodyPr rtlCol="0" anchor="ctr"/>
+          <a:lstStyle/>
+          <a:p>
+            <a:pPr algn="ctr"/>
+            <a:endParaRPr lang="en-US"/>
+          </a:p>
+        </p:txBody>
+      </p:sp>
+      <p:sp>
+        <p:nvSpPr>
+          <p:cNvPr id="8" name="Rectangle 7">
+            <a:extLst>
+              <a:ext uri="{FF2B5EF4-FFF2-40B4-BE49-F238E27FC236}">
+                <a16:creationId xmlns:a16="http://schemas.microsoft.com/office/drawing/2014/main" id="{9B147552-BEA4-EB48-5094-27CBCFF252C7}"/>
+              </a:ext>
+            </a:extLst>
+          </p:cNvPr>
+          <p:cNvSpPr/>
+          <p:nvPr/>
+        </p:nvSpPr>
+        <p:spPr>
+          <a:xfrm>
+            <a:off x="2827090" y="2754276"/>
+            <a:ext cx="6023296" cy="402672"/>
+          </a:xfrm>
+          <a:prstGeom prst="rect">
+            <a:avLst/>
+          </a:prstGeom>
+        </p:spPr>
+        <p:style>
+          <a:lnRef idx="2">
+            <a:schemeClr val="accent1">
+              <a:shade val="15000"/>
+            </a:schemeClr>
+          </a:lnRef>
+          <a:fillRef idx="1">
+            <a:schemeClr val="accent1"/>
+          </a:fillRef>
+          <a:effectRef idx="0">
+            <a:schemeClr val="accent1"/>
+          </a:effectRef>
+          <a:fontRef idx="minor">
+            <a:schemeClr val="lt1"/>
+          </a:fontRef>
+        </p:style>
+        <p:txBody>
+          <a:bodyPr rtlCol="0" anchor="ctr"/>
+          <a:lstStyle/>
+          <a:p>
+            <a:pPr algn="ctr"/>
+            <a:endParaRPr lang="en-US"/>
+          </a:p>
+        </p:txBody>
+      </p:sp>
+      <p:sp>
+        <p:nvSpPr>
+          <p:cNvPr id="9" name="Rectangle 8">
+            <a:extLst>
+              <a:ext uri="{FF2B5EF4-FFF2-40B4-BE49-F238E27FC236}">
+                <a16:creationId xmlns:a16="http://schemas.microsoft.com/office/drawing/2014/main" id="{5F7E0BC9-3DFB-2BD0-13DF-C54ADB261B02}"/>
+              </a:ext>
+            </a:extLst>
+          </p:cNvPr>
+          <p:cNvSpPr/>
+          <p:nvPr/>
+        </p:nvSpPr>
+        <p:spPr>
+          <a:xfrm>
+            <a:off x="4225254" y="3807259"/>
+            <a:ext cx="1157681" cy="402672"/>
+          </a:xfrm>
+          <a:prstGeom prst="rect">
+            <a:avLst/>
+          </a:prstGeom>
+        </p:spPr>
+        <p:style>
+          <a:lnRef idx="2">
+            <a:schemeClr val="accent1">
+              <a:shade val="15000"/>
+            </a:schemeClr>
+          </a:lnRef>
+          <a:fillRef idx="1">
+            <a:schemeClr val="accent1"/>
+          </a:fillRef>
+          <a:effectRef idx="0">
+            <a:schemeClr val="accent1"/>
+          </a:effectRef>
+          <a:fontRef idx="minor">
+            <a:schemeClr val="lt1"/>
+          </a:fontRef>
+        </p:style>
+        <p:txBody>
+          <a:bodyPr rtlCol="0" anchor="ctr"/>
+          <a:lstStyle/>
+          <a:p>
+            <a:pPr algn="ctr"/>
+            <a:r>
+              <a:rPr lang="en-US" dirty="0"/>
+              <a:t>Save</a:t>
+            </a:r>
+          </a:p>
+        </p:txBody>
+      </p:sp>
+      <p:sp>
+        <p:nvSpPr>
+          <p:cNvPr id="10" name="Rectangle 9">
+            <a:extLst>
+              <a:ext uri="{FF2B5EF4-FFF2-40B4-BE49-F238E27FC236}">
+                <a16:creationId xmlns:a16="http://schemas.microsoft.com/office/drawing/2014/main" id="{9988E0EF-31D1-460B-9095-6A1B266010D4}"/>
+              </a:ext>
+            </a:extLst>
+          </p:cNvPr>
+          <p:cNvSpPr/>
+          <p:nvPr/>
+        </p:nvSpPr>
+        <p:spPr>
+          <a:xfrm>
+            <a:off x="5838738" y="3807259"/>
+            <a:ext cx="1157681" cy="402672"/>
+          </a:xfrm>
+          <a:prstGeom prst="rect">
+            <a:avLst/>
+          </a:prstGeom>
+        </p:spPr>
+        <p:style>
+          <a:lnRef idx="2">
+            <a:schemeClr val="accent1">
+              <a:shade val="15000"/>
+            </a:schemeClr>
+          </a:lnRef>
+          <a:fillRef idx="1">
+            <a:schemeClr val="accent1"/>
+          </a:fillRef>
+          <a:effectRef idx="0">
+            <a:schemeClr val="accent1"/>
+          </a:effectRef>
+          <a:fontRef idx="minor">
+            <a:schemeClr val="lt1"/>
+          </a:fontRef>
+        </p:style>
+        <p:txBody>
+          <a:bodyPr rtlCol="0" anchor="ctr"/>
+          <a:lstStyle/>
+          <a:p>
+            <a:pPr algn="ctr"/>
+            <a:r>
+              <a:rPr lang="en-US" dirty="0"/>
+              <a:t>Cancel</a:t>
+            </a:r>
+          </a:p>
+        </p:txBody>
+      </p:sp>
+    </p:spTree>
+    <p:extLst>
+      <p:ext uri="{BB962C8B-B14F-4D97-AF65-F5344CB8AC3E}">
+        <p14:creationId xmlns:p14="http://schemas.microsoft.com/office/powerpoint/2010/main" val="4120626109"/>
+      </p:ext>
+    </p:extLst>
+  </p:cSld>
+  <p:clrMapOvr>
+    <a:masterClrMapping/>
+  </p:clrMapOvr>
+</p:sld>
+</file>
+
+<file path=ppt/slides/slide3.xml><?xml version="1.0" encoding="utf-8"?>
+<p:sld xmlns:a="http://schemas.openxmlformats.org/drawingml/2006/main" xmlns:r="http://schemas.openxmlformats.org/officeDocument/2006/relationships" xmlns:p="http://schemas.openxmlformats.org/presentationml/2006/main">
+  <p:cSld>
+    <p:spTree>
+      <p:nvGrpSpPr>
+        <p:cNvPr id="1" name=""/>
+        <p:cNvGrpSpPr/>
+        <p:nvPr/>
+      </p:nvGrpSpPr>
+      <p:grpSpPr>
+        <a:xfrm>
+          <a:off x="0" y="0"/>
+          <a:ext cx="0" cy="0"/>
+          <a:chOff x="0" y="0"/>
+          <a:chExt cx="0" cy="0"/>
+        </a:xfrm>
+      </p:grpSpPr>
+      <p:sp>
+        <p:nvSpPr>
+          <p:cNvPr id="2" name="Arrow: Right 1">
+            <a:extLst>
+              <a:ext uri="{FF2B5EF4-FFF2-40B4-BE49-F238E27FC236}">
+                <a16:creationId xmlns:a16="http://schemas.microsoft.com/office/drawing/2014/main" id="{CCB0E521-6F20-8624-72FD-FAE1577B962D}"/>
+              </a:ext>
+            </a:extLst>
+          </p:cNvPr>
+          <p:cNvSpPr/>
+          <p:nvPr/>
+        </p:nvSpPr>
+        <p:spPr>
+          <a:xfrm rot="10800000">
+            <a:off x="2537321" y="422673"/>
+            <a:ext cx="1432560" cy="396240"/>
+          </a:xfrm>
+          <a:prstGeom prst="rightArrow">
+            <a:avLst/>
+          </a:prstGeom>
+        </p:spPr>
+        <p:style>
+          <a:lnRef idx="2">
+            <a:schemeClr val="accent1">
+              <a:shade val="15000"/>
+            </a:schemeClr>
+          </a:lnRef>
+          <a:fillRef idx="1">
+            <a:schemeClr val="accent1"/>
+          </a:fillRef>
+          <a:effectRef idx="0">
+            <a:schemeClr val="accent1"/>
+          </a:effectRef>
+          <a:fontRef idx="minor">
+            <a:schemeClr val="lt1"/>
+          </a:fontRef>
+        </p:style>
+        <p:txBody>
+          <a:bodyPr rtlCol="0" anchor="ctr"/>
+          <a:lstStyle/>
+          <a:p>
+            <a:pPr algn="ctr"/>
+            <a:endParaRPr lang="en-US"/>
+          </a:p>
+        </p:txBody>
+      </p:sp>
+      <p:sp>
+        <p:nvSpPr>
+          <p:cNvPr id="3" name="TextBox 2">
+            <a:extLst>
+              <a:ext uri="{FF2B5EF4-FFF2-40B4-BE49-F238E27FC236}">
+                <a16:creationId xmlns:a16="http://schemas.microsoft.com/office/drawing/2014/main" id="{F6422FD3-C6CB-C9C1-E49E-C8FA9C951D78}"/>
+              </a:ext>
+            </a:extLst>
+          </p:cNvPr>
+          <p:cNvSpPr txBox="1"/>
+          <p:nvPr/>
+        </p:nvSpPr>
+        <p:spPr>
+          <a:xfrm>
+            <a:off x="3810489" y="124153"/>
+            <a:ext cx="3588600" cy="646331"/>
+          </a:xfrm>
+          <a:prstGeom prst="rect">
+            <a:avLst/>
+          </a:prstGeom>
+          <a:noFill/>
+        </p:spPr>
+        <p:txBody>
+          <a:bodyPr wrap="square" rtlCol="0">
+            <a:spAutoFit/>
+          </a:bodyPr>
+          <a:lstStyle/>
+          <a:p>
+            <a:pPr algn="ctr"/>
+            <a:r>
+              <a:rPr lang="en-US" dirty="0"/>
+              <a:t>Term X </a:t>
+            </a:r>
+          </a:p>
+          <a:p>
+            <a:pPr algn="ctr"/>
+            <a:r>
+              <a:rPr lang="en-US" dirty="0"/>
+              <a:t>(Each term will have a page)</a:t>
+            </a:r>
+          </a:p>
+        </p:txBody>
+      </p:sp>
+      <p:sp>
+        <p:nvSpPr>
+          <p:cNvPr id="4" name="Rectangle 3">
+            <a:extLst>
+              <a:ext uri="{FF2B5EF4-FFF2-40B4-BE49-F238E27FC236}">
+                <a16:creationId xmlns:a16="http://schemas.microsoft.com/office/drawing/2014/main" id="{AC71F589-FDAE-BCB7-DEEE-529391E5FCFE}"/>
+              </a:ext>
+            </a:extLst>
+          </p:cNvPr>
+          <p:cNvSpPr/>
+          <p:nvPr/>
+        </p:nvSpPr>
+        <p:spPr>
+          <a:xfrm>
+            <a:off x="4062158" y="1788983"/>
+            <a:ext cx="4541520" cy="426720"/>
+          </a:xfrm>
+          <a:prstGeom prst="rect">
+            <a:avLst/>
+          </a:prstGeom>
+        </p:spPr>
+        <p:style>
+          <a:lnRef idx="2">
+            <a:schemeClr val="accent1">
+              <a:shade val="15000"/>
+            </a:schemeClr>
+          </a:lnRef>
+          <a:fillRef idx="1">
+            <a:schemeClr val="accent1"/>
+          </a:fillRef>
+          <a:effectRef idx="0">
+            <a:schemeClr val="accent1"/>
+          </a:effectRef>
+          <a:fontRef idx="minor">
+            <a:schemeClr val="lt1"/>
+          </a:fontRef>
+        </p:style>
+        <p:txBody>
+          <a:bodyPr rtlCol="0" anchor="ctr"/>
+          <a:lstStyle/>
+          <a:p>
+            <a:pPr algn="ctr"/>
+            <a:r>
+              <a:rPr lang="en-US" dirty="0"/>
+              <a:t>Course Name</a:t>
+            </a:r>
+          </a:p>
+        </p:txBody>
+      </p:sp>
+      <p:sp>
+        <p:nvSpPr>
+          <p:cNvPr id="10" name="Rectangle 9">
+            <a:extLst>
+              <a:ext uri="{FF2B5EF4-FFF2-40B4-BE49-F238E27FC236}">
+                <a16:creationId xmlns:a16="http://schemas.microsoft.com/office/drawing/2014/main" id="{FA88CC84-2451-5E39-5F40-DDFD1499D514}"/>
+              </a:ext>
+            </a:extLst>
+          </p:cNvPr>
+          <p:cNvSpPr/>
+          <p:nvPr/>
+        </p:nvSpPr>
+        <p:spPr>
+          <a:xfrm>
+            <a:off x="4062158" y="2408703"/>
+            <a:ext cx="4541520" cy="426720"/>
+          </a:xfrm>
+          <a:prstGeom prst="rect">
+            <a:avLst/>
+          </a:prstGeom>
+        </p:spPr>
+        <p:style>
+          <a:lnRef idx="2">
+            <a:schemeClr val="accent1">
+              <a:shade val="15000"/>
+            </a:schemeClr>
+          </a:lnRef>
+          <a:fillRef idx="1">
+            <a:schemeClr val="accent1"/>
+          </a:fillRef>
+          <a:effectRef idx="0">
+            <a:schemeClr val="accent1"/>
+          </a:effectRef>
+          <a:fontRef idx="minor">
+            <a:schemeClr val="lt1"/>
+          </a:fontRef>
+        </p:style>
+        <p:txBody>
+          <a:bodyPr rtlCol="0" anchor="ctr"/>
+          <a:lstStyle/>
+          <a:p>
+            <a:pPr algn="ctr"/>
+            <a:r>
+              <a:rPr lang="en-US" dirty="0"/>
+              <a:t>Course Name</a:t>
+            </a:r>
+          </a:p>
+        </p:txBody>
+      </p:sp>
+      <p:sp>
+        <p:nvSpPr>
+          <p:cNvPr id="11" name="Rectangle 10">
+            <a:extLst>
+              <a:ext uri="{FF2B5EF4-FFF2-40B4-BE49-F238E27FC236}">
+                <a16:creationId xmlns:a16="http://schemas.microsoft.com/office/drawing/2014/main" id="{0BB7FAF8-D00E-1ED0-AF2B-E2AB8203F630}"/>
+              </a:ext>
+            </a:extLst>
+          </p:cNvPr>
+          <p:cNvSpPr/>
+          <p:nvPr/>
+        </p:nvSpPr>
+        <p:spPr>
+          <a:xfrm>
+            <a:off x="4062158" y="3049735"/>
+            <a:ext cx="4541520" cy="426720"/>
+          </a:xfrm>
+          <a:prstGeom prst="rect">
+            <a:avLst/>
+          </a:prstGeom>
+        </p:spPr>
+        <p:style>
+          <a:lnRef idx="2">
+            <a:schemeClr val="accent1">
+              <a:shade val="15000"/>
+            </a:schemeClr>
+          </a:lnRef>
+          <a:fillRef idx="1">
+            <a:schemeClr val="accent1"/>
+          </a:fillRef>
+          <a:effectRef idx="0">
+            <a:schemeClr val="accent1"/>
+          </a:effectRef>
+          <a:fontRef idx="minor">
+            <a:schemeClr val="lt1"/>
+          </a:fontRef>
+        </p:style>
+        <p:txBody>
+          <a:bodyPr rtlCol="0" anchor="ctr"/>
+          <a:lstStyle/>
+          <a:p>
+            <a:pPr algn="ctr"/>
+            <a:r>
+              <a:rPr lang="en-US" dirty="0"/>
+              <a:t>Course Name</a:t>
+            </a:r>
+          </a:p>
+        </p:txBody>
+      </p:sp>
+      <p:sp>
+        <p:nvSpPr>
+          <p:cNvPr id="12" name="Rectangle 11">
+            <a:extLst>
+              <a:ext uri="{FF2B5EF4-FFF2-40B4-BE49-F238E27FC236}">
+                <a16:creationId xmlns:a16="http://schemas.microsoft.com/office/drawing/2014/main" id="{902B95B8-F1F3-4B08-D454-DE2E4CBB26D3}"/>
+              </a:ext>
+            </a:extLst>
+          </p:cNvPr>
+          <p:cNvSpPr/>
+          <p:nvPr/>
+        </p:nvSpPr>
+        <p:spPr>
+          <a:xfrm>
+            <a:off x="4062158" y="3687195"/>
+            <a:ext cx="4541520" cy="426720"/>
+          </a:xfrm>
+          <a:prstGeom prst="rect">
+            <a:avLst/>
+          </a:prstGeom>
+        </p:spPr>
+        <p:style>
+          <a:lnRef idx="2">
+            <a:schemeClr val="accent1">
+              <a:shade val="15000"/>
+            </a:schemeClr>
+          </a:lnRef>
+          <a:fillRef idx="1">
+            <a:schemeClr val="accent1"/>
+          </a:fillRef>
+          <a:effectRef idx="0">
+            <a:schemeClr val="accent1"/>
+          </a:effectRef>
+          <a:fontRef idx="minor">
+            <a:schemeClr val="lt1"/>
+          </a:fontRef>
+        </p:style>
+        <p:txBody>
+          <a:bodyPr rtlCol="0" anchor="ctr"/>
+          <a:lstStyle/>
+          <a:p>
+            <a:pPr algn="ctr"/>
+            <a:r>
+              <a:rPr lang="en-US" dirty="0"/>
+              <a:t>Course Name</a:t>
+            </a:r>
+          </a:p>
+        </p:txBody>
+      </p:sp>
+      <p:sp>
+        <p:nvSpPr>
+          <p:cNvPr id="13" name="Rectangle 12">
+            <a:extLst>
+              <a:ext uri="{FF2B5EF4-FFF2-40B4-BE49-F238E27FC236}">
+                <a16:creationId xmlns:a16="http://schemas.microsoft.com/office/drawing/2014/main" id="{CDE97DBA-3DF5-FB29-E890-2FFE9EB84EB3}"/>
+              </a:ext>
+            </a:extLst>
+          </p:cNvPr>
+          <p:cNvSpPr/>
+          <p:nvPr/>
+        </p:nvSpPr>
+        <p:spPr>
+          <a:xfrm>
+            <a:off x="4062158" y="4324655"/>
+            <a:ext cx="4541520" cy="426720"/>
+          </a:xfrm>
+          <a:prstGeom prst="rect">
+            <a:avLst/>
+          </a:prstGeom>
+        </p:spPr>
+        <p:style>
+          <a:lnRef idx="2">
+            <a:schemeClr val="accent1">
+              <a:shade val="15000"/>
+            </a:schemeClr>
+          </a:lnRef>
+          <a:fillRef idx="1">
+            <a:schemeClr val="accent1"/>
+          </a:fillRef>
+          <a:effectRef idx="0">
+            <a:schemeClr val="accent1"/>
+          </a:effectRef>
+          <a:fontRef idx="minor">
+            <a:schemeClr val="lt1"/>
+          </a:fontRef>
+        </p:style>
+        <p:txBody>
+          <a:bodyPr rtlCol="0" anchor="ctr"/>
+          <a:lstStyle/>
+          <a:p>
+            <a:pPr algn="ctr"/>
+            <a:r>
+              <a:rPr lang="en-US" dirty="0"/>
+              <a:t>Course Name</a:t>
+            </a:r>
+          </a:p>
+        </p:txBody>
+      </p:sp>
+      <p:sp>
+        <p:nvSpPr>
+          <p:cNvPr id="14" name="Rectangle 13">
+            <a:extLst>
+              <a:ext uri="{FF2B5EF4-FFF2-40B4-BE49-F238E27FC236}">
+                <a16:creationId xmlns:a16="http://schemas.microsoft.com/office/drawing/2014/main" id="{553B0AE4-93B5-7B26-BA76-0B87F6A076E9}"/>
+              </a:ext>
+            </a:extLst>
+          </p:cNvPr>
+          <p:cNvSpPr/>
+          <p:nvPr/>
+        </p:nvSpPr>
+        <p:spPr>
+          <a:xfrm>
+            <a:off x="4062158" y="4962115"/>
+            <a:ext cx="4541520" cy="426720"/>
+          </a:xfrm>
+          <a:prstGeom prst="rect">
+            <a:avLst/>
+          </a:prstGeom>
+        </p:spPr>
+        <p:style>
+          <a:lnRef idx="2">
+            <a:schemeClr val="accent1">
+              <a:shade val="15000"/>
+            </a:schemeClr>
+          </a:lnRef>
+          <a:fillRef idx="1">
+            <a:schemeClr val="accent1"/>
+          </a:fillRef>
+          <a:effectRef idx="0">
+            <a:schemeClr val="accent1"/>
+          </a:effectRef>
+          <a:fontRef idx="minor">
+            <a:schemeClr val="lt1"/>
+          </a:fontRef>
+        </p:style>
+        <p:txBody>
+          <a:bodyPr rtlCol="0" anchor="ctr"/>
+          <a:lstStyle/>
+          <a:p>
+            <a:pPr algn="ctr"/>
+            <a:r>
+              <a:rPr lang="en-US" dirty="0"/>
+              <a:t>Course Name</a:t>
+            </a:r>
+          </a:p>
+        </p:txBody>
+      </p:sp>
+      <p:sp>
+        <p:nvSpPr>
+          <p:cNvPr id="15" name="TextBox 14">
+            <a:extLst>
+              <a:ext uri="{FF2B5EF4-FFF2-40B4-BE49-F238E27FC236}">
+                <a16:creationId xmlns:a16="http://schemas.microsoft.com/office/drawing/2014/main" id="{3A1CB025-AF32-411A-39B7-D13F9BC5F76D}"/>
+              </a:ext>
+            </a:extLst>
+          </p:cNvPr>
+          <p:cNvSpPr txBox="1"/>
+          <p:nvPr/>
+        </p:nvSpPr>
+        <p:spPr>
+          <a:xfrm>
+            <a:off x="4785360" y="647702"/>
+            <a:ext cx="1767840" cy="369332"/>
+          </a:xfrm>
+          <a:prstGeom prst="rect">
+            <a:avLst/>
+          </a:prstGeom>
+          <a:noFill/>
+        </p:spPr>
+        <p:txBody>
+          <a:bodyPr wrap="square" rtlCol="0">
+            <a:spAutoFit/>
+          </a:bodyPr>
+          <a:lstStyle/>
+          <a:p>
+            <a:r>
+              <a:rPr lang="en-US" dirty="0"/>
+              <a:t>Start/End Date</a:t>
+            </a:r>
+          </a:p>
+        </p:txBody>
+      </p:sp>
+      <p:sp>
+        <p:nvSpPr>
+          <p:cNvPr id="16" name="Rectangle 15">
+            <a:extLst>
+              <a:ext uri="{FF2B5EF4-FFF2-40B4-BE49-F238E27FC236}">
+                <a16:creationId xmlns:a16="http://schemas.microsoft.com/office/drawing/2014/main" id="{B1585E54-962B-8F95-0E4D-D537F236FF70}"/>
+              </a:ext>
+            </a:extLst>
+          </p:cNvPr>
+          <p:cNvSpPr/>
+          <p:nvPr/>
+        </p:nvSpPr>
+        <p:spPr>
+          <a:xfrm>
+            <a:off x="7137109" y="241342"/>
+            <a:ext cx="1242060" cy="591026"/>
+          </a:xfrm>
+          <a:prstGeom prst="rect">
+            <a:avLst/>
+          </a:prstGeom>
+        </p:spPr>
+        <p:style>
+          <a:lnRef idx="2">
+            <a:schemeClr val="accent1">
+              <a:shade val="15000"/>
+            </a:schemeClr>
+          </a:lnRef>
+          <a:fillRef idx="1">
+            <a:schemeClr val="accent1"/>
+          </a:fillRef>
+          <a:effectRef idx="0">
+            <a:schemeClr val="accent1"/>
+          </a:effectRef>
+          <a:fontRef idx="minor">
+            <a:schemeClr val="lt1"/>
+          </a:fontRef>
+        </p:style>
+        <p:txBody>
+          <a:bodyPr rtlCol="0" anchor="ctr"/>
+          <a:lstStyle/>
+          <a:p>
+            <a:pPr algn="ctr"/>
+            <a:r>
+              <a:rPr lang="en-US" sz="1100" dirty="0"/>
+              <a:t>Add/Modify Course</a:t>
+            </a:r>
+          </a:p>
+        </p:txBody>
+      </p:sp>
+      <p:sp>
+        <p:nvSpPr>
+          <p:cNvPr id="17" name="Rectangle 16">
+            <a:extLst>
+              <a:ext uri="{FF2B5EF4-FFF2-40B4-BE49-F238E27FC236}">
+                <a16:creationId xmlns:a16="http://schemas.microsoft.com/office/drawing/2014/main" id="{A50FD091-1B33-5F2D-15FA-593E93CE1593}"/>
+              </a:ext>
+            </a:extLst>
+          </p:cNvPr>
+          <p:cNvSpPr/>
+          <p:nvPr/>
+        </p:nvSpPr>
+        <p:spPr>
+          <a:xfrm>
+            <a:off x="7137109" y="949557"/>
+            <a:ext cx="1242060" cy="591026"/>
+          </a:xfrm>
+          <a:prstGeom prst="rect">
+            <a:avLst/>
+          </a:prstGeom>
+        </p:spPr>
+        <p:style>
+          <a:lnRef idx="2">
+            <a:schemeClr val="accent1">
+              <a:shade val="15000"/>
+            </a:schemeClr>
+          </a:lnRef>
+          <a:fillRef idx="1">
+            <a:schemeClr val="accent1"/>
+          </a:fillRef>
+          <a:effectRef idx="0">
+            <a:schemeClr val="accent1"/>
+          </a:effectRef>
+          <a:fontRef idx="minor">
+            <a:schemeClr val="lt1"/>
+          </a:fontRef>
+        </p:style>
+        <p:txBody>
+          <a:bodyPr rtlCol="0" anchor="ctr"/>
+          <a:lstStyle/>
+          <a:p>
+            <a:pPr algn="ctr"/>
+            <a:r>
+              <a:rPr lang="en-US" sz="1100" dirty="0"/>
+              <a:t>Delete Course</a:t>
+            </a:r>
+          </a:p>
+        </p:txBody>
+      </p:sp>
+    </p:spTree>
+    <p:extLst>
+      <p:ext uri="{BB962C8B-B14F-4D97-AF65-F5344CB8AC3E}">
+        <p14:creationId xmlns:p14="http://schemas.microsoft.com/office/powerpoint/2010/main" val="4262359238"/>
+      </p:ext>
+    </p:extLst>
+  </p:cSld>
+  <p:clrMapOvr>
+    <a:masterClrMapping/>
+  </p:clrMapOvr>
+</p:sld>
+</file>
+
+<file path=ppt/slides/slide4.xml><?xml version="1.0" encoding="utf-8"?>
+<p:sld xmlns:a="http://schemas.openxmlformats.org/drawingml/2006/main" xmlns:r="http://schemas.openxmlformats.org/officeDocument/2006/relationships" xmlns:p="http://schemas.openxmlformats.org/presentationml/2006/main">
+  <p:cSld>
+    <p:spTree>
+      <p:nvGrpSpPr>
+        <p:cNvPr id="1" name=""/>
+        <p:cNvGrpSpPr/>
+        <p:nvPr/>
+      </p:nvGrpSpPr>
+      <p:grpSpPr>
+        <a:xfrm>
+          <a:off x="0" y="0"/>
+          <a:ext cx="0" cy="0"/>
+          <a:chOff x="0" y="0"/>
+          <a:chExt cx="0" cy="0"/>
+        </a:xfrm>
+      </p:grpSpPr>
+      <p:sp>
+        <p:nvSpPr>
+          <p:cNvPr id="2" name="Arrow: Right 1">
+            <a:extLst>
+              <a:ext uri="{FF2B5EF4-FFF2-40B4-BE49-F238E27FC236}">
+                <a16:creationId xmlns:a16="http://schemas.microsoft.com/office/drawing/2014/main" id="{6BD37EC0-4641-965A-3CAC-564384996A0E}"/>
+              </a:ext>
+            </a:extLst>
+          </p:cNvPr>
+          <p:cNvSpPr/>
+          <p:nvPr/>
+        </p:nvSpPr>
+        <p:spPr>
+          <a:xfrm rot="10800000">
+            <a:off x="2877564" y="348498"/>
+            <a:ext cx="1432560" cy="396240"/>
+          </a:xfrm>
+          <a:prstGeom prst="rightArrow">
+            <a:avLst/>
+          </a:prstGeom>
+        </p:spPr>
+        <p:style>
+          <a:lnRef idx="2">
+            <a:schemeClr val="accent1">
+              <a:shade val="15000"/>
+            </a:schemeClr>
+          </a:lnRef>
+          <a:fillRef idx="1">
+            <a:schemeClr val="accent1"/>
+          </a:fillRef>
+          <a:effectRef idx="0">
+            <a:schemeClr val="accent1"/>
+          </a:effectRef>
+          <a:fontRef idx="minor">
+            <a:schemeClr val="lt1"/>
+          </a:fontRef>
+        </p:style>
+        <p:txBody>
+          <a:bodyPr rtlCol="0" anchor="ctr"/>
+          <a:lstStyle/>
+          <a:p>
+            <a:pPr algn="ctr"/>
+            <a:endParaRPr lang="en-US"/>
+          </a:p>
+        </p:txBody>
+      </p:sp>
+      <p:sp>
+        <p:nvSpPr>
+          <p:cNvPr id="3" name="TextBox 2">
+            <a:extLst>
+              <a:ext uri="{FF2B5EF4-FFF2-40B4-BE49-F238E27FC236}">
+                <a16:creationId xmlns:a16="http://schemas.microsoft.com/office/drawing/2014/main" id="{C3FC460E-4334-37B2-20A7-7DD8F710C079}"/>
+              </a:ext>
+            </a:extLst>
+          </p:cNvPr>
+          <p:cNvSpPr txBox="1"/>
+          <p:nvPr/>
+        </p:nvSpPr>
+        <p:spPr>
+          <a:xfrm>
+            <a:off x="5558336" y="443384"/>
+            <a:ext cx="2167925" cy="369332"/>
+          </a:xfrm>
+          <a:prstGeom prst="rect">
+            <a:avLst/>
+          </a:prstGeom>
+          <a:noFill/>
+        </p:spPr>
+        <p:txBody>
+          <a:bodyPr wrap="square" rtlCol="0">
+            <a:spAutoFit/>
+          </a:bodyPr>
+          <a:lstStyle/>
+          <a:p>
+            <a:r>
+              <a:rPr lang="en-US" dirty="0"/>
+              <a:t>Add/Modify Course</a:t>
+            </a:r>
+          </a:p>
+        </p:txBody>
+      </p:sp>
+      <p:sp>
+        <p:nvSpPr>
+          <p:cNvPr id="4" name="TextBox 3">
+            <a:extLst>
+              <a:ext uri="{FF2B5EF4-FFF2-40B4-BE49-F238E27FC236}">
+                <a16:creationId xmlns:a16="http://schemas.microsoft.com/office/drawing/2014/main" id="{986BD357-79AA-EB8B-328C-77B7647747F8}"/>
+              </a:ext>
+            </a:extLst>
+          </p:cNvPr>
+          <p:cNvSpPr txBox="1"/>
+          <p:nvPr/>
+        </p:nvSpPr>
+        <p:spPr>
+          <a:xfrm>
+            <a:off x="2877564" y="970527"/>
+            <a:ext cx="1927860" cy="467885"/>
+          </a:xfrm>
+          <a:prstGeom prst="rect">
+            <a:avLst/>
+          </a:prstGeom>
+          <a:noFill/>
+        </p:spPr>
+        <p:txBody>
+          <a:bodyPr wrap="square" rtlCol="0" anchor="ctr">
+            <a:spAutoFit/>
+          </a:bodyPr>
+          <a:lstStyle/>
+          <a:p>
+            <a:pPr>
+              <a:lnSpc>
+                <a:spcPct val="150000"/>
+              </a:lnSpc>
+            </a:pPr>
+            <a:r>
+              <a:rPr lang="en-US" dirty="0"/>
+              <a:t>Course Name:</a:t>
+            </a:r>
+          </a:p>
+        </p:txBody>
+      </p:sp>
+      <p:sp>
+        <p:nvSpPr>
+          <p:cNvPr id="5" name="TextBox 4">
+            <a:extLst>
+              <a:ext uri="{FF2B5EF4-FFF2-40B4-BE49-F238E27FC236}">
+                <a16:creationId xmlns:a16="http://schemas.microsoft.com/office/drawing/2014/main" id="{47FEDB9E-6050-54DB-D07E-8B4184685777}"/>
+              </a:ext>
+            </a:extLst>
+          </p:cNvPr>
+          <p:cNvSpPr txBox="1"/>
+          <p:nvPr/>
+        </p:nvSpPr>
+        <p:spPr>
+          <a:xfrm>
+            <a:off x="2869944" y="1881877"/>
+            <a:ext cx="2072640" cy="467885"/>
+          </a:xfrm>
+          <a:prstGeom prst="rect">
+            <a:avLst/>
+          </a:prstGeom>
+          <a:noFill/>
+        </p:spPr>
+        <p:txBody>
+          <a:bodyPr wrap="square" rtlCol="0" anchor="ctr">
+            <a:spAutoFit/>
+          </a:bodyPr>
+          <a:lstStyle/>
+          <a:p>
+            <a:pPr>
+              <a:lnSpc>
+                <a:spcPct val="150000"/>
+              </a:lnSpc>
+            </a:pPr>
+            <a:r>
+              <a:rPr lang="en-US" dirty="0"/>
+              <a:t>End Date: </a:t>
+            </a:r>
+          </a:p>
+        </p:txBody>
+      </p:sp>
+      <p:sp>
+        <p:nvSpPr>
+          <p:cNvPr id="6" name="TextBox 5">
+            <a:extLst>
+              <a:ext uri="{FF2B5EF4-FFF2-40B4-BE49-F238E27FC236}">
+                <a16:creationId xmlns:a16="http://schemas.microsoft.com/office/drawing/2014/main" id="{13AC8412-CFBE-4B97-9090-20AF6FCC7E1E}"/>
+              </a:ext>
+            </a:extLst>
+          </p:cNvPr>
+          <p:cNvSpPr txBox="1"/>
+          <p:nvPr/>
+        </p:nvSpPr>
+        <p:spPr>
+          <a:xfrm>
+            <a:off x="2869944" y="2341622"/>
+            <a:ext cx="2072640" cy="467885"/>
+          </a:xfrm>
+          <a:prstGeom prst="rect">
+            <a:avLst/>
+          </a:prstGeom>
+          <a:noFill/>
+        </p:spPr>
+        <p:txBody>
+          <a:bodyPr wrap="square" rtlCol="0" anchor="ctr">
+            <a:spAutoFit/>
+          </a:bodyPr>
+          <a:lstStyle/>
+          <a:p>
+            <a:pPr>
+              <a:lnSpc>
+                <a:spcPct val="150000"/>
+              </a:lnSpc>
+            </a:pPr>
+            <a:r>
+              <a:rPr lang="en-US" dirty="0"/>
+              <a:t>Course Status:</a:t>
+            </a:r>
+          </a:p>
+        </p:txBody>
+      </p:sp>
+      <p:sp>
+        <p:nvSpPr>
+          <p:cNvPr id="7" name="TextBox 6">
+            <a:extLst>
+              <a:ext uri="{FF2B5EF4-FFF2-40B4-BE49-F238E27FC236}">
+                <a16:creationId xmlns:a16="http://schemas.microsoft.com/office/drawing/2014/main" id="{6378953B-8389-D846-67BF-6ED3ED8D424D}"/>
+              </a:ext>
+            </a:extLst>
+          </p:cNvPr>
+          <p:cNvSpPr txBox="1"/>
+          <p:nvPr/>
+        </p:nvSpPr>
+        <p:spPr>
+          <a:xfrm>
+            <a:off x="2869944" y="2829063"/>
+            <a:ext cx="2072640" cy="467885"/>
+          </a:xfrm>
+          <a:prstGeom prst="rect">
+            <a:avLst/>
+          </a:prstGeom>
+          <a:noFill/>
+        </p:spPr>
+        <p:txBody>
+          <a:bodyPr wrap="square" rtlCol="0" anchor="ctr">
+            <a:spAutoFit/>
+          </a:bodyPr>
+          <a:lstStyle/>
+          <a:p>
+            <a:pPr>
+              <a:lnSpc>
+                <a:spcPct val="150000"/>
+              </a:lnSpc>
+            </a:pPr>
+            <a:r>
+              <a:rPr lang="en-US" dirty="0"/>
+              <a:t>Instructor Name:</a:t>
+            </a:r>
+          </a:p>
+        </p:txBody>
+      </p:sp>
+      <p:sp>
+        <p:nvSpPr>
+          <p:cNvPr id="10" name="TextBox 9">
+            <a:extLst>
+              <a:ext uri="{FF2B5EF4-FFF2-40B4-BE49-F238E27FC236}">
+                <a16:creationId xmlns:a16="http://schemas.microsoft.com/office/drawing/2014/main" id="{96FDC118-AE7B-50DA-5781-77A60577172D}"/>
+              </a:ext>
+            </a:extLst>
+          </p:cNvPr>
+          <p:cNvSpPr txBox="1"/>
+          <p:nvPr/>
+        </p:nvSpPr>
+        <p:spPr>
+          <a:xfrm>
+            <a:off x="2869944" y="1457968"/>
+            <a:ext cx="1927860" cy="467885"/>
+          </a:xfrm>
+          <a:prstGeom prst="rect">
+            <a:avLst/>
+          </a:prstGeom>
+          <a:noFill/>
+        </p:spPr>
+        <p:txBody>
+          <a:bodyPr wrap="square" rtlCol="0" anchor="ctr">
+            <a:spAutoFit/>
+          </a:bodyPr>
+          <a:lstStyle/>
+          <a:p>
+            <a:pPr>
+              <a:lnSpc>
+                <a:spcPct val="150000"/>
+              </a:lnSpc>
+            </a:pPr>
+            <a:r>
+              <a:rPr lang="en-US" dirty="0"/>
+              <a:t>Start Date:</a:t>
+            </a:r>
+          </a:p>
+        </p:txBody>
+      </p:sp>
+      <p:sp>
+        <p:nvSpPr>
+          <p:cNvPr id="11" name="TextBox 10">
+            <a:extLst>
+              <a:ext uri="{FF2B5EF4-FFF2-40B4-BE49-F238E27FC236}">
+                <a16:creationId xmlns:a16="http://schemas.microsoft.com/office/drawing/2014/main" id="{BC5CDB68-549A-384F-BA7E-55ED8ACCB72D}"/>
+              </a:ext>
+            </a:extLst>
+          </p:cNvPr>
+          <p:cNvSpPr txBox="1"/>
+          <p:nvPr/>
+        </p:nvSpPr>
+        <p:spPr>
+          <a:xfrm>
+            <a:off x="2877564" y="3269252"/>
+            <a:ext cx="2072640" cy="467885"/>
+          </a:xfrm>
+          <a:prstGeom prst="rect">
+            <a:avLst/>
+          </a:prstGeom>
+          <a:noFill/>
+        </p:spPr>
+        <p:txBody>
+          <a:bodyPr wrap="square" rtlCol="0" anchor="ctr">
+            <a:spAutoFit/>
+          </a:bodyPr>
+          <a:lstStyle/>
+          <a:p>
+            <a:pPr>
+              <a:lnSpc>
+                <a:spcPct val="150000"/>
+              </a:lnSpc>
+            </a:pPr>
+            <a:r>
+              <a:rPr lang="en-US" dirty="0"/>
+              <a:t>Instructor Phone:</a:t>
+            </a:r>
+          </a:p>
+        </p:txBody>
+      </p:sp>
+      <p:sp>
+        <p:nvSpPr>
+          <p:cNvPr id="12" name="TextBox 11">
+            <a:extLst>
+              <a:ext uri="{FF2B5EF4-FFF2-40B4-BE49-F238E27FC236}">
+                <a16:creationId xmlns:a16="http://schemas.microsoft.com/office/drawing/2014/main" id="{1D323981-4AA6-92AA-9D05-F82B7131DFFE}"/>
+              </a:ext>
+            </a:extLst>
+          </p:cNvPr>
+          <p:cNvSpPr txBox="1"/>
+          <p:nvPr/>
+        </p:nvSpPr>
+        <p:spPr>
+          <a:xfrm>
+            <a:off x="2877564" y="3756693"/>
+            <a:ext cx="2072640" cy="467885"/>
+          </a:xfrm>
+          <a:prstGeom prst="rect">
+            <a:avLst/>
+          </a:prstGeom>
+          <a:noFill/>
+        </p:spPr>
+        <p:txBody>
+          <a:bodyPr wrap="square" rtlCol="0" anchor="ctr">
+            <a:spAutoFit/>
+          </a:bodyPr>
+          <a:lstStyle/>
+          <a:p>
+            <a:pPr>
+              <a:lnSpc>
+                <a:spcPct val="150000"/>
+              </a:lnSpc>
+            </a:pPr>
+            <a:r>
+              <a:rPr lang="en-US" dirty="0"/>
+              <a:t>Instructor Email:</a:t>
+            </a:r>
+          </a:p>
+        </p:txBody>
+      </p:sp>
+      <p:sp>
+        <p:nvSpPr>
+          <p:cNvPr id="13" name="Rectangle 12">
+            <a:extLst>
+              <a:ext uri="{FF2B5EF4-FFF2-40B4-BE49-F238E27FC236}">
+                <a16:creationId xmlns:a16="http://schemas.microsoft.com/office/drawing/2014/main" id="{3B3CD1F1-6E1E-B35D-D1BE-D9D8BCF0A392}"/>
+              </a:ext>
+            </a:extLst>
+          </p:cNvPr>
+          <p:cNvSpPr/>
+          <p:nvPr/>
+        </p:nvSpPr>
+        <p:spPr>
+          <a:xfrm>
+            <a:off x="4714613" y="1095518"/>
+            <a:ext cx="4169329" cy="369332"/>
+          </a:xfrm>
+          <a:prstGeom prst="rect">
+            <a:avLst/>
+          </a:prstGeom>
+        </p:spPr>
+        <p:style>
+          <a:lnRef idx="2">
+            <a:schemeClr val="accent1">
+              <a:shade val="15000"/>
+            </a:schemeClr>
+          </a:lnRef>
+          <a:fillRef idx="1">
+            <a:schemeClr val="accent1"/>
+          </a:fillRef>
+          <a:effectRef idx="0">
+            <a:schemeClr val="accent1"/>
+          </a:effectRef>
+          <a:fontRef idx="minor">
+            <a:schemeClr val="lt1"/>
+          </a:fontRef>
+        </p:style>
+        <p:txBody>
+          <a:bodyPr rtlCol="0" anchor="ctr"/>
+          <a:lstStyle/>
+          <a:p>
+            <a:pPr algn="ctr"/>
+            <a:endParaRPr lang="en-US"/>
+          </a:p>
+        </p:txBody>
+      </p:sp>
+      <p:sp>
+        <p:nvSpPr>
+          <p:cNvPr id="14" name="Rectangle 13">
+            <a:extLst>
+              <a:ext uri="{FF2B5EF4-FFF2-40B4-BE49-F238E27FC236}">
+                <a16:creationId xmlns:a16="http://schemas.microsoft.com/office/drawing/2014/main" id="{36B78476-E20D-1573-5F9B-EDF621BDF587}"/>
+              </a:ext>
+            </a:extLst>
+          </p:cNvPr>
+          <p:cNvSpPr/>
+          <p:nvPr/>
+        </p:nvSpPr>
+        <p:spPr>
+          <a:xfrm>
+            <a:off x="4710208" y="1515607"/>
+            <a:ext cx="4169329" cy="369332"/>
+          </a:xfrm>
+          <a:prstGeom prst="rect">
+            <a:avLst/>
+          </a:prstGeom>
+        </p:spPr>
+        <p:style>
+          <a:lnRef idx="2">
+            <a:schemeClr val="accent1">
+              <a:shade val="15000"/>
+            </a:schemeClr>
+          </a:lnRef>
+          <a:fillRef idx="1">
+            <a:schemeClr val="accent1"/>
+          </a:fillRef>
+          <a:effectRef idx="0">
+            <a:schemeClr val="accent1"/>
+          </a:effectRef>
+          <a:fontRef idx="minor">
+            <a:schemeClr val="lt1"/>
+          </a:fontRef>
+        </p:style>
+        <p:txBody>
+          <a:bodyPr rtlCol="0" anchor="ctr"/>
+          <a:lstStyle/>
+          <a:p>
+            <a:pPr algn="ctr"/>
+            <a:r>
+              <a:rPr lang="en-US" dirty="0"/>
+              <a:t>Select Date</a:t>
+            </a:r>
+          </a:p>
+        </p:txBody>
+      </p:sp>
+      <p:sp>
+        <p:nvSpPr>
+          <p:cNvPr id="15" name="Rectangle 14">
+            <a:extLst>
+              <a:ext uri="{FF2B5EF4-FFF2-40B4-BE49-F238E27FC236}">
+                <a16:creationId xmlns:a16="http://schemas.microsoft.com/office/drawing/2014/main" id="{8BB44C06-0D6C-3BA4-6163-0B8DD1F24333}"/>
+              </a:ext>
+            </a:extLst>
+          </p:cNvPr>
+          <p:cNvSpPr/>
+          <p:nvPr/>
+        </p:nvSpPr>
+        <p:spPr>
+          <a:xfrm>
+            <a:off x="4710207" y="1941945"/>
+            <a:ext cx="4169329" cy="369332"/>
+          </a:xfrm>
+          <a:prstGeom prst="rect">
+            <a:avLst/>
+          </a:prstGeom>
+        </p:spPr>
+        <p:style>
+          <a:lnRef idx="2">
+            <a:schemeClr val="accent1">
+              <a:shade val="15000"/>
+            </a:schemeClr>
+          </a:lnRef>
+          <a:fillRef idx="1">
+            <a:schemeClr val="accent1"/>
+          </a:fillRef>
+          <a:effectRef idx="0">
+            <a:schemeClr val="accent1"/>
+          </a:effectRef>
+          <a:fontRef idx="minor">
+            <a:schemeClr val="lt1"/>
+          </a:fontRef>
+        </p:style>
+        <p:txBody>
+          <a:bodyPr rtlCol="0" anchor="ctr"/>
+          <a:lstStyle/>
+          <a:p>
+            <a:pPr algn="ctr"/>
+            <a:r>
+              <a:rPr lang="en-US" dirty="0"/>
+              <a:t>Select Date </a:t>
+            </a:r>
+          </a:p>
+        </p:txBody>
+      </p:sp>
+      <p:sp>
+        <p:nvSpPr>
+          <p:cNvPr id="16" name="Rectangle 15">
+            <a:extLst>
+              <a:ext uri="{FF2B5EF4-FFF2-40B4-BE49-F238E27FC236}">
+                <a16:creationId xmlns:a16="http://schemas.microsoft.com/office/drawing/2014/main" id="{6888A43B-C1DE-115F-FC99-BBE749121B42}"/>
+              </a:ext>
+            </a:extLst>
+          </p:cNvPr>
+          <p:cNvSpPr/>
+          <p:nvPr/>
+        </p:nvSpPr>
+        <p:spPr>
+          <a:xfrm>
+            <a:off x="4710207" y="2389507"/>
+            <a:ext cx="4169329" cy="369332"/>
+          </a:xfrm>
+          <a:prstGeom prst="rect">
+            <a:avLst/>
+          </a:prstGeom>
+        </p:spPr>
+        <p:style>
+          <a:lnRef idx="2">
+            <a:schemeClr val="accent1">
+              <a:shade val="15000"/>
+            </a:schemeClr>
+          </a:lnRef>
+          <a:fillRef idx="1">
+            <a:schemeClr val="accent1"/>
+          </a:fillRef>
+          <a:effectRef idx="0">
+            <a:schemeClr val="accent1"/>
+          </a:effectRef>
+          <a:fontRef idx="minor">
+            <a:schemeClr val="lt1"/>
+          </a:fontRef>
+        </p:style>
+        <p:txBody>
+          <a:bodyPr rtlCol="0" anchor="ctr"/>
+          <a:lstStyle/>
+          <a:p>
+            <a:pPr algn="ctr"/>
+            <a:endParaRPr lang="en-US"/>
+          </a:p>
+        </p:txBody>
+      </p:sp>
+      <p:sp>
+        <p:nvSpPr>
+          <p:cNvPr id="17" name="Rectangle 16">
+            <a:extLst>
+              <a:ext uri="{FF2B5EF4-FFF2-40B4-BE49-F238E27FC236}">
+                <a16:creationId xmlns:a16="http://schemas.microsoft.com/office/drawing/2014/main" id="{E586E2AF-C270-5566-0B25-772636524559}"/>
+              </a:ext>
+            </a:extLst>
+          </p:cNvPr>
+          <p:cNvSpPr/>
+          <p:nvPr/>
+        </p:nvSpPr>
+        <p:spPr>
+          <a:xfrm>
+            <a:off x="4710207" y="2872632"/>
+            <a:ext cx="4169329" cy="369332"/>
+          </a:xfrm>
+          <a:prstGeom prst="rect">
+            <a:avLst/>
+          </a:prstGeom>
+        </p:spPr>
+        <p:style>
+          <a:lnRef idx="2">
+            <a:schemeClr val="accent1">
+              <a:shade val="15000"/>
+            </a:schemeClr>
+          </a:lnRef>
+          <a:fillRef idx="1">
+            <a:schemeClr val="accent1"/>
+          </a:fillRef>
+          <a:effectRef idx="0">
+            <a:schemeClr val="accent1"/>
+          </a:effectRef>
+          <a:fontRef idx="minor">
+            <a:schemeClr val="lt1"/>
+          </a:fontRef>
+        </p:style>
+        <p:txBody>
+          <a:bodyPr rtlCol="0" anchor="ctr"/>
+          <a:lstStyle/>
+          <a:p>
+            <a:pPr algn="ctr"/>
+            <a:endParaRPr lang="en-US"/>
+          </a:p>
+        </p:txBody>
+      </p:sp>
+      <p:sp>
+        <p:nvSpPr>
+          <p:cNvPr id="18" name="Rectangle 17">
+            <a:extLst>
+              <a:ext uri="{FF2B5EF4-FFF2-40B4-BE49-F238E27FC236}">
+                <a16:creationId xmlns:a16="http://schemas.microsoft.com/office/drawing/2014/main" id="{25CB93A8-D9C7-0CF4-EA34-B53A43654BE4}"/>
+              </a:ext>
+            </a:extLst>
+          </p:cNvPr>
+          <p:cNvSpPr/>
+          <p:nvPr/>
+        </p:nvSpPr>
+        <p:spPr>
+          <a:xfrm>
+            <a:off x="4710207" y="3356582"/>
+            <a:ext cx="4169329" cy="369332"/>
+          </a:xfrm>
+          <a:prstGeom prst="rect">
+            <a:avLst/>
+          </a:prstGeom>
+        </p:spPr>
+        <p:style>
+          <a:lnRef idx="2">
+            <a:schemeClr val="accent1">
+              <a:shade val="15000"/>
+            </a:schemeClr>
+          </a:lnRef>
+          <a:fillRef idx="1">
+            <a:schemeClr val="accent1"/>
+          </a:fillRef>
+          <a:effectRef idx="0">
+            <a:schemeClr val="accent1"/>
+          </a:effectRef>
+          <a:fontRef idx="minor">
+            <a:schemeClr val="lt1"/>
+          </a:fontRef>
+        </p:style>
+        <p:txBody>
+          <a:bodyPr rtlCol="0" anchor="ctr"/>
+          <a:lstStyle/>
+          <a:p>
+            <a:pPr algn="ctr"/>
+            <a:endParaRPr lang="en-US"/>
+          </a:p>
+        </p:txBody>
+      </p:sp>
+      <p:sp>
+        <p:nvSpPr>
+          <p:cNvPr id="19" name="Rectangle 18">
+            <a:extLst>
+              <a:ext uri="{FF2B5EF4-FFF2-40B4-BE49-F238E27FC236}">
+                <a16:creationId xmlns:a16="http://schemas.microsoft.com/office/drawing/2014/main" id="{B495B742-0B29-3638-D74D-083FCACA700A}"/>
+              </a:ext>
+            </a:extLst>
+          </p:cNvPr>
+          <p:cNvSpPr/>
+          <p:nvPr/>
+        </p:nvSpPr>
+        <p:spPr>
+          <a:xfrm>
+            <a:off x="4710207" y="3851755"/>
+            <a:ext cx="4169329" cy="369332"/>
+          </a:xfrm>
+          <a:prstGeom prst="rect">
+            <a:avLst/>
+          </a:prstGeom>
+        </p:spPr>
+        <p:style>
+          <a:lnRef idx="2">
+            <a:schemeClr val="accent1">
+              <a:shade val="15000"/>
+            </a:schemeClr>
+          </a:lnRef>
+          <a:fillRef idx="1">
+            <a:schemeClr val="accent1"/>
+          </a:fillRef>
+          <a:effectRef idx="0">
+            <a:schemeClr val="accent1"/>
+          </a:effectRef>
+          <a:fontRef idx="minor">
+            <a:schemeClr val="lt1"/>
+          </a:fontRef>
+        </p:style>
+        <p:txBody>
+          <a:bodyPr rtlCol="0" anchor="ctr"/>
+          <a:lstStyle/>
+          <a:p>
+            <a:pPr algn="ctr"/>
+            <a:endParaRPr lang="en-US"/>
+          </a:p>
+        </p:txBody>
+      </p:sp>
+      <p:sp>
+        <p:nvSpPr>
+          <p:cNvPr id="20" name="Rectangle 19">
+            <a:extLst>
+              <a:ext uri="{FF2B5EF4-FFF2-40B4-BE49-F238E27FC236}">
+                <a16:creationId xmlns:a16="http://schemas.microsoft.com/office/drawing/2014/main" id="{AA3F8B03-3DFD-8C05-24AB-A4D6110C35EF}"/>
+              </a:ext>
+            </a:extLst>
+          </p:cNvPr>
+          <p:cNvSpPr/>
+          <p:nvPr/>
+        </p:nvSpPr>
+        <p:spPr>
+          <a:xfrm>
+            <a:off x="4710206" y="5577816"/>
+            <a:ext cx="4169329" cy="369332"/>
+          </a:xfrm>
+          <a:prstGeom prst="rect">
+            <a:avLst/>
+          </a:prstGeom>
+        </p:spPr>
+        <p:style>
+          <a:lnRef idx="2">
+            <a:schemeClr val="accent1">
+              <a:shade val="15000"/>
+            </a:schemeClr>
+          </a:lnRef>
+          <a:fillRef idx="1">
+            <a:schemeClr val="accent1"/>
+          </a:fillRef>
+          <a:effectRef idx="0">
+            <a:schemeClr val="accent1"/>
+          </a:effectRef>
+          <a:fontRef idx="minor">
+            <a:schemeClr val="lt1"/>
+          </a:fontRef>
+        </p:style>
+        <p:txBody>
+          <a:bodyPr rtlCol="0" anchor="ctr"/>
+          <a:lstStyle/>
+          <a:p>
+            <a:pPr algn="ctr"/>
+            <a:r>
+              <a:rPr lang="en-US" dirty="0"/>
+              <a:t>SHARE</a:t>
+            </a:r>
+          </a:p>
+        </p:txBody>
+      </p:sp>
+      <p:sp>
+        <p:nvSpPr>
+          <p:cNvPr id="21" name="Rectangle 20">
+            <a:extLst>
+              <a:ext uri="{FF2B5EF4-FFF2-40B4-BE49-F238E27FC236}">
+                <a16:creationId xmlns:a16="http://schemas.microsoft.com/office/drawing/2014/main" id="{639F4EAA-813B-554E-F5B5-133A7386F962}"/>
+              </a:ext>
+            </a:extLst>
+          </p:cNvPr>
+          <p:cNvSpPr/>
+          <p:nvPr/>
+        </p:nvSpPr>
+        <p:spPr>
+          <a:xfrm>
+            <a:off x="4710205" y="5104847"/>
+            <a:ext cx="4169329" cy="369332"/>
+          </a:xfrm>
+          <a:prstGeom prst="rect">
+            <a:avLst/>
+          </a:prstGeom>
+        </p:spPr>
+        <p:style>
+          <a:lnRef idx="2">
+            <a:schemeClr val="accent1">
+              <a:shade val="15000"/>
+            </a:schemeClr>
+          </a:lnRef>
+          <a:fillRef idx="1">
+            <a:schemeClr val="accent1"/>
+          </a:fillRef>
+          <a:effectRef idx="0">
+            <a:schemeClr val="accent1"/>
+          </a:effectRef>
+          <a:fontRef idx="minor">
+            <a:schemeClr val="lt1"/>
+          </a:fontRef>
+        </p:style>
+        <p:txBody>
+          <a:bodyPr rtlCol="0" anchor="ctr"/>
+          <a:lstStyle/>
+          <a:p>
+            <a:pPr algn="ctr"/>
+            <a:r>
+              <a:rPr lang="en-US" dirty="0"/>
+              <a:t>Yes/No</a:t>
+            </a:r>
+          </a:p>
+        </p:txBody>
+      </p:sp>
+      <p:sp>
+        <p:nvSpPr>
+          <p:cNvPr id="22" name="Rectangle 21">
+            <a:extLst>
+              <a:ext uri="{FF2B5EF4-FFF2-40B4-BE49-F238E27FC236}">
+                <a16:creationId xmlns:a16="http://schemas.microsoft.com/office/drawing/2014/main" id="{6583CCDF-751A-DA0E-EF24-1F83EACD68D2}"/>
+              </a:ext>
+            </a:extLst>
+          </p:cNvPr>
+          <p:cNvSpPr/>
+          <p:nvPr/>
+        </p:nvSpPr>
+        <p:spPr>
+          <a:xfrm>
+            <a:off x="5034863" y="6179724"/>
+            <a:ext cx="1466605" cy="469783"/>
+          </a:xfrm>
+          <a:prstGeom prst="rect">
+            <a:avLst/>
+          </a:prstGeom>
+        </p:spPr>
+        <p:style>
+          <a:lnRef idx="2">
+            <a:schemeClr val="accent1">
+              <a:shade val="15000"/>
+            </a:schemeClr>
+          </a:lnRef>
+          <a:fillRef idx="1">
+            <a:schemeClr val="accent1"/>
+          </a:fillRef>
+          <a:effectRef idx="0">
+            <a:schemeClr val="accent1"/>
+          </a:effectRef>
+          <a:fontRef idx="minor">
+            <a:schemeClr val="lt1"/>
+          </a:fontRef>
+        </p:style>
+        <p:txBody>
+          <a:bodyPr rtlCol="0" anchor="ctr"/>
+          <a:lstStyle/>
+          <a:p>
+            <a:pPr algn="ctr"/>
+            <a:r>
+              <a:rPr lang="en-US" dirty="0"/>
+              <a:t>Save</a:t>
+            </a:r>
+          </a:p>
+        </p:txBody>
+      </p:sp>
+      <p:sp>
+        <p:nvSpPr>
+          <p:cNvPr id="23" name="Rectangle 22">
+            <a:extLst>
+              <a:ext uri="{FF2B5EF4-FFF2-40B4-BE49-F238E27FC236}">
+                <a16:creationId xmlns:a16="http://schemas.microsoft.com/office/drawing/2014/main" id="{0767B189-7246-2B44-062C-6EAD3A3F99DE}"/>
+              </a:ext>
+            </a:extLst>
+          </p:cNvPr>
+          <p:cNvSpPr/>
+          <p:nvPr/>
+        </p:nvSpPr>
+        <p:spPr>
+          <a:xfrm>
+            <a:off x="7116730" y="6179724"/>
+            <a:ext cx="1466605" cy="469783"/>
+          </a:xfrm>
+          <a:prstGeom prst="rect">
+            <a:avLst/>
+          </a:prstGeom>
+        </p:spPr>
+        <p:style>
+          <a:lnRef idx="2">
+            <a:schemeClr val="accent1">
+              <a:shade val="15000"/>
+            </a:schemeClr>
+          </a:lnRef>
+          <a:fillRef idx="1">
+            <a:schemeClr val="accent1"/>
+          </a:fillRef>
+          <a:effectRef idx="0">
+            <a:schemeClr val="accent1"/>
+          </a:effectRef>
+          <a:fontRef idx="minor">
+            <a:schemeClr val="lt1"/>
+          </a:fontRef>
+        </p:style>
+        <p:txBody>
+          <a:bodyPr rtlCol="0" anchor="ctr"/>
+          <a:lstStyle/>
+          <a:p>
+            <a:pPr algn="ctr"/>
+            <a:r>
+              <a:rPr lang="en-US" dirty="0"/>
+              <a:t>Cancel</a:t>
+            </a:r>
+          </a:p>
+        </p:txBody>
+      </p:sp>
+      <p:sp>
+        <p:nvSpPr>
+          <p:cNvPr id="25" name="Arrow: Down 24">
+            <a:extLst>
+              <a:ext uri="{FF2B5EF4-FFF2-40B4-BE49-F238E27FC236}">
+                <a16:creationId xmlns:a16="http://schemas.microsoft.com/office/drawing/2014/main" id="{60F0799F-E11C-FE0A-A052-FDDF471657D2}"/>
+              </a:ext>
+            </a:extLst>
+          </p:cNvPr>
+          <p:cNvSpPr/>
+          <p:nvPr/>
+        </p:nvSpPr>
+        <p:spPr>
+          <a:xfrm>
+            <a:off x="8443519" y="2418325"/>
+            <a:ext cx="268447" cy="361448"/>
+          </a:xfrm>
+          <a:prstGeom prst="downArrow">
+            <a:avLst/>
+          </a:prstGeom>
+          <a:solidFill>
+            <a:schemeClr val="bg1"/>
+          </a:solidFill>
+        </p:spPr>
+        <p:style>
+          <a:lnRef idx="2">
+            <a:schemeClr val="accent1">
+              <a:shade val="15000"/>
+            </a:schemeClr>
+          </a:lnRef>
+          <a:fillRef idx="1">
+            <a:schemeClr val="accent1"/>
+          </a:fillRef>
+          <a:effectRef idx="0">
+            <a:schemeClr val="accent1"/>
+          </a:effectRef>
+          <a:fontRef idx="minor">
+            <a:schemeClr val="lt1"/>
+          </a:fontRef>
+        </p:style>
+        <p:txBody>
+          <a:bodyPr rtlCol="0" anchor="ctr"/>
+          <a:lstStyle/>
+          <a:p>
+            <a:pPr algn="ctr"/>
+            <a:endParaRPr lang="en-US"/>
+          </a:p>
+        </p:txBody>
+      </p:sp>
+      <p:sp>
+        <p:nvSpPr>
+          <p:cNvPr id="26" name="Rectangle 25">
+            <a:extLst>
+              <a:ext uri="{FF2B5EF4-FFF2-40B4-BE49-F238E27FC236}">
+                <a16:creationId xmlns:a16="http://schemas.microsoft.com/office/drawing/2014/main" id="{35F3354C-E9F5-5A1B-ECDE-391C31642BD1}"/>
+              </a:ext>
+            </a:extLst>
+          </p:cNvPr>
+          <p:cNvSpPr/>
+          <p:nvPr/>
+        </p:nvSpPr>
+        <p:spPr>
+          <a:xfrm>
+            <a:off x="8405769" y="1568741"/>
+            <a:ext cx="343948" cy="255469"/>
+          </a:xfrm>
+          <a:prstGeom prst="rect">
+            <a:avLst/>
+          </a:prstGeom>
+          <a:solidFill>
+            <a:schemeClr val="bg1"/>
+          </a:solidFill>
+        </p:spPr>
+        <p:style>
+          <a:lnRef idx="2">
+            <a:schemeClr val="accent1">
+              <a:shade val="15000"/>
+            </a:schemeClr>
+          </a:lnRef>
+          <a:fillRef idx="1">
+            <a:schemeClr val="accent1"/>
+          </a:fillRef>
+          <a:effectRef idx="0">
+            <a:schemeClr val="accent1"/>
+          </a:effectRef>
+          <a:fontRef idx="minor">
+            <a:schemeClr val="lt1"/>
+          </a:fontRef>
+        </p:style>
+        <p:txBody>
+          <a:bodyPr rtlCol="0" anchor="ctr"/>
+          <a:lstStyle/>
+          <a:p>
+            <a:pPr algn="ctr"/>
+            <a:endParaRPr lang="en-US"/>
+          </a:p>
+        </p:txBody>
+      </p:sp>
+      <p:sp>
+        <p:nvSpPr>
+          <p:cNvPr id="27" name="Rectangle 26">
+            <a:extLst>
+              <a:ext uri="{FF2B5EF4-FFF2-40B4-BE49-F238E27FC236}">
+                <a16:creationId xmlns:a16="http://schemas.microsoft.com/office/drawing/2014/main" id="{741AFD15-4E9C-644B-8EF5-3B4ECFB1486F}"/>
+              </a:ext>
+            </a:extLst>
+          </p:cNvPr>
+          <p:cNvSpPr/>
+          <p:nvPr/>
+        </p:nvSpPr>
+        <p:spPr>
+          <a:xfrm>
+            <a:off x="8405769" y="2008376"/>
+            <a:ext cx="343948" cy="255469"/>
+          </a:xfrm>
+          <a:prstGeom prst="rect">
+            <a:avLst/>
+          </a:prstGeom>
+          <a:solidFill>
+            <a:schemeClr val="bg1"/>
+          </a:solidFill>
+        </p:spPr>
+        <p:style>
+          <a:lnRef idx="2">
+            <a:schemeClr val="accent1">
+              <a:shade val="15000"/>
+            </a:schemeClr>
+          </a:lnRef>
+          <a:fillRef idx="1">
+            <a:schemeClr val="accent1"/>
+          </a:fillRef>
+          <a:effectRef idx="0">
+            <a:schemeClr val="accent1"/>
+          </a:effectRef>
+          <a:fontRef idx="minor">
+            <a:schemeClr val="lt1"/>
+          </a:fontRef>
+        </p:style>
+        <p:txBody>
+          <a:bodyPr rtlCol="0" anchor="ctr"/>
+          <a:lstStyle/>
+          <a:p>
+            <a:pPr algn="ctr"/>
+            <a:endParaRPr lang="en-US"/>
+          </a:p>
+        </p:txBody>
+      </p:sp>
+      <p:sp>
+        <p:nvSpPr>
+          <p:cNvPr id="28" name="TextBox 27">
+            <a:extLst>
+              <a:ext uri="{FF2B5EF4-FFF2-40B4-BE49-F238E27FC236}">
+                <a16:creationId xmlns:a16="http://schemas.microsoft.com/office/drawing/2014/main" id="{F683DCAC-B648-C3C7-90CA-27CD3D1A536D}"/>
+              </a:ext>
+            </a:extLst>
+          </p:cNvPr>
+          <p:cNvSpPr txBox="1"/>
+          <p:nvPr/>
+        </p:nvSpPr>
+        <p:spPr>
+          <a:xfrm>
+            <a:off x="2869944" y="5006294"/>
+            <a:ext cx="2072640" cy="467885"/>
+          </a:xfrm>
+          <a:prstGeom prst="rect">
+            <a:avLst/>
+          </a:prstGeom>
+          <a:noFill/>
+        </p:spPr>
+        <p:txBody>
+          <a:bodyPr wrap="square" rtlCol="0" anchor="ctr">
+            <a:spAutoFit/>
+          </a:bodyPr>
+          <a:lstStyle/>
+          <a:p>
+            <a:pPr>
+              <a:lnSpc>
+                <a:spcPct val="150000"/>
+              </a:lnSpc>
+            </a:pPr>
+            <a:r>
+              <a:rPr lang="en-US" dirty="0"/>
+              <a:t>Notifications</a:t>
+            </a:r>
+          </a:p>
+        </p:txBody>
+      </p:sp>
+      <p:sp>
+        <p:nvSpPr>
+          <p:cNvPr id="29" name="TextBox 28">
+            <a:extLst>
+              <a:ext uri="{FF2B5EF4-FFF2-40B4-BE49-F238E27FC236}">
+                <a16:creationId xmlns:a16="http://schemas.microsoft.com/office/drawing/2014/main" id="{27A4097D-563C-5BEB-180B-24C732BCADA5}"/>
+              </a:ext>
+            </a:extLst>
+          </p:cNvPr>
+          <p:cNvSpPr txBox="1"/>
+          <p:nvPr/>
+        </p:nvSpPr>
+        <p:spPr>
+          <a:xfrm>
+            <a:off x="2877564" y="4170443"/>
+            <a:ext cx="2072640" cy="467885"/>
+          </a:xfrm>
+          <a:prstGeom prst="rect">
+            <a:avLst/>
+          </a:prstGeom>
+          <a:noFill/>
+        </p:spPr>
+        <p:txBody>
+          <a:bodyPr wrap="square" rtlCol="0" anchor="ctr">
+            <a:spAutoFit/>
+          </a:bodyPr>
+          <a:lstStyle/>
+          <a:p>
+            <a:pPr>
+              <a:lnSpc>
+                <a:spcPct val="150000"/>
+              </a:lnSpc>
+            </a:pPr>
+            <a:r>
+              <a:rPr lang="en-US" dirty="0"/>
+              <a:t>Notes:</a:t>
+            </a:r>
+          </a:p>
+        </p:txBody>
+      </p:sp>
+      <p:sp>
+        <p:nvSpPr>
+          <p:cNvPr id="30" name="Rectangle 29">
+            <a:extLst>
+              <a:ext uri="{FF2B5EF4-FFF2-40B4-BE49-F238E27FC236}">
+                <a16:creationId xmlns:a16="http://schemas.microsoft.com/office/drawing/2014/main" id="{9A25B762-2578-F135-C9E8-9F4CFD7ACF89}"/>
+              </a:ext>
+            </a:extLst>
+          </p:cNvPr>
+          <p:cNvSpPr/>
+          <p:nvPr/>
+        </p:nvSpPr>
+        <p:spPr>
+          <a:xfrm>
+            <a:off x="4710204" y="4362290"/>
+            <a:ext cx="4169329" cy="589020"/>
+          </a:xfrm>
+          <a:prstGeom prst="rect">
+            <a:avLst/>
+          </a:prstGeom>
+        </p:spPr>
+        <p:style>
+          <a:lnRef idx="2">
+            <a:schemeClr val="accent1">
+              <a:shade val="15000"/>
+            </a:schemeClr>
+          </a:lnRef>
+          <a:fillRef idx="1">
+            <a:schemeClr val="accent1"/>
+          </a:fillRef>
+          <a:effectRef idx="0">
+            <a:schemeClr val="accent1"/>
+          </a:effectRef>
+          <a:fontRef idx="minor">
+            <a:schemeClr val="lt1"/>
+          </a:fontRef>
+        </p:style>
+        <p:txBody>
+          <a:bodyPr rtlCol="0" anchor="ctr"/>
+          <a:lstStyle/>
+          <a:p>
+            <a:pPr algn="ctr"/>
+            <a:endParaRPr lang="en-US"/>
+          </a:p>
+        </p:txBody>
+      </p:sp>
+    </p:spTree>
+    <p:extLst>
+      <p:ext uri="{BB962C8B-B14F-4D97-AF65-F5344CB8AC3E}">
+        <p14:creationId xmlns:p14="http://schemas.microsoft.com/office/powerpoint/2010/main" val="558483625"/>
+      </p:ext>
+    </p:extLst>
+  </p:cSld>
+  <p:clrMapOvr>
+    <a:masterClrMapping/>
+  </p:clrMapOvr>
+</p:sld>
+</file>
+
+<file path=ppt/slides/slide5.xml><?xml version="1.0" encoding="utf-8"?>
+<p:sld xmlns:a="http://schemas.openxmlformats.org/drawingml/2006/main" xmlns:r="http://schemas.openxmlformats.org/officeDocument/2006/relationships" xmlns:p="http://schemas.openxmlformats.org/presentationml/2006/main">
+  <p:cSld>
+    <p:spTree>
+      <p:nvGrpSpPr>
+        <p:cNvPr id="1" name=""/>
+        <p:cNvGrpSpPr/>
+        <p:nvPr/>
+      </p:nvGrpSpPr>
+      <p:grpSpPr>
+        <a:xfrm>
+          <a:off x="0" y="0"/>
+          <a:ext cx="0" cy="0"/>
+          <a:chOff x="0" y="0"/>
+          <a:chExt cx="0" cy="0"/>
+        </a:xfrm>
+      </p:grpSpPr>
+      <p:sp>
+        <p:nvSpPr>
+          <p:cNvPr id="2" name="Arrow: Right 1">
+            <a:extLst>
+              <a:ext uri="{FF2B5EF4-FFF2-40B4-BE49-F238E27FC236}">
+                <a16:creationId xmlns:a16="http://schemas.microsoft.com/office/drawing/2014/main" id="{0DE24D2C-8151-05B0-71A5-A98B07E4D30F}"/>
+              </a:ext>
+            </a:extLst>
+          </p:cNvPr>
+          <p:cNvSpPr/>
+          <p:nvPr/>
+        </p:nvSpPr>
+        <p:spPr>
+          <a:xfrm rot="10800000">
+            <a:off x="2621211" y="699401"/>
+            <a:ext cx="1432560" cy="298780"/>
+          </a:xfrm>
+          <a:prstGeom prst="rightArrow">
+            <a:avLst/>
+          </a:prstGeom>
+        </p:spPr>
+        <p:style>
+          <a:lnRef idx="2">
+            <a:schemeClr val="accent1">
+              <a:shade val="15000"/>
+            </a:schemeClr>
+          </a:lnRef>
+          <a:fillRef idx="1">
+            <a:schemeClr val="accent1"/>
+          </a:fillRef>
+          <a:effectRef idx="0">
+            <a:schemeClr val="accent1"/>
+          </a:effectRef>
+          <a:fontRef idx="minor">
+            <a:schemeClr val="lt1"/>
+          </a:fontRef>
+        </p:style>
+        <p:txBody>
+          <a:bodyPr rtlCol="0" anchor="ctr"/>
+          <a:lstStyle/>
+          <a:p>
+            <a:pPr algn="ctr"/>
+            <a:endParaRPr lang="en-US"/>
+          </a:p>
+        </p:txBody>
+      </p:sp>
+      <p:sp>
+        <p:nvSpPr>
+          <p:cNvPr id="3" name="TextBox 2">
+            <a:extLst>
+              <a:ext uri="{FF2B5EF4-FFF2-40B4-BE49-F238E27FC236}">
+                <a16:creationId xmlns:a16="http://schemas.microsoft.com/office/drawing/2014/main" id="{71A7C33F-B25B-9209-530A-17FD87828961}"/>
+              </a:ext>
+            </a:extLst>
+          </p:cNvPr>
+          <p:cNvSpPr txBox="1"/>
+          <p:nvPr/>
+        </p:nvSpPr>
+        <p:spPr>
+          <a:xfrm>
+            <a:off x="4768230" y="330068"/>
+            <a:ext cx="3482341" cy="369332"/>
+          </a:xfrm>
+          <a:prstGeom prst="rect">
+            <a:avLst/>
+          </a:prstGeom>
+          <a:noFill/>
+        </p:spPr>
+        <p:txBody>
+          <a:bodyPr wrap="square" rtlCol="0">
+            <a:spAutoFit/>
+          </a:bodyPr>
+          <a:lstStyle/>
+          <a:p>
+            <a:r>
+              <a:rPr lang="en-US" dirty="0"/>
+              <a:t>Course Name (Detailed View)</a:t>
+            </a:r>
+          </a:p>
+        </p:txBody>
+      </p:sp>
+      <p:sp>
+        <p:nvSpPr>
+          <p:cNvPr id="4" name="TextBox 3">
+            <a:extLst>
+              <a:ext uri="{FF2B5EF4-FFF2-40B4-BE49-F238E27FC236}">
+                <a16:creationId xmlns:a16="http://schemas.microsoft.com/office/drawing/2014/main" id="{56CCB40F-337F-06BD-7ABC-A2346E98EED7}"/>
+              </a:ext>
+            </a:extLst>
+          </p:cNvPr>
+          <p:cNvSpPr txBox="1"/>
+          <p:nvPr/>
+        </p:nvSpPr>
+        <p:spPr>
+          <a:xfrm>
+            <a:off x="2621211" y="1791421"/>
+            <a:ext cx="2072640" cy="467885"/>
+          </a:xfrm>
+          <a:prstGeom prst="rect">
+            <a:avLst/>
+          </a:prstGeom>
+          <a:noFill/>
+        </p:spPr>
+        <p:txBody>
+          <a:bodyPr wrap="square" rtlCol="0" anchor="ctr">
+            <a:spAutoFit/>
+          </a:bodyPr>
+          <a:lstStyle/>
+          <a:p>
+            <a:pPr>
+              <a:lnSpc>
+                <a:spcPct val="150000"/>
+              </a:lnSpc>
+            </a:pPr>
+            <a:r>
+              <a:rPr lang="en-US" dirty="0"/>
+              <a:t>End Date: </a:t>
+            </a:r>
+          </a:p>
+        </p:txBody>
+      </p:sp>
+      <p:sp>
+        <p:nvSpPr>
+          <p:cNvPr id="5" name="TextBox 4">
+            <a:extLst>
+              <a:ext uri="{FF2B5EF4-FFF2-40B4-BE49-F238E27FC236}">
+                <a16:creationId xmlns:a16="http://schemas.microsoft.com/office/drawing/2014/main" id="{D5813810-B4E6-8D1B-3F57-7B4408679D93}"/>
+              </a:ext>
+            </a:extLst>
+          </p:cNvPr>
+          <p:cNvSpPr txBox="1"/>
+          <p:nvPr/>
+        </p:nvSpPr>
+        <p:spPr>
+          <a:xfrm>
+            <a:off x="2621211" y="2251166"/>
+            <a:ext cx="2072640" cy="467885"/>
+          </a:xfrm>
+          <a:prstGeom prst="rect">
+            <a:avLst/>
+          </a:prstGeom>
+          <a:noFill/>
+        </p:spPr>
+        <p:txBody>
+          <a:bodyPr wrap="square" rtlCol="0" anchor="ctr">
+            <a:spAutoFit/>
+          </a:bodyPr>
+          <a:lstStyle/>
+          <a:p>
+            <a:pPr>
+              <a:lnSpc>
+                <a:spcPct val="150000"/>
+              </a:lnSpc>
+            </a:pPr>
+            <a:r>
+              <a:rPr lang="en-US" dirty="0"/>
+              <a:t>Course Status:</a:t>
+            </a:r>
+          </a:p>
+        </p:txBody>
+      </p:sp>
+      <p:sp>
+        <p:nvSpPr>
+          <p:cNvPr id="6" name="TextBox 5">
+            <a:extLst>
+              <a:ext uri="{FF2B5EF4-FFF2-40B4-BE49-F238E27FC236}">
+                <a16:creationId xmlns:a16="http://schemas.microsoft.com/office/drawing/2014/main" id="{47B8508D-F871-BB57-917B-65DAD43A4BC8}"/>
+              </a:ext>
+            </a:extLst>
+          </p:cNvPr>
+          <p:cNvSpPr txBox="1"/>
+          <p:nvPr/>
+        </p:nvSpPr>
+        <p:spPr>
+          <a:xfrm>
+            <a:off x="2621211" y="2738607"/>
+            <a:ext cx="2072640" cy="467885"/>
+          </a:xfrm>
+          <a:prstGeom prst="rect">
+            <a:avLst/>
+          </a:prstGeom>
+          <a:noFill/>
+        </p:spPr>
+        <p:txBody>
+          <a:bodyPr wrap="square" rtlCol="0" anchor="ctr">
+            <a:spAutoFit/>
+          </a:bodyPr>
+          <a:lstStyle/>
+          <a:p>
+            <a:pPr>
+              <a:lnSpc>
+                <a:spcPct val="150000"/>
+              </a:lnSpc>
+            </a:pPr>
+            <a:r>
+              <a:rPr lang="en-US" dirty="0"/>
+              <a:t>Instructor Name:</a:t>
+            </a:r>
+          </a:p>
+        </p:txBody>
+      </p:sp>
+      <p:sp>
+        <p:nvSpPr>
+          <p:cNvPr id="7" name="TextBox 6">
+            <a:extLst>
+              <a:ext uri="{FF2B5EF4-FFF2-40B4-BE49-F238E27FC236}">
+                <a16:creationId xmlns:a16="http://schemas.microsoft.com/office/drawing/2014/main" id="{8EC42E25-97E1-9C11-109E-5F66D6CD9A42}"/>
+              </a:ext>
+            </a:extLst>
+          </p:cNvPr>
+          <p:cNvSpPr txBox="1"/>
+          <p:nvPr/>
+        </p:nvSpPr>
+        <p:spPr>
+          <a:xfrm>
+            <a:off x="2621211" y="1367512"/>
+            <a:ext cx="1927860" cy="467885"/>
+          </a:xfrm>
+          <a:prstGeom prst="rect">
+            <a:avLst/>
+          </a:prstGeom>
+          <a:noFill/>
+        </p:spPr>
+        <p:txBody>
+          <a:bodyPr wrap="square" rtlCol="0" anchor="ctr">
+            <a:spAutoFit/>
+          </a:bodyPr>
+          <a:lstStyle/>
+          <a:p>
+            <a:pPr>
+              <a:lnSpc>
+                <a:spcPct val="150000"/>
+              </a:lnSpc>
+            </a:pPr>
+            <a:r>
+              <a:rPr lang="en-US" dirty="0"/>
+              <a:t>Start Date:</a:t>
+            </a:r>
+          </a:p>
+        </p:txBody>
+      </p:sp>
+      <p:sp>
+        <p:nvSpPr>
+          <p:cNvPr id="8" name="TextBox 7">
+            <a:extLst>
+              <a:ext uri="{FF2B5EF4-FFF2-40B4-BE49-F238E27FC236}">
+                <a16:creationId xmlns:a16="http://schemas.microsoft.com/office/drawing/2014/main" id="{6C0F801F-CB1F-9C2E-3125-EF1D921E457E}"/>
+              </a:ext>
+            </a:extLst>
+          </p:cNvPr>
+          <p:cNvSpPr txBox="1"/>
+          <p:nvPr/>
+        </p:nvSpPr>
+        <p:spPr>
+          <a:xfrm>
+            <a:off x="2628831" y="3178796"/>
+            <a:ext cx="2072640" cy="467885"/>
+          </a:xfrm>
+          <a:prstGeom prst="rect">
+            <a:avLst/>
+          </a:prstGeom>
+          <a:noFill/>
+        </p:spPr>
+        <p:txBody>
+          <a:bodyPr wrap="square" rtlCol="0" anchor="ctr">
+            <a:spAutoFit/>
+          </a:bodyPr>
+          <a:lstStyle/>
+          <a:p>
+            <a:pPr>
+              <a:lnSpc>
+                <a:spcPct val="150000"/>
+              </a:lnSpc>
+            </a:pPr>
+            <a:r>
+              <a:rPr lang="en-US" dirty="0"/>
+              <a:t>Instructor Phone:</a:t>
+            </a:r>
+          </a:p>
+        </p:txBody>
+      </p:sp>
+      <p:sp>
+        <p:nvSpPr>
+          <p:cNvPr id="9" name="TextBox 8">
+            <a:extLst>
+              <a:ext uri="{FF2B5EF4-FFF2-40B4-BE49-F238E27FC236}">
+                <a16:creationId xmlns:a16="http://schemas.microsoft.com/office/drawing/2014/main" id="{2E9B31D2-1C0F-E764-95A6-7A14782F8290}"/>
+              </a:ext>
+            </a:extLst>
+          </p:cNvPr>
+          <p:cNvSpPr txBox="1"/>
+          <p:nvPr/>
+        </p:nvSpPr>
+        <p:spPr>
+          <a:xfrm>
+            <a:off x="2628831" y="3666237"/>
+            <a:ext cx="2072640" cy="467885"/>
+          </a:xfrm>
+          <a:prstGeom prst="rect">
+            <a:avLst/>
+          </a:prstGeom>
+          <a:noFill/>
+        </p:spPr>
+        <p:txBody>
+          <a:bodyPr wrap="square" rtlCol="0" anchor="ctr">
+            <a:spAutoFit/>
+          </a:bodyPr>
+          <a:lstStyle/>
+          <a:p>
+            <a:pPr>
+              <a:lnSpc>
+                <a:spcPct val="150000"/>
+              </a:lnSpc>
+            </a:pPr>
+            <a:r>
+              <a:rPr lang="en-US" dirty="0"/>
+              <a:t>Instructor Email:</a:t>
+            </a:r>
+          </a:p>
+        </p:txBody>
+      </p:sp>
+      <p:sp>
+        <p:nvSpPr>
+          <p:cNvPr id="11" name="Rectangle 10">
+            <a:extLst>
+              <a:ext uri="{FF2B5EF4-FFF2-40B4-BE49-F238E27FC236}">
+                <a16:creationId xmlns:a16="http://schemas.microsoft.com/office/drawing/2014/main" id="{EECFAE61-A951-C549-B0A3-58545B7289AB}"/>
+              </a:ext>
+            </a:extLst>
+          </p:cNvPr>
+          <p:cNvSpPr/>
+          <p:nvPr/>
+        </p:nvSpPr>
+        <p:spPr>
+          <a:xfrm>
+            <a:off x="4461475" y="1425151"/>
+            <a:ext cx="4169329" cy="369332"/>
+          </a:xfrm>
+          <a:prstGeom prst="rect">
+            <a:avLst/>
+          </a:prstGeom>
+        </p:spPr>
+        <p:style>
+          <a:lnRef idx="2">
+            <a:schemeClr val="accent1">
+              <a:shade val="15000"/>
+            </a:schemeClr>
+          </a:lnRef>
+          <a:fillRef idx="1">
+            <a:schemeClr val="accent1"/>
+          </a:fillRef>
+          <a:effectRef idx="0">
+            <a:schemeClr val="accent1"/>
+          </a:effectRef>
+          <a:fontRef idx="minor">
+            <a:schemeClr val="lt1"/>
+          </a:fontRef>
+        </p:style>
+        <p:txBody>
+          <a:bodyPr rtlCol="0" anchor="ctr"/>
+          <a:lstStyle/>
+          <a:p>
+            <a:pPr algn="ctr"/>
+            <a:r>
+              <a:rPr lang="en-US" dirty="0"/>
+              <a:t>Select Date</a:t>
+            </a:r>
+          </a:p>
+        </p:txBody>
+      </p:sp>
+      <p:sp>
+        <p:nvSpPr>
+          <p:cNvPr id="12" name="Rectangle 11">
+            <a:extLst>
+              <a:ext uri="{FF2B5EF4-FFF2-40B4-BE49-F238E27FC236}">
+                <a16:creationId xmlns:a16="http://schemas.microsoft.com/office/drawing/2014/main" id="{428AFBCD-0C7C-30DB-68D6-1B0FF0B8159F}"/>
+              </a:ext>
+            </a:extLst>
+          </p:cNvPr>
+          <p:cNvSpPr/>
+          <p:nvPr/>
+        </p:nvSpPr>
+        <p:spPr>
+          <a:xfrm>
+            <a:off x="4461474" y="1851489"/>
+            <a:ext cx="4169329" cy="369332"/>
+          </a:xfrm>
+          <a:prstGeom prst="rect">
+            <a:avLst/>
+          </a:prstGeom>
+        </p:spPr>
+        <p:style>
+          <a:lnRef idx="2">
+            <a:schemeClr val="accent1">
+              <a:shade val="15000"/>
+            </a:schemeClr>
+          </a:lnRef>
+          <a:fillRef idx="1">
+            <a:schemeClr val="accent1"/>
+          </a:fillRef>
+          <a:effectRef idx="0">
+            <a:schemeClr val="accent1"/>
+          </a:effectRef>
+          <a:fontRef idx="minor">
+            <a:schemeClr val="lt1"/>
+          </a:fontRef>
+        </p:style>
+        <p:txBody>
+          <a:bodyPr rtlCol="0" anchor="ctr"/>
+          <a:lstStyle/>
+          <a:p>
+            <a:pPr algn="ctr"/>
+            <a:r>
+              <a:rPr lang="en-US" dirty="0"/>
+              <a:t>Select Date </a:t>
+            </a:r>
+          </a:p>
+        </p:txBody>
+      </p:sp>
+      <p:sp>
+        <p:nvSpPr>
+          <p:cNvPr id="13" name="Rectangle 12">
+            <a:extLst>
+              <a:ext uri="{FF2B5EF4-FFF2-40B4-BE49-F238E27FC236}">
+                <a16:creationId xmlns:a16="http://schemas.microsoft.com/office/drawing/2014/main" id="{4E375782-4577-007A-6EF2-3EAB5FC28965}"/>
+              </a:ext>
+            </a:extLst>
+          </p:cNvPr>
+          <p:cNvSpPr/>
+          <p:nvPr/>
+        </p:nvSpPr>
+        <p:spPr>
+          <a:xfrm>
+            <a:off x="4461474" y="2299051"/>
+            <a:ext cx="4169329" cy="369332"/>
+          </a:xfrm>
+          <a:prstGeom prst="rect">
+            <a:avLst/>
+          </a:prstGeom>
+        </p:spPr>
+        <p:style>
+          <a:lnRef idx="2">
+            <a:schemeClr val="accent1">
+              <a:shade val="15000"/>
+            </a:schemeClr>
+          </a:lnRef>
+          <a:fillRef idx="1">
+            <a:schemeClr val="accent1"/>
+          </a:fillRef>
+          <a:effectRef idx="0">
+            <a:schemeClr val="accent1"/>
+          </a:effectRef>
+          <a:fontRef idx="minor">
+            <a:schemeClr val="lt1"/>
+          </a:fontRef>
+        </p:style>
+        <p:txBody>
+          <a:bodyPr rtlCol="0" anchor="ctr"/>
+          <a:lstStyle/>
+          <a:p>
+            <a:pPr algn="ctr"/>
+            <a:endParaRPr lang="en-US"/>
+          </a:p>
+        </p:txBody>
+      </p:sp>
+      <p:sp>
+        <p:nvSpPr>
+          <p:cNvPr id="14" name="Rectangle 13">
+            <a:extLst>
+              <a:ext uri="{FF2B5EF4-FFF2-40B4-BE49-F238E27FC236}">
+                <a16:creationId xmlns:a16="http://schemas.microsoft.com/office/drawing/2014/main" id="{46C31985-F584-7FAD-3C86-836DFF83CF08}"/>
+              </a:ext>
+            </a:extLst>
+          </p:cNvPr>
+          <p:cNvSpPr/>
+          <p:nvPr/>
+        </p:nvSpPr>
+        <p:spPr>
+          <a:xfrm>
+            <a:off x="4461474" y="2782176"/>
+            <a:ext cx="4169329" cy="369332"/>
+          </a:xfrm>
+          <a:prstGeom prst="rect">
+            <a:avLst/>
+          </a:prstGeom>
+        </p:spPr>
+        <p:style>
+          <a:lnRef idx="2">
+            <a:schemeClr val="accent1">
+              <a:shade val="15000"/>
+            </a:schemeClr>
+          </a:lnRef>
+          <a:fillRef idx="1">
+            <a:schemeClr val="accent1"/>
+          </a:fillRef>
+          <a:effectRef idx="0">
+            <a:schemeClr val="accent1"/>
+          </a:effectRef>
+          <a:fontRef idx="minor">
+            <a:schemeClr val="lt1"/>
+          </a:fontRef>
+        </p:style>
+        <p:txBody>
+          <a:bodyPr rtlCol="0" anchor="ctr"/>
+          <a:lstStyle/>
+          <a:p>
+            <a:pPr algn="ctr"/>
+            <a:endParaRPr lang="en-US"/>
+          </a:p>
+        </p:txBody>
+      </p:sp>
+      <p:sp>
+        <p:nvSpPr>
+          <p:cNvPr id="15" name="Rectangle 14">
+            <a:extLst>
+              <a:ext uri="{FF2B5EF4-FFF2-40B4-BE49-F238E27FC236}">
+                <a16:creationId xmlns:a16="http://schemas.microsoft.com/office/drawing/2014/main" id="{95F534C6-485B-5604-5832-1D97FDCA1B85}"/>
+              </a:ext>
+            </a:extLst>
+          </p:cNvPr>
+          <p:cNvSpPr/>
+          <p:nvPr/>
+        </p:nvSpPr>
+        <p:spPr>
+          <a:xfrm>
+            <a:off x="4461474" y="3266126"/>
+            <a:ext cx="4169329" cy="369332"/>
+          </a:xfrm>
+          <a:prstGeom prst="rect">
+            <a:avLst/>
+          </a:prstGeom>
+        </p:spPr>
+        <p:style>
+          <a:lnRef idx="2">
+            <a:schemeClr val="accent1">
+              <a:shade val="15000"/>
+            </a:schemeClr>
+          </a:lnRef>
+          <a:fillRef idx="1">
+            <a:schemeClr val="accent1"/>
+          </a:fillRef>
+          <a:effectRef idx="0">
+            <a:schemeClr val="accent1"/>
+          </a:effectRef>
+          <a:fontRef idx="minor">
+            <a:schemeClr val="lt1"/>
+          </a:fontRef>
+        </p:style>
+        <p:txBody>
+          <a:bodyPr rtlCol="0" anchor="ctr"/>
+          <a:lstStyle/>
+          <a:p>
+            <a:pPr algn="ctr"/>
+            <a:endParaRPr lang="en-US"/>
+          </a:p>
+        </p:txBody>
+      </p:sp>
+      <p:sp>
+        <p:nvSpPr>
+          <p:cNvPr id="16" name="Rectangle 15">
+            <a:extLst>
+              <a:ext uri="{FF2B5EF4-FFF2-40B4-BE49-F238E27FC236}">
+                <a16:creationId xmlns:a16="http://schemas.microsoft.com/office/drawing/2014/main" id="{4870A1F6-79DB-2F15-51A9-B31E132B39F9}"/>
+              </a:ext>
+            </a:extLst>
+          </p:cNvPr>
+          <p:cNvSpPr/>
+          <p:nvPr/>
+        </p:nvSpPr>
+        <p:spPr>
+          <a:xfrm>
+            <a:off x="4461474" y="3761299"/>
+            <a:ext cx="4169329" cy="369332"/>
+          </a:xfrm>
+          <a:prstGeom prst="rect">
+            <a:avLst/>
+          </a:prstGeom>
+        </p:spPr>
+        <p:style>
+          <a:lnRef idx="2">
+            <a:schemeClr val="accent1">
+              <a:shade val="15000"/>
+            </a:schemeClr>
+          </a:lnRef>
+          <a:fillRef idx="1">
+            <a:schemeClr val="accent1"/>
+          </a:fillRef>
+          <a:effectRef idx="0">
+            <a:schemeClr val="accent1"/>
+          </a:effectRef>
+          <a:fontRef idx="minor">
+            <a:schemeClr val="lt1"/>
+          </a:fontRef>
+        </p:style>
+        <p:txBody>
+          <a:bodyPr rtlCol="0" anchor="ctr"/>
+          <a:lstStyle/>
+          <a:p>
+            <a:pPr algn="ctr"/>
+            <a:endParaRPr lang="en-US"/>
+          </a:p>
+        </p:txBody>
+      </p:sp>
+      <p:sp>
+        <p:nvSpPr>
+          <p:cNvPr id="17" name="Rectangle 16">
+            <a:extLst>
+              <a:ext uri="{FF2B5EF4-FFF2-40B4-BE49-F238E27FC236}">
+                <a16:creationId xmlns:a16="http://schemas.microsoft.com/office/drawing/2014/main" id="{55F14826-3559-CA0F-E2B7-4370320F7A79}"/>
+              </a:ext>
+            </a:extLst>
+          </p:cNvPr>
+          <p:cNvSpPr/>
+          <p:nvPr/>
+        </p:nvSpPr>
+        <p:spPr>
+          <a:xfrm>
+            <a:off x="4461470" y="4994571"/>
+            <a:ext cx="4169329" cy="369332"/>
+          </a:xfrm>
+          <a:prstGeom prst="rect">
+            <a:avLst/>
+          </a:prstGeom>
+        </p:spPr>
+        <p:style>
+          <a:lnRef idx="2">
+            <a:schemeClr val="accent1">
+              <a:shade val="15000"/>
+            </a:schemeClr>
+          </a:lnRef>
+          <a:fillRef idx="1">
+            <a:schemeClr val="accent1"/>
+          </a:fillRef>
+          <a:effectRef idx="0">
+            <a:schemeClr val="accent1"/>
+          </a:effectRef>
+          <a:fontRef idx="minor">
+            <a:schemeClr val="lt1"/>
+          </a:fontRef>
+        </p:style>
+        <p:txBody>
+          <a:bodyPr rtlCol="0" anchor="ctr"/>
+          <a:lstStyle/>
+          <a:p>
+            <a:pPr algn="ctr"/>
+            <a:r>
+              <a:rPr lang="en-US" dirty="0"/>
+              <a:t>SHARE</a:t>
+            </a:r>
+          </a:p>
+        </p:txBody>
+      </p:sp>
+      <p:sp>
+        <p:nvSpPr>
+          <p:cNvPr id="18" name="Rectangle 17">
+            <a:extLst>
+              <a:ext uri="{FF2B5EF4-FFF2-40B4-BE49-F238E27FC236}">
+                <a16:creationId xmlns:a16="http://schemas.microsoft.com/office/drawing/2014/main" id="{B1A1C0C8-2AAD-B135-4A76-9CBF20B6481F}"/>
+              </a:ext>
+            </a:extLst>
+          </p:cNvPr>
+          <p:cNvSpPr/>
+          <p:nvPr/>
+        </p:nvSpPr>
+        <p:spPr>
+          <a:xfrm>
+            <a:off x="4461469" y="5529580"/>
+            <a:ext cx="4169329" cy="369332"/>
+          </a:xfrm>
+          <a:prstGeom prst="rect">
+            <a:avLst/>
+          </a:prstGeom>
+        </p:spPr>
+        <p:style>
+          <a:lnRef idx="2">
+            <a:schemeClr val="accent1">
+              <a:shade val="15000"/>
+            </a:schemeClr>
+          </a:lnRef>
+          <a:fillRef idx="1">
+            <a:schemeClr val="accent1"/>
+          </a:fillRef>
+          <a:effectRef idx="0">
+            <a:schemeClr val="accent1"/>
+          </a:effectRef>
+          <a:fontRef idx="minor">
+            <a:schemeClr val="lt1"/>
+          </a:fontRef>
+        </p:style>
+        <p:txBody>
+          <a:bodyPr rtlCol="0" anchor="ctr"/>
+          <a:lstStyle/>
+          <a:p>
+            <a:pPr algn="ctr"/>
+            <a:r>
+              <a:rPr lang="en-US" dirty="0"/>
+              <a:t>Yes/No</a:t>
+            </a:r>
+          </a:p>
+        </p:txBody>
+      </p:sp>
+      <p:sp>
+        <p:nvSpPr>
+          <p:cNvPr id="19" name="Arrow: Down 18">
+            <a:extLst>
+              <a:ext uri="{FF2B5EF4-FFF2-40B4-BE49-F238E27FC236}">
+                <a16:creationId xmlns:a16="http://schemas.microsoft.com/office/drawing/2014/main" id="{8EFADC95-B620-D8E3-7C2C-8AA9E3189600}"/>
+              </a:ext>
+            </a:extLst>
+          </p:cNvPr>
+          <p:cNvSpPr/>
+          <p:nvPr/>
+        </p:nvSpPr>
+        <p:spPr>
+          <a:xfrm>
+            <a:off x="8194786" y="2327869"/>
+            <a:ext cx="268447" cy="361448"/>
+          </a:xfrm>
+          <a:prstGeom prst="downArrow">
+            <a:avLst/>
+          </a:prstGeom>
+          <a:solidFill>
+            <a:schemeClr val="bg1"/>
+          </a:solidFill>
+        </p:spPr>
+        <p:style>
+          <a:lnRef idx="2">
+            <a:schemeClr val="accent1">
+              <a:shade val="15000"/>
+            </a:schemeClr>
+          </a:lnRef>
+          <a:fillRef idx="1">
+            <a:schemeClr val="accent1"/>
+          </a:fillRef>
+          <a:effectRef idx="0">
+            <a:schemeClr val="accent1"/>
+          </a:effectRef>
+          <a:fontRef idx="minor">
+            <a:schemeClr val="lt1"/>
+          </a:fontRef>
+        </p:style>
+        <p:txBody>
+          <a:bodyPr rtlCol="0" anchor="ctr"/>
+          <a:lstStyle/>
+          <a:p>
+            <a:pPr algn="ctr"/>
+            <a:endParaRPr lang="en-US"/>
+          </a:p>
+        </p:txBody>
+      </p:sp>
+      <p:sp>
+        <p:nvSpPr>
+          <p:cNvPr id="20" name="Rectangle 19">
+            <a:extLst>
+              <a:ext uri="{FF2B5EF4-FFF2-40B4-BE49-F238E27FC236}">
+                <a16:creationId xmlns:a16="http://schemas.microsoft.com/office/drawing/2014/main" id="{5DEC751D-FEF9-2E97-AC82-05318E5C6666}"/>
+              </a:ext>
+            </a:extLst>
+          </p:cNvPr>
+          <p:cNvSpPr/>
+          <p:nvPr/>
+        </p:nvSpPr>
+        <p:spPr>
+          <a:xfrm>
+            <a:off x="8157036" y="1478285"/>
+            <a:ext cx="343948" cy="255469"/>
+          </a:xfrm>
+          <a:prstGeom prst="rect">
+            <a:avLst/>
+          </a:prstGeom>
+          <a:solidFill>
+            <a:schemeClr val="bg1"/>
+          </a:solidFill>
+        </p:spPr>
+        <p:style>
+          <a:lnRef idx="2">
+            <a:schemeClr val="accent1">
+              <a:shade val="15000"/>
+            </a:schemeClr>
+          </a:lnRef>
+          <a:fillRef idx="1">
+            <a:schemeClr val="accent1"/>
+          </a:fillRef>
+          <a:effectRef idx="0">
+            <a:schemeClr val="accent1"/>
+          </a:effectRef>
+          <a:fontRef idx="minor">
+            <a:schemeClr val="lt1"/>
+          </a:fontRef>
+        </p:style>
+        <p:txBody>
+          <a:bodyPr rtlCol="0" anchor="ctr"/>
+          <a:lstStyle/>
+          <a:p>
+            <a:pPr algn="ctr"/>
+            <a:endParaRPr lang="en-US"/>
+          </a:p>
+        </p:txBody>
+      </p:sp>
+      <p:sp>
+        <p:nvSpPr>
+          <p:cNvPr id="21" name="Rectangle 20">
+            <a:extLst>
+              <a:ext uri="{FF2B5EF4-FFF2-40B4-BE49-F238E27FC236}">
+                <a16:creationId xmlns:a16="http://schemas.microsoft.com/office/drawing/2014/main" id="{7045909F-FEC7-CE14-DA90-E3DB98E58347}"/>
+              </a:ext>
+            </a:extLst>
+          </p:cNvPr>
+          <p:cNvSpPr/>
+          <p:nvPr/>
+        </p:nvSpPr>
+        <p:spPr>
+          <a:xfrm>
+            <a:off x="8157036" y="1917920"/>
+            <a:ext cx="343948" cy="255469"/>
+          </a:xfrm>
+          <a:prstGeom prst="rect">
+            <a:avLst/>
+          </a:prstGeom>
+          <a:solidFill>
+            <a:schemeClr val="bg1"/>
+          </a:solidFill>
+        </p:spPr>
+        <p:style>
+          <a:lnRef idx="2">
+            <a:schemeClr val="accent1">
+              <a:shade val="15000"/>
+            </a:schemeClr>
+          </a:lnRef>
+          <a:fillRef idx="1">
+            <a:schemeClr val="accent1"/>
+          </a:fillRef>
+          <a:effectRef idx="0">
+            <a:schemeClr val="accent1"/>
+          </a:effectRef>
+          <a:fontRef idx="minor">
+            <a:schemeClr val="lt1"/>
+          </a:fontRef>
+        </p:style>
+        <p:txBody>
+          <a:bodyPr rtlCol="0" anchor="ctr"/>
+          <a:lstStyle/>
+          <a:p>
+            <a:pPr algn="ctr"/>
+            <a:endParaRPr lang="en-US"/>
+          </a:p>
+        </p:txBody>
+      </p:sp>
+      <p:sp>
+        <p:nvSpPr>
+          <p:cNvPr id="22" name="TextBox 21">
+            <a:extLst>
+              <a:ext uri="{FF2B5EF4-FFF2-40B4-BE49-F238E27FC236}">
+                <a16:creationId xmlns:a16="http://schemas.microsoft.com/office/drawing/2014/main" id="{2092905E-42E7-474A-F4A1-E7A4ABBFDE6C}"/>
+              </a:ext>
+            </a:extLst>
+          </p:cNvPr>
+          <p:cNvSpPr txBox="1"/>
+          <p:nvPr/>
+        </p:nvSpPr>
+        <p:spPr>
+          <a:xfrm>
+            <a:off x="2628831" y="5438083"/>
+            <a:ext cx="1578879" cy="467885"/>
+          </a:xfrm>
+          <a:prstGeom prst="rect">
+            <a:avLst/>
+          </a:prstGeom>
+          <a:noFill/>
+        </p:spPr>
+        <p:txBody>
+          <a:bodyPr wrap="square" rtlCol="0" anchor="ctr">
+            <a:spAutoFit/>
+          </a:bodyPr>
+          <a:lstStyle/>
+          <a:p>
+            <a:pPr>
+              <a:lnSpc>
+                <a:spcPct val="150000"/>
+              </a:lnSpc>
+            </a:pPr>
+            <a:r>
+              <a:rPr lang="en-US" dirty="0"/>
+              <a:t>Notifications</a:t>
+            </a:r>
+          </a:p>
+        </p:txBody>
+      </p:sp>
+      <p:sp>
+        <p:nvSpPr>
+          <p:cNvPr id="23" name="TextBox 22">
+            <a:extLst>
+              <a:ext uri="{FF2B5EF4-FFF2-40B4-BE49-F238E27FC236}">
+                <a16:creationId xmlns:a16="http://schemas.microsoft.com/office/drawing/2014/main" id="{05DE5635-BAA2-59B7-2934-62F14E624DED}"/>
+              </a:ext>
+            </a:extLst>
+          </p:cNvPr>
+          <p:cNvSpPr txBox="1"/>
+          <p:nvPr/>
+        </p:nvSpPr>
+        <p:spPr>
+          <a:xfrm>
+            <a:off x="2628831" y="4079987"/>
+            <a:ext cx="2072640" cy="467885"/>
+          </a:xfrm>
+          <a:prstGeom prst="rect">
+            <a:avLst/>
+          </a:prstGeom>
+          <a:noFill/>
+        </p:spPr>
+        <p:txBody>
+          <a:bodyPr wrap="square" rtlCol="0" anchor="ctr">
+            <a:spAutoFit/>
+          </a:bodyPr>
+          <a:lstStyle/>
+          <a:p>
+            <a:pPr>
+              <a:lnSpc>
+                <a:spcPct val="150000"/>
+              </a:lnSpc>
+            </a:pPr>
+            <a:r>
+              <a:rPr lang="en-US" dirty="0"/>
+              <a:t>Notes:</a:t>
+            </a:r>
+          </a:p>
+        </p:txBody>
+      </p:sp>
+      <p:sp>
+        <p:nvSpPr>
+          <p:cNvPr id="24" name="Rectangle 23">
+            <a:extLst>
+              <a:ext uri="{FF2B5EF4-FFF2-40B4-BE49-F238E27FC236}">
+                <a16:creationId xmlns:a16="http://schemas.microsoft.com/office/drawing/2014/main" id="{D58235B9-5C16-C710-7975-5E7383672CA0}"/>
+              </a:ext>
+            </a:extLst>
+          </p:cNvPr>
+          <p:cNvSpPr/>
+          <p:nvPr/>
+        </p:nvSpPr>
+        <p:spPr>
+          <a:xfrm>
+            <a:off x="4461471" y="4271834"/>
+            <a:ext cx="4169329" cy="589020"/>
+          </a:xfrm>
+          <a:prstGeom prst="rect">
+            <a:avLst/>
+          </a:prstGeom>
+        </p:spPr>
+        <p:style>
+          <a:lnRef idx="2">
+            <a:schemeClr val="accent1">
+              <a:shade val="15000"/>
+            </a:schemeClr>
+          </a:lnRef>
+          <a:fillRef idx="1">
+            <a:schemeClr val="accent1"/>
+          </a:fillRef>
+          <a:effectRef idx="0">
+            <a:schemeClr val="accent1"/>
+          </a:effectRef>
+          <a:fontRef idx="minor">
+            <a:schemeClr val="lt1"/>
+          </a:fontRef>
+        </p:style>
+        <p:txBody>
+          <a:bodyPr rtlCol="0" anchor="ctr"/>
+          <a:lstStyle/>
+          <a:p>
+            <a:pPr algn="ctr"/>
+            <a:endParaRPr lang="en-US"/>
+          </a:p>
+        </p:txBody>
+      </p:sp>
+      <p:sp>
+        <p:nvSpPr>
+          <p:cNvPr id="25" name="TextBox 24">
+            <a:extLst>
+              <a:ext uri="{FF2B5EF4-FFF2-40B4-BE49-F238E27FC236}">
+                <a16:creationId xmlns:a16="http://schemas.microsoft.com/office/drawing/2014/main" id="{0E2BB12F-4858-E825-0DBE-5ED4135EA713}"/>
+              </a:ext>
+            </a:extLst>
+          </p:cNvPr>
+          <p:cNvSpPr txBox="1"/>
+          <p:nvPr/>
+        </p:nvSpPr>
+        <p:spPr>
+          <a:xfrm>
+            <a:off x="5637402" y="664124"/>
+            <a:ext cx="2097248" cy="369332"/>
+          </a:xfrm>
+          <a:prstGeom prst="rect">
+            <a:avLst/>
+          </a:prstGeom>
+          <a:noFill/>
+        </p:spPr>
+        <p:txBody>
+          <a:bodyPr wrap="square" rtlCol="0">
+            <a:spAutoFit/>
+          </a:bodyPr>
+          <a:lstStyle/>
+          <a:p>
+            <a:r>
+              <a:rPr lang="en-US" dirty="0"/>
+              <a:t>Due Date</a:t>
+            </a:r>
+          </a:p>
+        </p:txBody>
+      </p:sp>
+      <p:sp>
+        <p:nvSpPr>
+          <p:cNvPr id="26" name="TextBox 25">
+            <a:extLst>
+              <a:ext uri="{FF2B5EF4-FFF2-40B4-BE49-F238E27FC236}">
+                <a16:creationId xmlns:a16="http://schemas.microsoft.com/office/drawing/2014/main" id="{ABEF90B0-974C-F254-8BFE-F6756AB6069E}"/>
+              </a:ext>
+            </a:extLst>
+          </p:cNvPr>
+          <p:cNvSpPr txBox="1"/>
+          <p:nvPr/>
+        </p:nvSpPr>
+        <p:spPr>
+          <a:xfrm>
+            <a:off x="2621211" y="4945294"/>
+            <a:ext cx="1525888" cy="467885"/>
+          </a:xfrm>
+          <a:prstGeom prst="rect">
+            <a:avLst/>
+          </a:prstGeom>
+          <a:noFill/>
+        </p:spPr>
+        <p:txBody>
+          <a:bodyPr wrap="square" rtlCol="0" anchor="ctr">
+            <a:spAutoFit/>
+          </a:bodyPr>
+          <a:lstStyle/>
+          <a:p>
+            <a:pPr>
+              <a:lnSpc>
+                <a:spcPct val="150000"/>
+              </a:lnSpc>
+            </a:pPr>
+            <a:r>
+              <a:rPr lang="en-US" dirty="0"/>
+              <a:t>Share notes:</a:t>
+            </a:r>
+          </a:p>
+        </p:txBody>
+      </p:sp>
+    </p:spTree>
+    <p:extLst>
+      <p:ext uri="{BB962C8B-B14F-4D97-AF65-F5344CB8AC3E}">
+        <p14:creationId xmlns:p14="http://schemas.microsoft.com/office/powerpoint/2010/main" val="736734725"/>
+      </p:ext>
+    </p:extLst>
+  </p:cSld>
+  <p:clrMapOvr>
+    <a:masterClrMapping/>
+  </p:clrMapOvr>
+</p:sld>
+</file>
+
+<file path=ppt/slides/slide6.xml><?xml version="1.0" encoding="utf-8"?>
+<p:sld xmlns:a="http://schemas.openxmlformats.org/drawingml/2006/main" xmlns:r="http://schemas.openxmlformats.org/officeDocument/2006/relationships" xmlns:p="http://schemas.openxmlformats.org/presentationml/2006/main">
+  <p:cSld>
+    <p:spTree>
+      <p:nvGrpSpPr>
+        <p:cNvPr id="1" name=""/>
+        <p:cNvGrpSpPr/>
+        <p:nvPr/>
+      </p:nvGrpSpPr>
+      <p:grpSpPr>
+        <a:xfrm>
+          <a:off x="0" y="0"/>
+          <a:ext cx="0" cy="0"/>
+          <a:chOff x="0" y="0"/>
+          <a:chExt cx="0" cy="0"/>
+        </a:xfrm>
+      </p:grpSpPr>
+    </p:spTree>
+    <p:extLst>
+      <p:ext uri="{BB962C8B-B14F-4D97-AF65-F5344CB8AC3E}">
+        <p14:creationId xmlns:p14="http://schemas.microsoft.com/office/powerpoint/2010/main" val="213476011"/>
+      </p:ext>
+    </p:extLst>
+  </p:cSld>
+  <p:clrMapOvr>
+    <a:masterClrMapping/>
+  </p:clrMapOvr>
+</p:sld>
+</file>
+
+<file path=ppt/slides/slide7.xml><?xml version="1.0" encoding="utf-8"?>
+<p:sld xmlns:a="http://schemas.openxmlformats.org/drawingml/2006/main" xmlns:r="http://schemas.openxmlformats.org/officeDocument/2006/relationships" xmlns:p="http://schemas.openxmlformats.org/presentationml/2006/main">
+  <p:cSld>
+    <p:spTree>
+      <p:nvGrpSpPr>
+        <p:cNvPr id="1" name=""/>
+        <p:cNvGrpSpPr/>
+        <p:nvPr/>
+      </p:nvGrpSpPr>
+      <p:grpSpPr>
+        <a:xfrm>
+          <a:off x="0" y="0"/>
+          <a:ext cx="0" cy="0"/>
+          <a:chOff x="0" y="0"/>
+          <a:chExt cx="0" cy="0"/>
+        </a:xfrm>
+      </p:grpSpPr>
+    </p:spTree>
+    <p:extLst>
+      <p:ext uri="{BB962C8B-B14F-4D97-AF65-F5344CB8AC3E}">
+        <p14:creationId xmlns:p14="http://schemas.microsoft.com/office/powerpoint/2010/main" val="2366562482"/>
+      </p:ext>
+    </p:extLst>
+  </p:cSld>
+  <p:clrMapOvr>
+    <a:masterClrMapping/>
+  </p:clrMapOvr>
+</p:sld>
+</file>
+
+<file path=ppt/slides/slide8.xml><?xml version="1.0" encoding="utf-8"?>
+<p:sld xmlns:a="http://schemas.openxmlformats.org/drawingml/2006/main" xmlns:r="http://schemas.openxmlformats.org/officeDocument/2006/relationships" xmlns:p="http://schemas.openxmlformats.org/presentationml/2006/main">
+  <p:cSld>
+    <p:spTree>
+      <p:nvGrpSpPr>
+        <p:cNvPr id="1" name=""/>
+        <p:cNvGrpSpPr/>
+        <p:nvPr/>
+      </p:nvGrpSpPr>
+      <p:grpSpPr>
+        <a:xfrm>
+          <a:off x="0" y="0"/>
+          <a:ext cx="0" cy="0"/>
+          <a:chOff x="0" y="0"/>
+          <a:chExt cx="0" cy="0"/>
+        </a:xfrm>
+      </p:grpSpPr>
+    </p:spTree>
+    <p:extLst>
+      <p:ext uri="{BB962C8B-B14F-4D97-AF65-F5344CB8AC3E}">
+        <p14:creationId xmlns:p14="http://schemas.microsoft.com/office/powerpoint/2010/main" val="3733978778"/>
       </p:ext>
     </p:extLst>
   </p:cSld>

</xml_diff>

<commit_message>
B2 - add courses slides
</commit_message>
<xml_diff>
--- a/b1.pptx
+++ b/b1.pptx
@@ -122,7 +122,7 @@
 <file path=ppt/revisionInfo.xml><?xml version="1.0" encoding="utf-8"?>
 <p1510:revInfo xmlns:a="http://schemas.openxmlformats.org/drawingml/2006/main" xmlns:r="http://schemas.openxmlformats.org/officeDocument/2006/relationships" xmlns:p1510="http://schemas.microsoft.com/office/powerpoint/2015/10/main">
   <p1510:revLst>
-    <p1510:client id="{C5F0709F-BDA2-4D97-972B-42FAEC705165}" v="51" dt="2026-02-01T03:21:02.126"/>
+    <p1510:client id="{C5F0709F-BDA2-4D97-972B-42FAEC705165}" v="52" dt="2026-02-01T03:26:39.527"/>
   </p1510:revLst>
 </p1510:revInfo>
 </file>
@@ -132,7 +132,7 @@
   <pc:docChgLst>
     <pc:chgData name="Ravi Potes Mangra" userId="f6c3e66e-970a-4dac-abef-28c459f30976" providerId="ADAL" clId="{B2C1E8EB-EB94-44CA-9F50-E86E778B07B8}"/>
     <pc:docChg chg="undo custSel addSld modSld">
-      <pc:chgData name="Ravi Potes Mangra" userId="f6c3e66e-970a-4dac-abef-28c459f30976" providerId="ADAL" clId="{B2C1E8EB-EB94-44CA-9F50-E86E778B07B8}" dt="2026-02-01T03:21:10.097" v="850" actId="20577"/>
+      <pc:chgData name="Ravi Potes Mangra" userId="f6c3e66e-970a-4dac-abef-28c459f30976" providerId="ADAL" clId="{B2C1E8EB-EB94-44CA-9F50-E86E778B07B8}" dt="2026-02-01T03:26:45.649" v="878" actId="20577"/>
       <pc:docMkLst>
         <pc:docMk/>
       </pc:docMkLst>
@@ -622,7 +622,7 @@
         </pc:spChg>
       </pc:sldChg>
       <pc:sldChg chg="addSp delSp modSp new mod">
-        <pc:chgData name="Ravi Potes Mangra" userId="f6c3e66e-970a-4dac-abef-28c459f30976" providerId="ADAL" clId="{B2C1E8EB-EB94-44CA-9F50-E86E778B07B8}" dt="2026-02-01T02:09:27.271" v="700" actId="1076"/>
+        <pc:chgData name="Ravi Potes Mangra" userId="f6c3e66e-970a-4dac-abef-28c459f30976" providerId="ADAL" clId="{B2C1E8EB-EB94-44CA-9F50-E86E778B07B8}" dt="2026-02-01T03:26:45.649" v="878" actId="20577"/>
         <pc:sldMkLst>
           <pc:docMk/>
           <pc:sldMk cId="736734725" sldId="259"/>
@@ -636,7 +636,7 @@
           </ac:spMkLst>
         </pc:spChg>
         <pc:spChg chg="add mod">
-          <ac:chgData name="Ravi Potes Mangra" userId="f6c3e66e-970a-4dac-abef-28c459f30976" providerId="ADAL" clId="{B2C1E8EB-EB94-44CA-9F50-E86E778B07B8}" dt="2026-01-31T21:11:40.748" v="590" actId="1076"/>
+          <ac:chgData name="Ravi Potes Mangra" userId="f6c3e66e-970a-4dac-abef-28c459f30976" providerId="ADAL" clId="{B2C1E8EB-EB94-44CA-9F50-E86E778B07B8}" dt="2026-02-01T03:26:17.909" v="864" actId="1076"/>
           <ac:spMkLst>
             <pc:docMk/>
             <pc:sldMk cId="736734725" sldId="259"/>
@@ -665,6 +665,14 @@
             <pc:docMk/>
             <pc:sldMk cId="736734725" sldId="259"/>
             <ac:spMk id="8" creationId="{6C0F801F-CB1F-9C2E-3125-EF1D921E457E}"/>
+          </ac:spMkLst>
+        </pc:spChg>
+        <pc:spChg chg="add mod">
+          <ac:chgData name="Ravi Potes Mangra" userId="f6c3e66e-970a-4dac-abef-28c459f30976" providerId="ADAL" clId="{B2C1E8EB-EB94-44CA-9F50-E86E778B07B8}" dt="2026-02-01T03:26:36.752" v="869" actId="14100"/>
+          <ac:spMkLst>
+            <pc:docMk/>
+            <pc:sldMk cId="736734725" sldId="259"/>
+            <ac:spMk id="10" creationId="{A9B2CF59-DC7A-D0DB-8B81-C4AE63011FCB}"/>
           </ac:spMkLst>
         </pc:spChg>
         <pc:spChg chg="del mod">
@@ -740,7 +748,7 @@
           </ac:spMkLst>
         </pc:spChg>
         <pc:spChg chg="add mod">
-          <ac:chgData name="Ravi Potes Mangra" userId="f6c3e66e-970a-4dac-abef-28c459f30976" providerId="ADAL" clId="{B2C1E8EB-EB94-44CA-9F50-E86E778B07B8}" dt="2026-01-31T21:11:55.444" v="603" actId="1076"/>
+          <ac:chgData name="Ravi Potes Mangra" userId="f6c3e66e-970a-4dac-abef-28c459f30976" providerId="ADAL" clId="{B2C1E8EB-EB94-44CA-9F50-E86E778B07B8}" dt="2026-02-01T03:26:11.527" v="860" actId="1076"/>
           <ac:spMkLst>
             <pc:docMk/>
             <pc:sldMk cId="736734725" sldId="259"/>
@@ -753,6 +761,14 @@
             <pc:docMk/>
             <pc:sldMk cId="736734725" sldId="259"/>
             <ac:spMk id="26" creationId="{ABEF90B0-974C-F254-8BFE-F6756AB6069E}"/>
+          </ac:spMkLst>
+        </pc:spChg>
+        <pc:spChg chg="add mod">
+          <ac:chgData name="Ravi Potes Mangra" userId="f6c3e66e-970a-4dac-abef-28c459f30976" providerId="ADAL" clId="{B2C1E8EB-EB94-44CA-9F50-E86E778B07B8}" dt="2026-02-01T03:26:45.649" v="878" actId="20577"/>
+          <ac:spMkLst>
+            <pc:docMk/>
+            <pc:sldMk cId="736734725" sldId="259"/>
+            <ac:spMk id="27" creationId="{B7904E7D-1A30-37C7-4B6E-1D0B43565CF0}"/>
           </ac:spMkLst>
         </pc:spChg>
       </pc:sldChg>
@@ -6932,8 +6948,8 @@
         </p:nvSpPr>
         <p:spPr>
           <a:xfrm>
-            <a:off x="4768230" y="330068"/>
-            <a:ext cx="3482341" cy="369332"/>
+            <a:off x="4207710" y="303899"/>
+            <a:ext cx="3223329" cy="369332"/>
           </a:xfrm>
           <a:prstGeom prst="rect">
             <a:avLst/>
@@ -7860,7 +7876,7 @@
         </p:nvSpPr>
         <p:spPr>
           <a:xfrm>
-            <a:off x="5637402" y="664124"/>
+            <a:off x="4693851" y="710581"/>
             <a:ext cx="2097248" cy="369332"/>
           </a:xfrm>
           <a:prstGeom prst="rect">
@@ -7917,6 +7933,104 @@
             <a:r>
               <a:rPr lang="en-US" dirty="0"/>
               <a:t>Share notes:</a:t>
+            </a:r>
+          </a:p>
+        </p:txBody>
+      </p:sp>
+      <p:sp>
+        <p:nvSpPr>
+          <p:cNvPr id="10" name="Rectangle 9">
+            <a:extLst>
+              <a:ext uri="{FF2B5EF4-FFF2-40B4-BE49-F238E27FC236}">
+                <a16:creationId xmlns:a16="http://schemas.microsoft.com/office/drawing/2014/main" id="{A9B2CF59-DC7A-D0DB-8B81-C4AE63011FCB}"/>
+              </a:ext>
+            </a:extLst>
+          </p:cNvPr>
+          <p:cNvSpPr/>
+          <p:nvPr/>
+        </p:nvSpPr>
+        <p:spPr>
+          <a:xfrm>
+            <a:off x="7475467" y="167523"/>
+            <a:ext cx="1052013" cy="369332"/>
+          </a:xfrm>
+          <a:prstGeom prst="rect">
+            <a:avLst/>
+          </a:prstGeom>
+        </p:spPr>
+        <p:style>
+          <a:lnRef idx="2">
+            <a:schemeClr val="accent1">
+              <a:shade val="15000"/>
+            </a:schemeClr>
+          </a:lnRef>
+          <a:fillRef idx="1">
+            <a:schemeClr val="accent1"/>
+          </a:fillRef>
+          <a:effectRef idx="0">
+            <a:schemeClr val="accent1"/>
+          </a:effectRef>
+          <a:fontRef idx="minor">
+            <a:schemeClr val="lt1"/>
+          </a:fontRef>
+        </p:style>
+        <p:txBody>
+          <a:bodyPr rtlCol="0" anchor="ctr"/>
+          <a:lstStyle/>
+          <a:p>
+            <a:pPr algn="ctr"/>
+            <a:r>
+              <a:rPr lang="en-US" dirty="0"/>
+              <a:t>Modify</a:t>
+            </a:r>
+          </a:p>
+        </p:txBody>
+      </p:sp>
+      <p:sp>
+        <p:nvSpPr>
+          <p:cNvPr id="27" name="Rectangle 26">
+            <a:extLst>
+              <a:ext uri="{FF2B5EF4-FFF2-40B4-BE49-F238E27FC236}">
+                <a16:creationId xmlns:a16="http://schemas.microsoft.com/office/drawing/2014/main" id="{B7904E7D-1A30-37C7-4B6E-1D0B43565CF0}"/>
+              </a:ext>
+            </a:extLst>
+          </p:cNvPr>
+          <p:cNvSpPr/>
+          <p:nvPr/>
+        </p:nvSpPr>
+        <p:spPr>
+          <a:xfrm>
+            <a:off x="7466552" y="710581"/>
+            <a:ext cx="1052013" cy="369332"/>
+          </a:xfrm>
+          <a:prstGeom prst="rect">
+            <a:avLst/>
+          </a:prstGeom>
+        </p:spPr>
+        <p:style>
+          <a:lnRef idx="2">
+            <a:schemeClr val="accent1">
+              <a:shade val="15000"/>
+            </a:schemeClr>
+          </a:lnRef>
+          <a:fillRef idx="1">
+            <a:schemeClr val="accent1"/>
+          </a:fillRef>
+          <a:effectRef idx="0">
+            <a:schemeClr val="accent1"/>
+          </a:effectRef>
+          <a:fontRef idx="minor">
+            <a:schemeClr val="lt1"/>
+          </a:fontRef>
+        </p:style>
+        <p:txBody>
+          <a:bodyPr rtlCol="0" anchor="ctr"/>
+          <a:lstStyle/>
+          <a:p>
+            <a:pPr algn="ctr"/>
+            <a:r>
+              <a:rPr lang="en-US" dirty="0"/>
+              <a:t>Delete</a:t>
             </a:r>
           </a:p>
         </p:txBody>

</xml_diff>

<commit_message>
B3 - add assessments
</commit_message>
<xml_diff>
--- a/b1.pptx
+++ b/b1.pptx
@@ -122,7 +122,7 @@
 <file path=ppt/revisionInfo.xml><?xml version="1.0" encoding="utf-8"?>
 <p1510:revInfo xmlns:a="http://schemas.openxmlformats.org/drawingml/2006/main" xmlns:r="http://schemas.openxmlformats.org/officeDocument/2006/relationships" xmlns:p1510="http://schemas.microsoft.com/office/powerpoint/2015/10/main">
   <p1510:revLst>
-    <p1510:client id="{C5F0709F-BDA2-4D97-972B-42FAEC705165}" v="52" dt="2026-02-01T03:26:39.527"/>
+    <p1510:client id="{C5F0709F-BDA2-4D97-972B-42FAEC705165}" v="71" dt="2026-02-01T04:12:21.060"/>
   </p1510:revLst>
 </p1510:revInfo>
 </file>
@@ -132,12 +132,12 @@
   <pc:docChgLst>
     <pc:chgData name="Ravi Potes Mangra" userId="f6c3e66e-970a-4dac-abef-28c459f30976" providerId="ADAL" clId="{B2C1E8EB-EB94-44CA-9F50-E86E778B07B8}"/>
     <pc:docChg chg="undo custSel addSld modSld">
-      <pc:chgData name="Ravi Potes Mangra" userId="f6c3e66e-970a-4dac-abef-28c459f30976" providerId="ADAL" clId="{B2C1E8EB-EB94-44CA-9F50-E86E778B07B8}" dt="2026-02-01T03:26:45.649" v="878" actId="20577"/>
+      <pc:chgData name="Ravi Potes Mangra" userId="f6c3e66e-970a-4dac-abef-28c459f30976" providerId="ADAL" clId="{B2C1E8EB-EB94-44CA-9F50-E86E778B07B8}" dt="2026-02-01T04:12:22.829" v="1204" actId="1076"/>
       <pc:docMkLst>
         <pc:docMk/>
       </pc:docMkLst>
       <pc:sldChg chg="addSp modSp mod">
-        <pc:chgData name="Ravi Potes Mangra" userId="f6c3e66e-970a-4dac-abef-28c459f30976" providerId="ADAL" clId="{B2C1E8EB-EB94-44CA-9F50-E86E778B07B8}" dt="2026-02-01T03:19:27.160" v="829" actId="1076"/>
+        <pc:chgData name="Ravi Potes Mangra" userId="f6c3e66e-970a-4dac-abef-28c459f30976" providerId="ADAL" clId="{B2C1E8EB-EB94-44CA-9F50-E86E778B07B8}" dt="2026-02-01T03:54:19.480" v="909" actId="207"/>
         <pc:sldMkLst>
           <pc:docMk/>
           <pc:sldMk cId="1383786992" sldId="256"/>
@@ -150,6 +150,14 @@
             <ac:spMk id="2" creationId="{3AB22F64-D73E-39DB-1D97-F710AF4F5BD2}"/>
           </ac:spMkLst>
         </pc:spChg>
+        <pc:spChg chg="add mod">
+          <ac:chgData name="Ravi Potes Mangra" userId="f6c3e66e-970a-4dac-abef-28c459f30976" providerId="ADAL" clId="{B2C1E8EB-EB94-44CA-9F50-E86E778B07B8}" dt="2026-02-01T03:53:51.219" v="893" actId="20577"/>
+          <ac:spMkLst>
+            <pc:docMk/>
+            <pc:sldMk cId="1383786992" sldId="256"/>
+            <ac:spMk id="3" creationId="{6068CF7C-69A0-2E9B-F147-240CBEFC822A}"/>
+          </ac:spMkLst>
+        </pc:spChg>
         <pc:spChg chg="mod">
           <ac:chgData name="Ravi Potes Mangra" userId="f6c3e66e-970a-4dac-abef-28c459f30976" providerId="ADAL" clId="{B2C1E8EB-EB94-44CA-9F50-E86E778B07B8}" dt="2026-02-01T03:19:27.160" v="829" actId="1076"/>
           <ac:spMkLst>
@@ -174,6 +182,14 @@
             <ac:spMk id="6" creationId="{A938B1ED-F143-EBED-380A-82363B7F70F5}"/>
           </ac:spMkLst>
         </pc:spChg>
+        <pc:spChg chg="add mod">
+          <ac:chgData name="Ravi Potes Mangra" userId="f6c3e66e-970a-4dac-abef-28c459f30976" providerId="ADAL" clId="{B2C1E8EB-EB94-44CA-9F50-E86E778B07B8}" dt="2026-02-01T03:54:19.480" v="909" actId="207"/>
+          <ac:spMkLst>
+            <pc:docMk/>
+            <pc:sldMk cId="1383786992" sldId="256"/>
+            <ac:spMk id="7" creationId="{838DE527-9C94-70ED-B839-55459FA25874}"/>
+          </ac:spMkLst>
+        </pc:spChg>
         <pc:spChg chg="mod">
           <ac:chgData name="Ravi Potes Mangra" userId="f6c3e66e-970a-4dac-abef-28c459f30976" providerId="ADAL" clId="{B2C1E8EB-EB94-44CA-9F50-E86E778B07B8}" dt="2026-02-01T03:18:21.673" v="816" actId="1076"/>
           <ac:spMkLst>
@@ -191,7 +207,7 @@
           </ac:spMkLst>
         </pc:spChg>
         <pc:spChg chg="mod">
-          <ac:chgData name="Ravi Potes Mangra" userId="f6c3e66e-970a-4dac-abef-28c459f30976" providerId="ADAL" clId="{B2C1E8EB-EB94-44CA-9F50-E86E778B07B8}" dt="2026-02-01T03:18:21.673" v="816" actId="1076"/>
+          <ac:chgData name="Ravi Potes Mangra" userId="f6c3e66e-970a-4dac-abef-28c459f30976" providerId="ADAL" clId="{B2C1E8EB-EB94-44CA-9F50-E86E778B07B8}" dt="2026-02-01T03:53:32.453" v="881" actId="1076"/>
           <ac:spMkLst>
             <pc:docMk/>
             <pc:sldMk cId="1383786992" sldId="256"/>
@@ -199,7 +215,7 @@
           </ac:spMkLst>
         </pc:spChg>
         <pc:spChg chg="mod">
-          <ac:chgData name="Ravi Potes Mangra" userId="f6c3e66e-970a-4dac-abef-28c459f30976" providerId="ADAL" clId="{B2C1E8EB-EB94-44CA-9F50-E86E778B07B8}" dt="2026-02-01T03:18:21.673" v="816" actId="1076"/>
+          <ac:chgData name="Ravi Potes Mangra" userId="f6c3e66e-970a-4dac-abef-28c459f30976" providerId="ADAL" clId="{B2C1E8EB-EB94-44CA-9F50-E86E778B07B8}" dt="2026-02-01T03:53:32.453" v="881" actId="1076"/>
           <ac:spMkLst>
             <pc:docMk/>
             <pc:sldMk cId="1383786992" sldId="256"/>
@@ -207,7 +223,7 @@
           </ac:spMkLst>
         </pc:spChg>
         <pc:spChg chg="mod">
-          <ac:chgData name="Ravi Potes Mangra" userId="f6c3e66e-970a-4dac-abef-28c459f30976" providerId="ADAL" clId="{B2C1E8EB-EB94-44CA-9F50-E86E778B07B8}" dt="2026-02-01T03:18:21.673" v="816" actId="1076"/>
+          <ac:chgData name="Ravi Potes Mangra" userId="f6c3e66e-970a-4dac-abef-28c459f30976" providerId="ADAL" clId="{B2C1E8EB-EB94-44CA-9F50-E86E778B07B8}" dt="2026-02-01T03:53:32.453" v="881" actId="1076"/>
           <ac:spMkLst>
             <pc:docMk/>
             <pc:sldMk cId="1383786992" sldId="256"/>
@@ -215,7 +231,23 @@
           </ac:spMkLst>
         </pc:spChg>
         <pc:spChg chg="mod">
-          <ac:chgData name="Ravi Potes Mangra" userId="f6c3e66e-970a-4dac-abef-28c459f30976" providerId="ADAL" clId="{B2C1E8EB-EB94-44CA-9F50-E86E778B07B8}" dt="2026-02-01T03:18:21.673" v="816" actId="1076"/>
+          <ac:chgData name="Ravi Potes Mangra" userId="f6c3e66e-970a-4dac-abef-28c459f30976" providerId="ADAL" clId="{B2C1E8EB-EB94-44CA-9F50-E86E778B07B8}" dt="2026-02-01T03:53:32.453" v="881" actId="1076"/>
+          <ac:spMkLst>
+            <pc:docMk/>
+            <pc:sldMk cId="1383786992" sldId="256"/>
+            <ac:spMk id="15" creationId="{D8F21453-4682-D88E-7EE7-CB2FDFBCCA38}"/>
+          </ac:spMkLst>
+        </pc:spChg>
+        <pc:spChg chg="mod">
+          <ac:chgData name="Ravi Potes Mangra" userId="f6c3e66e-970a-4dac-abef-28c459f30976" providerId="ADAL" clId="{B2C1E8EB-EB94-44CA-9F50-E86E778B07B8}" dt="2026-02-01T03:53:32.453" v="881" actId="1076"/>
+          <ac:spMkLst>
+            <pc:docMk/>
+            <pc:sldMk cId="1383786992" sldId="256"/>
+            <ac:spMk id="16" creationId="{DB7FF344-CF08-A272-892C-328581035DAF}"/>
+          </ac:spMkLst>
+        </pc:spChg>
+        <pc:spChg chg="mod">
+          <ac:chgData name="Ravi Potes Mangra" userId="f6c3e66e-970a-4dac-abef-28c459f30976" providerId="ADAL" clId="{B2C1E8EB-EB94-44CA-9F50-E86E778B07B8}" dt="2026-02-01T03:53:32.453" v="881" actId="1076"/>
           <ac:spMkLst>
             <pc:docMk/>
             <pc:sldMk cId="1383786992" sldId="256"/>
@@ -223,7 +255,7 @@
           </ac:spMkLst>
         </pc:spChg>
         <pc:spChg chg="mod">
-          <ac:chgData name="Ravi Potes Mangra" userId="f6c3e66e-970a-4dac-abef-28c459f30976" providerId="ADAL" clId="{B2C1E8EB-EB94-44CA-9F50-E86E778B07B8}" dt="2026-02-01T03:18:21.673" v="816" actId="1076"/>
+          <ac:chgData name="Ravi Potes Mangra" userId="f6c3e66e-970a-4dac-abef-28c459f30976" providerId="ADAL" clId="{B2C1E8EB-EB94-44CA-9F50-E86E778B07B8}" dt="2026-02-01T03:53:32.453" v="881" actId="1076"/>
           <ac:spMkLst>
             <pc:docMk/>
             <pc:sldMk cId="1383786992" sldId="256"/>
@@ -231,7 +263,7 @@
           </ac:spMkLst>
         </pc:spChg>
         <pc:spChg chg="mod">
-          <ac:chgData name="Ravi Potes Mangra" userId="f6c3e66e-970a-4dac-abef-28c459f30976" providerId="ADAL" clId="{B2C1E8EB-EB94-44CA-9F50-E86E778B07B8}" dt="2026-02-01T03:18:21.673" v="816" actId="1076"/>
+          <ac:chgData name="Ravi Potes Mangra" userId="f6c3e66e-970a-4dac-abef-28c459f30976" providerId="ADAL" clId="{B2C1E8EB-EB94-44CA-9F50-E86E778B07B8}" dt="2026-02-01T03:53:32.453" v="881" actId="1076"/>
           <ac:spMkLst>
             <pc:docMk/>
             <pc:sldMk cId="1383786992" sldId="256"/>
@@ -772,19 +804,187 @@
           </ac:spMkLst>
         </pc:spChg>
       </pc:sldChg>
-      <pc:sldChg chg="new">
-        <pc:chgData name="Ravi Potes Mangra" userId="f6c3e66e-970a-4dac-abef-28c459f30976" providerId="ADAL" clId="{B2C1E8EB-EB94-44CA-9F50-E86E778B07B8}" dt="2026-01-31T21:13:23.509" v="604" actId="680"/>
+      <pc:sldChg chg="addSp delSp modSp new mod">
+        <pc:chgData name="Ravi Potes Mangra" userId="f6c3e66e-970a-4dac-abef-28c459f30976" providerId="ADAL" clId="{B2C1E8EB-EB94-44CA-9F50-E86E778B07B8}" dt="2026-02-01T03:58:18.361" v="1064" actId="1076"/>
         <pc:sldMkLst>
           <pc:docMk/>
           <pc:sldMk cId="213476011" sldId="260"/>
         </pc:sldMkLst>
+        <pc:spChg chg="add mod">
+          <ac:chgData name="Ravi Potes Mangra" userId="f6c3e66e-970a-4dac-abef-28c459f30976" providerId="ADAL" clId="{B2C1E8EB-EB94-44CA-9F50-E86E778B07B8}" dt="2026-02-01T03:54:45.959" v="923" actId="20577"/>
+          <ac:spMkLst>
+            <pc:docMk/>
+            <pc:sldMk cId="213476011" sldId="260"/>
+            <ac:spMk id="2" creationId="{7FED24F5-A902-50C8-6E9A-200254D6BF44}"/>
+          </ac:spMkLst>
+        </pc:spChg>
+        <pc:spChg chg="add mod">
+          <ac:chgData name="Ravi Potes Mangra" userId="f6c3e66e-970a-4dac-abef-28c459f30976" providerId="ADAL" clId="{B2C1E8EB-EB94-44CA-9F50-E86E778B07B8}" dt="2026-02-01T03:55:19.090" v="937" actId="1076"/>
+          <ac:spMkLst>
+            <pc:docMk/>
+            <pc:sldMk cId="213476011" sldId="260"/>
+            <ac:spMk id="3" creationId="{84BAFA3F-2C94-9E43-9D7C-AB9606CE4103}"/>
+          </ac:spMkLst>
+        </pc:spChg>
+        <pc:spChg chg="add mod">
+          <ac:chgData name="Ravi Potes Mangra" userId="f6c3e66e-970a-4dac-abef-28c459f30976" providerId="ADAL" clId="{B2C1E8EB-EB94-44CA-9F50-E86E778B07B8}" dt="2026-02-01T03:55:45.688" v="945" actId="1076"/>
+          <ac:spMkLst>
+            <pc:docMk/>
+            <pc:sldMk cId="213476011" sldId="260"/>
+            <ac:spMk id="4" creationId="{1416293A-E710-DCED-14CF-37A240E6483C}"/>
+          </ac:spMkLst>
+        </pc:spChg>
+        <pc:spChg chg="add mod">
+          <ac:chgData name="Ravi Potes Mangra" userId="f6c3e66e-970a-4dac-abef-28c459f30976" providerId="ADAL" clId="{B2C1E8EB-EB94-44CA-9F50-E86E778B07B8}" dt="2026-02-01T03:55:45.688" v="945" actId="1076"/>
+          <ac:spMkLst>
+            <pc:docMk/>
+            <pc:sldMk cId="213476011" sldId="260"/>
+            <ac:spMk id="5" creationId="{BBF8238B-998A-7F49-8A20-9D246918E872}"/>
+          </ac:spMkLst>
+        </pc:spChg>
+        <pc:spChg chg="add mod">
+          <ac:chgData name="Ravi Potes Mangra" userId="f6c3e66e-970a-4dac-abef-28c459f30976" providerId="ADAL" clId="{B2C1E8EB-EB94-44CA-9F50-E86E778B07B8}" dt="2026-02-01T03:56:13.495" v="963" actId="20577"/>
+          <ac:spMkLst>
+            <pc:docMk/>
+            <pc:sldMk cId="213476011" sldId="260"/>
+            <ac:spMk id="6" creationId="{0F30968C-E10E-EF75-13AF-BC9A90500D9F}"/>
+          </ac:spMkLst>
+        </pc:spChg>
+        <pc:spChg chg="add mod">
+          <ac:chgData name="Ravi Potes Mangra" userId="f6c3e66e-970a-4dac-abef-28c459f30976" providerId="ADAL" clId="{B2C1E8EB-EB94-44CA-9F50-E86E778B07B8}" dt="2026-02-01T03:56:21.211" v="965" actId="767"/>
+          <ac:spMkLst>
+            <pc:docMk/>
+            <pc:sldMk cId="213476011" sldId="260"/>
+            <ac:spMk id="7" creationId="{B450B3A6-026E-D14E-2701-D3D5A3F6EB39}"/>
+          </ac:spMkLst>
+        </pc:spChg>
+        <pc:spChg chg="add mod">
+          <ac:chgData name="Ravi Potes Mangra" userId="f6c3e66e-970a-4dac-abef-28c459f30976" providerId="ADAL" clId="{B2C1E8EB-EB94-44CA-9F50-E86E778B07B8}" dt="2026-02-01T03:58:06.784" v="1051" actId="20577"/>
+          <ac:spMkLst>
+            <pc:docMk/>
+            <pc:sldMk cId="213476011" sldId="260"/>
+            <ac:spMk id="8" creationId="{F1DCA5CA-869E-8865-A397-7FA4B94A5E23}"/>
+          </ac:spMkLst>
+        </pc:spChg>
+        <pc:spChg chg="add del mod">
+          <ac:chgData name="Ravi Potes Mangra" userId="f6c3e66e-970a-4dac-abef-28c459f30976" providerId="ADAL" clId="{B2C1E8EB-EB94-44CA-9F50-E86E778B07B8}" dt="2026-02-01T03:56:29.743" v="968" actId="478"/>
+          <ac:spMkLst>
+            <pc:docMk/>
+            <pc:sldMk cId="213476011" sldId="260"/>
+            <ac:spMk id="9" creationId="{6834D34D-9829-ED16-1AA7-839646D4DAD2}"/>
+          </ac:spMkLst>
+        </pc:spChg>
+        <pc:spChg chg="add mod">
+          <ac:chgData name="Ravi Potes Mangra" userId="f6c3e66e-970a-4dac-abef-28c459f30976" providerId="ADAL" clId="{B2C1E8EB-EB94-44CA-9F50-E86E778B07B8}" dt="2026-02-01T03:58:18.361" v="1064" actId="1076"/>
+          <ac:spMkLst>
+            <pc:docMk/>
+            <pc:sldMk cId="213476011" sldId="260"/>
+            <ac:spMk id="10" creationId="{B8C0655F-96DD-FDE0-9719-8891C73F64CC}"/>
+          </ac:spMkLst>
+        </pc:spChg>
       </pc:sldChg>
-      <pc:sldChg chg="new">
-        <pc:chgData name="Ravi Potes Mangra" userId="f6c3e66e-970a-4dac-abef-28c459f30976" providerId="ADAL" clId="{B2C1E8EB-EB94-44CA-9F50-E86E778B07B8}" dt="2026-01-31T21:47:15.689" v="605" actId="680"/>
+      <pc:sldChg chg="addSp modSp new mod">
+        <pc:chgData name="Ravi Potes Mangra" userId="f6c3e66e-970a-4dac-abef-28c459f30976" providerId="ADAL" clId="{B2C1E8EB-EB94-44CA-9F50-E86E778B07B8}" dt="2026-02-01T04:12:22.829" v="1204" actId="1076"/>
         <pc:sldMkLst>
           <pc:docMk/>
           <pc:sldMk cId="2366562482" sldId="261"/>
         </pc:sldMkLst>
+        <pc:spChg chg="add">
+          <ac:chgData name="Ravi Potes Mangra" userId="f6c3e66e-970a-4dac-abef-28c459f30976" providerId="ADAL" clId="{B2C1E8EB-EB94-44CA-9F50-E86E778B07B8}" dt="2026-02-01T03:58:33.835" v="1065" actId="11529"/>
+          <ac:spMkLst>
+            <pc:docMk/>
+            <pc:sldMk cId="2366562482" sldId="261"/>
+            <ac:spMk id="2" creationId="{8B25028D-E027-4241-F0BF-2BF8FD694E67}"/>
+          </ac:spMkLst>
+        </pc:spChg>
+        <pc:spChg chg="add mod">
+          <ac:chgData name="Ravi Potes Mangra" userId="f6c3e66e-970a-4dac-abef-28c459f30976" providerId="ADAL" clId="{B2C1E8EB-EB94-44CA-9F50-E86E778B07B8}" dt="2026-02-01T03:58:48.613" v="1085" actId="1076"/>
+          <ac:spMkLst>
+            <pc:docMk/>
+            <pc:sldMk cId="2366562482" sldId="261"/>
+            <ac:spMk id="3" creationId="{67928158-008A-1CB9-CEC1-F5D2010FE69F}"/>
+          </ac:spMkLst>
+        </pc:spChg>
+        <pc:spChg chg="add mod">
+          <ac:chgData name="Ravi Potes Mangra" userId="f6c3e66e-970a-4dac-abef-28c459f30976" providerId="ADAL" clId="{B2C1E8EB-EB94-44CA-9F50-E86E778B07B8}" dt="2026-02-01T03:58:54.551" v="1091" actId="20577"/>
+          <ac:spMkLst>
+            <pc:docMk/>
+            <pc:sldMk cId="2366562482" sldId="261"/>
+            <ac:spMk id="4" creationId="{220AB13C-215C-8985-2750-551464CC1943}"/>
+          </ac:spMkLst>
+        </pc:spChg>
+        <pc:spChg chg="add mod">
+          <ac:chgData name="Ravi Potes Mangra" userId="f6c3e66e-970a-4dac-abef-28c459f30976" providerId="ADAL" clId="{B2C1E8EB-EB94-44CA-9F50-E86E778B07B8}" dt="2026-02-01T03:59:10.423" v="1103" actId="14100"/>
+          <ac:spMkLst>
+            <pc:docMk/>
+            <pc:sldMk cId="2366562482" sldId="261"/>
+            <ac:spMk id="5" creationId="{DAD3D08C-3616-AFA4-E07F-D91686B2C0CF}"/>
+          </ac:spMkLst>
+        </pc:spChg>
+        <pc:spChg chg="add mod">
+          <ac:chgData name="Ravi Potes Mangra" userId="f6c3e66e-970a-4dac-abef-28c459f30976" providerId="ADAL" clId="{B2C1E8EB-EB94-44CA-9F50-E86E778B07B8}" dt="2026-02-01T03:59:29.454" v="1124" actId="14100"/>
+          <ac:spMkLst>
+            <pc:docMk/>
+            <pc:sldMk cId="2366562482" sldId="261"/>
+            <ac:spMk id="6" creationId="{CE1C7363-9CCD-5F30-C92A-949D8691E5A2}"/>
+          </ac:spMkLst>
+        </pc:spChg>
+        <pc:spChg chg="add mod">
+          <ac:chgData name="Ravi Potes Mangra" userId="f6c3e66e-970a-4dac-abef-28c459f30976" providerId="ADAL" clId="{B2C1E8EB-EB94-44CA-9F50-E86E778B07B8}" dt="2026-02-01T03:59:33.007" v="1126" actId="1076"/>
+          <ac:spMkLst>
+            <pc:docMk/>
+            <pc:sldMk cId="2366562482" sldId="261"/>
+            <ac:spMk id="7" creationId="{D35396E9-76CE-5BDF-792B-2EE93EE96DCE}"/>
+          </ac:spMkLst>
+        </pc:spChg>
+        <pc:spChg chg="add mod">
+          <ac:chgData name="Ravi Potes Mangra" userId="f6c3e66e-970a-4dac-abef-28c459f30976" providerId="ADAL" clId="{B2C1E8EB-EB94-44CA-9F50-E86E778B07B8}" dt="2026-02-01T03:59:34.635" v="1128" actId="1076"/>
+          <ac:spMkLst>
+            <pc:docMk/>
+            <pc:sldMk cId="2366562482" sldId="261"/>
+            <ac:spMk id="8" creationId="{898EDFE5-D561-9144-E198-3373A3D62108}"/>
+          </ac:spMkLst>
+        </pc:spChg>
+        <pc:spChg chg="add mod">
+          <ac:chgData name="Ravi Potes Mangra" userId="f6c3e66e-970a-4dac-abef-28c459f30976" providerId="ADAL" clId="{B2C1E8EB-EB94-44CA-9F50-E86E778B07B8}" dt="2026-02-01T03:59:37.318" v="1130" actId="1076"/>
+          <ac:spMkLst>
+            <pc:docMk/>
+            <pc:sldMk cId="2366562482" sldId="261"/>
+            <ac:spMk id="9" creationId="{1F3BBFDC-5D27-2ED1-ED03-28BA77084F07}"/>
+          </ac:spMkLst>
+        </pc:spChg>
+        <pc:spChg chg="add mod">
+          <ac:chgData name="Ravi Potes Mangra" userId="f6c3e66e-970a-4dac-abef-28c459f30976" providerId="ADAL" clId="{B2C1E8EB-EB94-44CA-9F50-E86E778B07B8}" dt="2026-02-01T04:11:53.211" v="1156" actId="1076"/>
+          <ac:spMkLst>
+            <pc:docMk/>
+            <pc:sldMk cId="2366562482" sldId="261"/>
+            <ac:spMk id="10" creationId="{F045B47B-5FD5-28D8-CA53-70A85BB9EF26}"/>
+          </ac:spMkLst>
+        </pc:spChg>
+        <pc:spChg chg="add mod">
+          <ac:chgData name="Ravi Potes Mangra" userId="f6c3e66e-970a-4dac-abef-28c459f30976" providerId="ADAL" clId="{B2C1E8EB-EB94-44CA-9F50-E86E778B07B8}" dt="2026-02-01T04:12:09.949" v="1202" actId="20577"/>
+          <ac:spMkLst>
+            <pc:docMk/>
+            <pc:sldMk cId="2366562482" sldId="261"/>
+            <ac:spMk id="11" creationId="{77CEFC3D-6F76-6FBF-33B2-57ACF8EBE0F7}"/>
+          </ac:spMkLst>
+        </pc:spChg>
+        <pc:spChg chg="add mod">
+          <ac:chgData name="Ravi Potes Mangra" userId="f6c3e66e-970a-4dac-abef-28c459f30976" providerId="ADAL" clId="{B2C1E8EB-EB94-44CA-9F50-E86E778B07B8}" dt="2026-02-01T04:12:22.829" v="1204" actId="1076"/>
+          <ac:spMkLst>
+            <pc:docMk/>
+            <pc:sldMk cId="2366562482" sldId="261"/>
+            <ac:spMk id="12" creationId="{F6AD2C05-6C21-E544-8944-805FC79B1ACB}"/>
+          </ac:spMkLst>
+        </pc:spChg>
+        <pc:spChg chg="add mod">
+          <ac:chgData name="Ravi Potes Mangra" userId="f6c3e66e-970a-4dac-abef-28c459f30976" providerId="ADAL" clId="{B2C1E8EB-EB94-44CA-9F50-E86E778B07B8}" dt="2026-02-01T04:12:22.829" v="1204" actId="1076"/>
+          <ac:spMkLst>
+            <pc:docMk/>
+            <pc:sldMk cId="2366562482" sldId="261"/>
+            <ac:spMk id="13" creationId="{53DEC91B-9546-15DF-5CB3-14B20D9866FB}"/>
+          </ac:spMkLst>
+        </pc:spChg>
       </pc:sldChg>
       <pc:sldChg chg="new">
         <pc:chgData name="Ravi Potes Mangra" userId="f6c3e66e-970a-4dac-abef-28c459f30976" providerId="ADAL" clId="{B2C1E8EB-EB94-44CA-9F50-E86E778B07B8}" dt="2026-01-31T21:47:15.784" v="606" actId="680"/>
@@ -4308,7 +4508,7 @@
         </p:nvSpPr>
         <p:spPr>
           <a:xfrm>
-            <a:off x="1793007" y="2827261"/>
+            <a:off x="1793007" y="3632960"/>
             <a:ext cx="8877300" cy="518160"/>
           </a:xfrm>
           <a:prstGeom prst="rect">
@@ -4354,7 +4554,7 @@
         </p:nvSpPr>
         <p:spPr>
           <a:xfrm>
-            <a:off x="2196867" y="2932155"/>
+            <a:off x="2196867" y="3737854"/>
             <a:ext cx="1165860" cy="369332"/>
           </a:xfrm>
           <a:prstGeom prst="rect">
@@ -4393,7 +4593,7 @@
         </p:nvSpPr>
         <p:spPr>
           <a:xfrm>
-            <a:off x="5644917" y="2901675"/>
+            <a:off x="5644917" y="3707374"/>
             <a:ext cx="1630680" cy="369332"/>
           </a:xfrm>
           <a:prstGeom prst="rect">
@@ -4432,7 +4632,7 @@
         </p:nvSpPr>
         <p:spPr>
           <a:xfrm>
-            <a:off x="9260607" y="2899889"/>
+            <a:off x="9260607" y="3705588"/>
             <a:ext cx="1630680" cy="369332"/>
           </a:xfrm>
           <a:prstGeom prst="rect">
@@ -4471,7 +4671,7 @@
         </p:nvSpPr>
         <p:spPr>
           <a:xfrm>
-            <a:off x="1793007" y="3827743"/>
+            <a:off x="1793007" y="4633442"/>
             <a:ext cx="8877300" cy="518160"/>
           </a:xfrm>
           <a:prstGeom prst="rect">
@@ -4517,7 +4717,7 @@
         </p:nvSpPr>
         <p:spPr>
           <a:xfrm>
-            <a:off x="2204487" y="3932637"/>
+            <a:off x="2204487" y="4738336"/>
             <a:ext cx="1165860" cy="369332"/>
           </a:xfrm>
           <a:prstGeom prst="rect">
@@ -4556,7 +4756,7 @@
         </p:nvSpPr>
         <p:spPr>
           <a:xfrm>
-            <a:off x="5644917" y="3902157"/>
+            <a:off x="5644917" y="4707856"/>
             <a:ext cx="1630680" cy="369332"/>
           </a:xfrm>
           <a:prstGeom prst="rect">
@@ -4595,7 +4795,7 @@
         </p:nvSpPr>
         <p:spPr>
           <a:xfrm>
-            <a:off x="9260607" y="3900371"/>
+            <a:off x="9260607" y="4706070"/>
             <a:ext cx="1630680" cy="369332"/>
           </a:xfrm>
           <a:prstGeom prst="rect">
@@ -4714,6 +4914,110 @@
             <a:r>
               <a:rPr lang="en-US" dirty="0"/>
               <a:t>Delete Term</a:t>
+            </a:r>
+          </a:p>
+        </p:txBody>
+      </p:sp>
+      <p:sp>
+        <p:nvSpPr>
+          <p:cNvPr id="3" name="Rectangle 2">
+            <a:extLst>
+              <a:ext uri="{FF2B5EF4-FFF2-40B4-BE49-F238E27FC236}">
+                <a16:creationId xmlns:a16="http://schemas.microsoft.com/office/drawing/2014/main" id="{6068CF7C-69A0-2E9B-F147-240CBEFC822A}"/>
+              </a:ext>
+            </a:extLst>
+          </p:cNvPr>
+          <p:cNvSpPr/>
+          <p:nvPr/>
+        </p:nvSpPr>
+        <p:spPr>
+          <a:xfrm>
+            <a:off x="2204487" y="2583180"/>
+            <a:ext cx="7937733" cy="404577"/>
+          </a:xfrm>
+          <a:prstGeom prst="rect">
+            <a:avLst/>
+          </a:prstGeom>
+        </p:spPr>
+        <p:style>
+          <a:lnRef idx="2">
+            <a:schemeClr val="accent4">
+              <a:shade val="15000"/>
+            </a:schemeClr>
+          </a:lnRef>
+          <a:fillRef idx="1">
+            <a:schemeClr val="accent4"/>
+          </a:fillRef>
+          <a:effectRef idx="0">
+            <a:schemeClr val="accent4"/>
+          </a:effectRef>
+          <a:fontRef idx="minor">
+            <a:schemeClr val="lt1"/>
+          </a:fontRef>
+        </p:style>
+        <p:txBody>
+          <a:bodyPr rtlCol="0" anchor="ctr"/>
+          <a:lstStyle/>
+          <a:p>
+            <a:pPr algn="ctr"/>
+            <a:r>
+              <a:rPr lang="en-US" dirty="0"/>
+              <a:t>Course</a:t>
+            </a:r>
+          </a:p>
+        </p:txBody>
+      </p:sp>
+      <p:sp>
+        <p:nvSpPr>
+          <p:cNvPr id="7" name="Rectangle 6">
+            <a:extLst>
+              <a:ext uri="{FF2B5EF4-FFF2-40B4-BE49-F238E27FC236}">
+                <a16:creationId xmlns:a16="http://schemas.microsoft.com/office/drawing/2014/main" id="{838DE527-9C94-70ED-B839-55459FA25874}"/>
+              </a:ext>
+            </a:extLst>
+          </p:cNvPr>
+          <p:cNvSpPr/>
+          <p:nvPr/>
+        </p:nvSpPr>
+        <p:spPr>
+          <a:xfrm>
+            <a:off x="3370347" y="3063302"/>
+            <a:ext cx="5753450" cy="404577"/>
+          </a:xfrm>
+          <a:prstGeom prst="rect">
+            <a:avLst/>
+          </a:prstGeom>
+          <a:solidFill>
+            <a:schemeClr val="accent1">
+              <a:lumMod val="20000"/>
+              <a:lumOff val="80000"/>
+            </a:schemeClr>
+          </a:solidFill>
+        </p:spPr>
+        <p:style>
+          <a:lnRef idx="2">
+            <a:schemeClr val="accent4">
+              <a:shade val="15000"/>
+            </a:schemeClr>
+          </a:lnRef>
+          <a:fillRef idx="1">
+            <a:schemeClr val="accent4"/>
+          </a:fillRef>
+          <a:effectRef idx="0">
+            <a:schemeClr val="accent4"/>
+          </a:effectRef>
+          <a:fontRef idx="minor">
+            <a:schemeClr val="lt1"/>
+          </a:fontRef>
+        </p:style>
+        <p:txBody>
+          <a:bodyPr rtlCol="0" anchor="ctr"/>
+          <a:lstStyle/>
+          <a:p>
+            <a:pPr algn="ctr"/>
+            <a:r>
+              <a:rPr lang="en-US" dirty="0"/>
+              <a:t>Assessment</a:t>
             </a:r>
           </a:p>
         </p:txBody>
@@ -8065,6 +8369,324 @@
           <a:chExt cx="0" cy="0"/>
         </a:xfrm>
       </p:grpSpPr>
+      <p:sp>
+        <p:nvSpPr>
+          <p:cNvPr id="2" name="TextBox 1">
+            <a:extLst>
+              <a:ext uri="{FF2B5EF4-FFF2-40B4-BE49-F238E27FC236}">
+                <a16:creationId xmlns:a16="http://schemas.microsoft.com/office/drawing/2014/main" id="{7FED24F5-A902-50C8-6E9A-200254D6BF44}"/>
+              </a:ext>
+            </a:extLst>
+          </p:cNvPr>
+          <p:cNvSpPr txBox="1"/>
+          <p:nvPr/>
+        </p:nvSpPr>
+        <p:spPr>
+          <a:xfrm>
+            <a:off x="5021580" y="152400"/>
+            <a:ext cx="1882140" cy="646331"/>
+          </a:xfrm>
+          <a:prstGeom prst="rect">
+            <a:avLst/>
+          </a:prstGeom>
+          <a:noFill/>
+        </p:spPr>
+        <p:txBody>
+          <a:bodyPr wrap="square" rtlCol="0">
+            <a:spAutoFit/>
+          </a:bodyPr>
+          <a:lstStyle/>
+          <a:p>
+            <a:r>
+              <a:rPr lang="en-US" dirty="0"/>
+              <a:t>Course Name</a:t>
+            </a:r>
+          </a:p>
+          <a:p>
+            <a:endParaRPr lang="en-US" dirty="0"/>
+          </a:p>
+        </p:txBody>
+      </p:sp>
+      <p:sp>
+        <p:nvSpPr>
+          <p:cNvPr id="3" name="TextBox 2">
+            <a:extLst>
+              <a:ext uri="{FF2B5EF4-FFF2-40B4-BE49-F238E27FC236}">
+                <a16:creationId xmlns:a16="http://schemas.microsoft.com/office/drawing/2014/main" id="{84BAFA3F-2C94-9E43-9D7C-AB9606CE4103}"/>
+              </a:ext>
+            </a:extLst>
+          </p:cNvPr>
+          <p:cNvSpPr txBox="1"/>
+          <p:nvPr/>
+        </p:nvSpPr>
+        <p:spPr>
+          <a:xfrm>
+            <a:off x="5021580" y="614065"/>
+            <a:ext cx="1882140" cy="369332"/>
+          </a:xfrm>
+          <a:prstGeom prst="rect">
+            <a:avLst/>
+          </a:prstGeom>
+          <a:noFill/>
+        </p:spPr>
+        <p:txBody>
+          <a:bodyPr wrap="square" rtlCol="0">
+            <a:spAutoFit/>
+          </a:bodyPr>
+          <a:lstStyle/>
+          <a:p>
+            <a:r>
+              <a:rPr lang="en-US" dirty="0"/>
+              <a:t>Assessments</a:t>
+            </a:r>
+          </a:p>
+        </p:txBody>
+      </p:sp>
+      <p:sp>
+        <p:nvSpPr>
+          <p:cNvPr id="4" name="Rectangle 3">
+            <a:extLst>
+              <a:ext uri="{FF2B5EF4-FFF2-40B4-BE49-F238E27FC236}">
+                <a16:creationId xmlns:a16="http://schemas.microsoft.com/office/drawing/2014/main" id="{1416293A-E710-DCED-14CF-37A240E6483C}"/>
+              </a:ext>
+            </a:extLst>
+          </p:cNvPr>
+          <p:cNvSpPr/>
+          <p:nvPr/>
+        </p:nvSpPr>
+        <p:spPr>
+          <a:xfrm>
+            <a:off x="6912635" y="798731"/>
+            <a:ext cx="1052013" cy="369332"/>
+          </a:xfrm>
+          <a:prstGeom prst="rect">
+            <a:avLst/>
+          </a:prstGeom>
+        </p:spPr>
+        <p:style>
+          <a:lnRef idx="2">
+            <a:schemeClr val="accent1">
+              <a:shade val="15000"/>
+            </a:schemeClr>
+          </a:lnRef>
+          <a:fillRef idx="1">
+            <a:schemeClr val="accent1"/>
+          </a:fillRef>
+          <a:effectRef idx="0">
+            <a:schemeClr val="accent1"/>
+          </a:effectRef>
+          <a:fontRef idx="minor">
+            <a:schemeClr val="lt1"/>
+          </a:fontRef>
+        </p:style>
+        <p:txBody>
+          <a:bodyPr rtlCol="0" anchor="ctr"/>
+          <a:lstStyle/>
+          <a:p>
+            <a:pPr algn="ctr"/>
+            <a:r>
+              <a:rPr lang="en-US" dirty="0"/>
+              <a:t>Modify</a:t>
+            </a:r>
+          </a:p>
+        </p:txBody>
+      </p:sp>
+      <p:sp>
+        <p:nvSpPr>
+          <p:cNvPr id="5" name="Rectangle 4">
+            <a:extLst>
+              <a:ext uri="{FF2B5EF4-FFF2-40B4-BE49-F238E27FC236}">
+                <a16:creationId xmlns:a16="http://schemas.microsoft.com/office/drawing/2014/main" id="{BBF8238B-998A-7F49-8A20-9D246918E872}"/>
+              </a:ext>
+            </a:extLst>
+          </p:cNvPr>
+          <p:cNvSpPr/>
+          <p:nvPr/>
+        </p:nvSpPr>
+        <p:spPr>
+          <a:xfrm>
+            <a:off x="6903720" y="1341789"/>
+            <a:ext cx="1052013" cy="369332"/>
+          </a:xfrm>
+          <a:prstGeom prst="rect">
+            <a:avLst/>
+          </a:prstGeom>
+        </p:spPr>
+        <p:style>
+          <a:lnRef idx="2">
+            <a:schemeClr val="accent1">
+              <a:shade val="15000"/>
+            </a:schemeClr>
+          </a:lnRef>
+          <a:fillRef idx="1">
+            <a:schemeClr val="accent1"/>
+          </a:fillRef>
+          <a:effectRef idx="0">
+            <a:schemeClr val="accent1"/>
+          </a:effectRef>
+          <a:fontRef idx="minor">
+            <a:schemeClr val="lt1"/>
+          </a:fontRef>
+        </p:style>
+        <p:txBody>
+          <a:bodyPr rtlCol="0" anchor="ctr"/>
+          <a:lstStyle/>
+          <a:p>
+            <a:pPr algn="ctr"/>
+            <a:r>
+              <a:rPr lang="en-US" dirty="0"/>
+              <a:t>Delete</a:t>
+            </a:r>
+          </a:p>
+        </p:txBody>
+      </p:sp>
+      <p:sp>
+        <p:nvSpPr>
+          <p:cNvPr id="6" name="Rectangle 5">
+            <a:extLst>
+              <a:ext uri="{FF2B5EF4-FFF2-40B4-BE49-F238E27FC236}">
+                <a16:creationId xmlns:a16="http://schemas.microsoft.com/office/drawing/2014/main" id="{0F30968C-E10E-EF75-13AF-BC9A90500D9F}"/>
+              </a:ext>
+            </a:extLst>
+          </p:cNvPr>
+          <p:cNvSpPr/>
+          <p:nvPr/>
+        </p:nvSpPr>
+        <p:spPr>
+          <a:xfrm>
+            <a:off x="6903719" y="255673"/>
+            <a:ext cx="1052013" cy="369332"/>
+          </a:xfrm>
+          <a:prstGeom prst="rect">
+            <a:avLst/>
+          </a:prstGeom>
+        </p:spPr>
+        <p:style>
+          <a:lnRef idx="2">
+            <a:schemeClr val="accent1">
+              <a:shade val="15000"/>
+            </a:schemeClr>
+          </a:lnRef>
+          <a:fillRef idx="1">
+            <a:schemeClr val="accent1"/>
+          </a:fillRef>
+          <a:effectRef idx="0">
+            <a:schemeClr val="accent1"/>
+          </a:effectRef>
+          <a:fontRef idx="minor">
+            <a:schemeClr val="lt1"/>
+          </a:fontRef>
+        </p:style>
+        <p:txBody>
+          <a:bodyPr rtlCol="0" anchor="ctr"/>
+          <a:lstStyle/>
+          <a:p>
+            <a:pPr algn="ctr"/>
+            <a:r>
+              <a:rPr lang="en-US" dirty="0"/>
+              <a:t>Add </a:t>
+            </a:r>
+          </a:p>
+        </p:txBody>
+      </p:sp>
+      <p:sp>
+        <p:nvSpPr>
+          <p:cNvPr id="8" name="Rectangle 7">
+            <a:extLst>
+              <a:ext uri="{FF2B5EF4-FFF2-40B4-BE49-F238E27FC236}">
+                <a16:creationId xmlns:a16="http://schemas.microsoft.com/office/drawing/2014/main" id="{F1DCA5CA-869E-8865-A397-7FA4B94A5E23}"/>
+              </a:ext>
+            </a:extLst>
+          </p:cNvPr>
+          <p:cNvSpPr/>
+          <p:nvPr/>
+        </p:nvSpPr>
+        <p:spPr>
+          <a:xfrm>
+            <a:off x="3657600" y="2186940"/>
+            <a:ext cx="5082540" cy="457200"/>
+          </a:xfrm>
+          <a:prstGeom prst="rect">
+            <a:avLst/>
+          </a:prstGeom>
+        </p:spPr>
+        <p:style>
+          <a:lnRef idx="2">
+            <a:schemeClr val="accent1">
+              <a:shade val="15000"/>
+            </a:schemeClr>
+          </a:lnRef>
+          <a:fillRef idx="1">
+            <a:schemeClr val="accent1"/>
+          </a:fillRef>
+          <a:effectRef idx="0">
+            <a:schemeClr val="accent1"/>
+          </a:effectRef>
+          <a:fontRef idx="minor">
+            <a:schemeClr val="lt1"/>
+          </a:fontRef>
+        </p:style>
+        <p:txBody>
+          <a:bodyPr rtlCol="0" anchor="ctr"/>
+          <a:lstStyle/>
+          <a:p>
+            <a:pPr algn="ctr"/>
+            <a:r>
+              <a:rPr lang="en-US" dirty="0"/>
+              <a:t>Object Assessment (Start-End)</a:t>
+            </a:r>
+          </a:p>
+        </p:txBody>
+      </p:sp>
+      <p:sp>
+        <p:nvSpPr>
+          <p:cNvPr id="10" name="Rectangle 9">
+            <a:extLst>
+              <a:ext uri="{FF2B5EF4-FFF2-40B4-BE49-F238E27FC236}">
+                <a16:creationId xmlns:a16="http://schemas.microsoft.com/office/drawing/2014/main" id="{B8C0655F-96DD-FDE0-9719-8891C73F64CC}"/>
+              </a:ext>
+            </a:extLst>
+          </p:cNvPr>
+          <p:cNvSpPr/>
+          <p:nvPr/>
+        </p:nvSpPr>
+        <p:spPr>
+          <a:xfrm>
+            <a:off x="3657600" y="2870730"/>
+            <a:ext cx="5082540" cy="457200"/>
+          </a:xfrm>
+          <a:prstGeom prst="rect">
+            <a:avLst/>
+          </a:prstGeom>
+        </p:spPr>
+        <p:style>
+          <a:lnRef idx="2">
+            <a:schemeClr val="accent1">
+              <a:shade val="15000"/>
+            </a:schemeClr>
+          </a:lnRef>
+          <a:fillRef idx="1">
+            <a:schemeClr val="accent1"/>
+          </a:fillRef>
+          <a:effectRef idx="0">
+            <a:schemeClr val="accent1"/>
+          </a:effectRef>
+          <a:fontRef idx="minor">
+            <a:schemeClr val="lt1"/>
+          </a:fontRef>
+        </p:style>
+        <p:txBody>
+          <a:bodyPr rtlCol="0" anchor="ctr"/>
+          <a:lstStyle/>
+          <a:p>
+            <a:pPr algn="ctr"/>
+            <a:r>
+              <a:rPr lang="en-US" dirty="0"/>
+              <a:t>Performance Assessment (Start-End)</a:t>
+            </a:r>
+          </a:p>
+        </p:txBody>
+      </p:sp>
     </p:spTree>
     <p:extLst>
       <p:ext uri="{BB962C8B-B14F-4D97-AF65-F5344CB8AC3E}">
@@ -8095,6 +8717,498 @@
           <a:chExt cx="0" cy="0"/>
         </a:xfrm>
       </p:grpSpPr>
+      <p:sp>
+        <p:nvSpPr>
+          <p:cNvPr id="2" name="Rectangle 1">
+            <a:extLst>
+              <a:ext uri="{FF2B5EF4-FFF2-40B4-BE49-F238E27FC236}">
+                <a16:creationId xmlns:a16="http://schemas.microsoft.com/office/drawing/2014/main" id="{8B25028D-E027-4241-F0BF-2BF8FD694E67}"/>
+              </a:ext>
+            </a:extLst>
+          </p:cNvPr>
+          <p:cNvSpPr/>
+          <p:nvPr/>
+        </p:nvSpPr>
+        <p:spPr>
+          <a:xfrm>
+            <a:off x="3893820" y="1775460"/>
+            <a:ext cx="5295900" cy="396240"/>
+          </a:xfrm>
+          <a:prstGeom prst="rect">
+            <a:avLst/>
+          </a:prstGeom>
+        </p:spPr>
+        <p:style>
+          <a:lnRef idx="2">
+            <a:schemeClr val="accent1">
+              <a:shade val="15000"/>
+            </a:schemeClr>
+          </a:lnRef>
+          <a:fillRef idx="1">
+            <a:schemeClr val="accent1"/>
+          </a:fillRef>
+          <a:effectRef idx="0">
+            <a:schemeClr val="accent1"/>
+          </a:effectRef>
+          <a:fontRef idx="minor">
+            <a:schemeClr val="lt1"/>
+          </a:fontRef>
+        </p:style>
+        <p:txBody>
+          <a:bodyPr rtlCol="0" anchor="ctr"/>
+          <a:lstStyle/>
+          <a:p>
+            <a:pPr algn="ctr"/>
+            <a:endParaRPr lang="en-US" dirty="0"/>
+          </a:p>
+        </p:txBody>
+      </p:sp>
+      <p:sp>
+        <p:nvSpPr>
+          <p:cNvPr id="3" name="TextBox 2">
+            <a:extLst>
+              <a:ext uri="{FF2B5EF4-FFF2-40B4-BE49-F238E27FC236}">
+                <a16:creationId xmlns:a16="http://schemas.microsoft.com/office/drawing/2014/main" id="{67928158-008A-1CB9-CEC1-F5D2010FE69F}"/>
+              </a:ext>
+            </a:extLst>
+          </p:cNvPr>
+          <p:cNvSpPr txBox="1"/>
+          <p:nvPr/>
+        </p:nvSpPr>
+        <p:spPr>
+          <a:xfrm>
+            <a:off x="1226820" y="1748552"/>
+            <a:ext cx="2308860" cy="369332"/>
+          </a:xfrm>
+          <a:prstGeom prst="rect">
+            <a:avLst/>
+          </a:prstGeom>
+          <a:noFill/>
+        </p:spPr>
+        <p:txBody>
+          <a:bodyPr wrap="square" rtlCol="0">
+            <a:spAutoFit/>
+          </a:bodyPr>
+          <a:lstStyle/>
+          <a:p>
+            <a:r>
+              <a:rPr lang="en-US" dirty="0"/>
+              <a:t>Assessment Name: </a:t>
+            </a:r>
+          </a:p>
+        </p:txBody>
+      </p:sp>
+      <p:sp>
+        <p:nvSpPr>
+          <p:cNvPr id="4" name="TextBox 3">
+            <a:extLst>
+              <a:ext uri="{FF2B5EF4-FFF2-40B4-BE49-F238E27FC236}">
+                <a16:creationId xmlns:a16="http://schemas.microsoft.com/office/drawing/2014/main" id="{220AB13C-215C-8985-2750-551464CC1943}"/>
+              </a:ext>
+            </a:extLst>
+          </p:cNvPr>
+          <p:cNvSpPr txBox="1"/>
+          <p:nvPr/>
+        </p:nvSpPr>
+        <p:spPr>
+          <a:xfrm>
+            <a:off x="1226820" y="2502932"/>
+            <a:ext cx="2308860" cy="369332"/>
+          </a:xfrm>
+          <a:prstGeom prst="rect">
+            <a:avLst/>
+          </a:prstGeom>
+          <a:noFill/>
+        </p:spPr>
+        <p:txBody>
+          <a:bodyPr wrap="square" rtlCol="0">
+            <a:spAutoFit/>
+          </a:bodyPr>
+          <a:lstStyle/>
+          <a:p>
+            <a:r>
+              <a:rPr lang="en-US" dirty="0"/>
+              <a:t>Assessment Type: </a:t>
+            </a:r>
+          </a:p>
+        </p:txBody>
+      </p:sp>
+      <p:sp>
+        <p:nvSpPr>
+          <p:cNvPr id="5" name="TextBox 4">
+            <a:extLst>
+              <a:ext uri="{FF2B5EF4-FFF2-40B4-BE49-F238E27FC236}">
+                <a16:creationId xmlns:a16="http://schemas.microsoft.com/office/drawing/2014/main" id="{DAD3D08C-3616-AFA4-E07F-D91686B2C0CF}"/>
+              </a:ext>
+            </a:extLst>
+          </p:cNvPr>
+          <p:cNvSpPr txBox="1"/>
+          <p:nvPr/>
+        </p:nvSpPr>
+        <p:spPr>
+          <a:xfrm>
+            <a:off x="1226820" y="3135392"/>
+            <a:ext cx="1379220" cy="369332"/>
+          </a:xfrm>
+          <a:prstGeom prst="rect">
+            <a:avLst/>
+          </a:prstGeom>
+          <a:noFill/>
+        </p:spPr>
+        <p:txBody>
+          <a:bodyPr wrap="square" rtlCol="0">
+            <a:spAutoFit/>
+          </a:bodyPr>
+          <a:lstStyle/>
+          <a:p>
+            <a:r>
+              <a:rPr lang="en-US" dirty="0"/>
+              <a:t>Due Date:</a:t>
+            </a:r>
+          </a:p>
+        </p:txBody>
+      </p:sp>
+      <p:sp>
+        <p:nvSpPr>
+          <p:cNvPr id="6" name="TextBox 5">
+            <a:extLst>
+              <a:ext uri="{FF2B5EF4-FFF2-40B4-BE49-F238E27FC236}">
+                <a16:creationId xmlns:a16="http://schemas.microsoft.com/office/drawing/2014/main" id="{CE1C7363-9CCD-5F30-C92A-949D8691E5A2}"/>
+              </a:ext>
+            </a:extLst>
+          </p:cNvPr>
+          <p:cNvSpPr txBox="1"/>
+          <p:nvPr/>
+        </p:nvSpPr>
+        <p:spPr>
+          <a:xfrm>
+            <a:off x="1226820" y="3767852"/>
+            <a:ext cx="1546860" cy="369332"/>
+          </a:xfrm>
+          <a:prstGeom prst="rect">
+            <a:avLst/>
+          </a:prstGeom>
+          <a:noFill/>
+        </p:spPr>
+        <p:txBody>
+          <a:bodyPr wrap="square" rtlCol="0">
+            <a:spAutoFit/>
+          </a:bodyPr>
+          <a:lstStyle/>
+          <a:p>
+            <a:r>
+              <a:rPr lang="en-US" dirty="0"/>
+              <a:t>Notifications:</a:t>
+            </a:r>
+          </a:p>
+        </p:txBody>
+      </p:sp>
+      <p:sp>
+        <p:nvSpPr>
+          <p:cNvPr id="7" name="Rectangle 6">
+            <a:extLst>
+              <a:ext uri="{FF2B5EF4-FFF2-40B4-BE49-F238E27FC236}">
+                <a16:creationId xmlns:a16="http://schemas.microsoft.com/office/drawing/2014/main" id="{D35396E9-76CE-5BDF-792B-2EE93EE96DCE}"/>
+              </a:ext>
+            </a:extLst>
+          </p:cNvPr>
+          <p:cNvSpPr/>
+          <p:nvPr/>
+        </p:nvSpPr>
+        <p:spPr>
+          <a:xfrm>
+            <a:off x="3893820" y="2491264"/>
+            <a:ext cx="5295900" cy="396240"/>
+          </a:xfrm>
+          <a:prstGeom prst="rect">
+            <a:avLst/>
+          </a:prstGeom>
+        </p:spPr>
+        <p:style>
+          <a:lnRef idx="2">
+            <a:schemeClr val="accent1">
+              <a:shade val="15000"/>
+            </a:schemeClr>
+          </a:lnRef>
+          <a:fillRef idx="1">
+            <a:schemeClr val="accent1"/>
+          </a:fillRef>
+          <a:effectRef idx="0">
+            <a:schemeClr val="accent1"/>
+          </a:effectRef>
+          <a:fontRef idx="minor">
+            <a:schemeClr val="lt1"/>
+          </a:fontRef>
+        </p:style>
+        <p:txBody>
+          <a:bodyPr rtlCol="0" anchor="ctr"/>
+          <a:lstStyle/>
+          <a:p>
+            <a:pPr algn="ctr"/>
+            <a:endParaRPr lang="en-US" dirty="0"/>
+          </a:p>
+        </p:txBody>
+      </p:sp>
+      <p:sp>
+        <p:nvSpPr>
+          <p:cNvPr id="8" name="Rectangle 7">
+            <a:extLst>
+              <a:ext uri="{FF2B5EF4-FFF2-40B4-BE49-F238E27FC236}">
+                <a16:creationId xmlns:a16="http://schemas.microsoft.com/office/drawing/2014/main" id="{898EDFE5-D561-9144-E198-3373A3D62108}"/>
+              </a:ext>
+            </a:extLst>
+          </p:cNvPr>
+          <p:cNvSpPr/>
+          <p:nvPr/>
+        </p:nvSpPr>
+        <p:spPr>
+          <a:xfrm>
+            <a:off x="3893820" y="3121938"/>
+            <a:ext cx="5295900" cy="396240"/>
+          </a:xfrm>
+          <a:prstGeom prst="rect">
+            <a:avLst/>
+          </a:prstGeom>
+        </p:spPr>
+        <p:style>
+          <a:lnRef idx="2">
+            <a:schemeClr val="accent1">
+              <a:shade val="15000"/>
+            </a:schemeClr>
+          </a:lnRef>
+          <a:fillRef idx="1">
+            <a:schemeClr val="accent1"/>
+          </a:fillRef>
+          <a:effectRef idx="0">
+            <a:schemeClr val="accent1"/>
+          </a:effectRef>
+          <a:fontRef idx="minor">
+            <a:schemeClr val="lt1"/>
+          </a:fontRef>
+        </p:style>
+        <p:txBody>
+          <a:bodyPr rtlCol="0" anchor="ctr"/>
+          <a:lstStyle/>
+          <a:p>
+            <a:pPr algn="ctr"/>
+            <a:endParaRPr lang="en-US" dirty="0"/>
+          </a:p>
+        </p:txBody>
+      </p:sp>
+      <p:sp>
+        <p:nvSpPr>
+          <p:cNvPr id="9" name="Rectangle 8">
+            <a:extLst>
+              <a:ext uri="{FF2B5EF4-FFF2-40B4-BE49-F238E27FC236}">
+                <a16:creationId xmlns:a16="http://schemas.microsoft.com/office/drawing/2014/main" id="{1F3BBFDC-5D27-2ED1-ED03-28BA77084F07}"/>
+              </a:ext>
+            </a:extLst>
+          </p:cNvPr>
+          <p:cNvSpPr/>
+          <p:nvPr/>
+        </p:nvSpPr>
+        <p:spPr>
+          <a:xfrm>
+            <a:off x="3893820" y="3767852"/>
+            <a:ext cx="5295900" cy="396240"/>
+          </a:xfrm>
+          <a:prstGeom prst="rect">
+            <a:avLst/>
+          </a:prstGeom>
+        </p:spPr>
+        <p:style>
+          <a:lnRef idx="2">
+            <a:schemeClr val="accent1">
+              <a:shade val="15000"/>
+            </a:schemeClr>
+          </a:lnRef>
+          <a:fillRef idx="1">
+            <a:schemeClr val="accent1"/>
+          </a:fillRef>
+          <a:effectRef idx="0">
+            <a:schemeClr val="accent1"/>
+          </a:effectRef>
+          <a:fontRef idx="minor">
+            <a:schemeClr val="lt1"/>
+          </a:fontRef>
+        </p:style>
+        <p:txBody>
+          <a:bodyPr rtlCol="0" anchor="ctr"/>
+          <a:lstStyle/>
+          <a:p>
+            <a:pPr algn="ctr"/>
+            <a:endParaRPr lang="en-US" dirty="0"/>
+          </a:p>
+        </p:txBody>
+      </p:sp>
+      <p:sp>
+        <p:nvSpPr>
+          <p:cNvPr id="10" name="TextBox 9">
+            <a:extLst>
+              <a:ext uri="{FF2B5EF4-FFF2-40B4-BE49-F238E27FC236}">
+                <a16:creationId xmlns:a16="http://schemas.microsoft.com/office/drawing/2014/main" id="{F045B47B-5FD5-28D8-CA53-70A85BB9EF26}"/>
+              </a:ext>
+            </a:extLst>
+          </p:cNvPr>
+          <p:cNvSpPr txBox="1"/>
+          <p:nvPr/>
+        </p:nvSpPr>
+        <p:spPr>
+          <a:xfrm>
+            <a:off x="5379720" y="464820"/>
+            <a:ext cx="2872740" cy="369332"/>
+          </a:xfrm>
+          <a:prstGeom prst="rect">
+            <a:avLst/>
+          </a:prstGeom>
+          <a:noFill/>
+        </p:spPr>
+        <p:txBody>
+          <a:bodyPr wrap="square" rtlCol="0">
+            <a:spAutoFit/>
+          </a:bodyPr>
+          <a:lstStyle/>
+          <a:p>
+            <a:r>
+              <a:rPr lang="en-US" dirty="0"/>
+              <a:t>Add/Modify Assessment</a:t>
+            </a:r>
+          </a:p>
+        </p:txBody>
+      </p:sp>
+      <p:sp>
+        <p:nvSpPr>
+          <p:cNvPr id="11" name="TextBox 10">
+            <a:extLst>
+              <a:ext uri="{FF2B5EF4-FFF2-40B4-BE49-F238E27FC236}">
+                <a16:creationId xmlns:a16="http://schemas.microsoft.com/office/drawing/2014/main" id="{77CEFC3D-6F76-6FBF-33B2-57ACF8EBE0F7}"/>
+              </a:ext>
+            </a:extLst>
+          </p:cNvPr>
+          <p:cNvSpPr txBox="1"/>
+          <p:nvPr/>
+        </p:nvSpPr>
+        <p:spPr>
+          <a:xfrm>
+            <a:off x="5227320" y="1083826"/>
+            <a:ext cx="2872740" cy="369332"/>
+          </a:xfrm>
+          <a:prstGeom prst="rect">
+            <a:avLst/>
+          </a:prstGeom>
+          <a:noFill/>
+        </p:spPr>
+        <p:txBody>
+          <a:bodyPr wrap="square" rtlCol="0">
+            <a:spAutoFit/>
+          </a:bodyPr>
+          <a:lstStyle/>
+          <a:p>
+            <a:r>
+              <a:rPr lang="en-US" dirty="0"/>
+              <a:t>Current Assessment Name</a:t>
+            </a:r>
+          </a:p>
+        </p:txBody>
+      </p:sp>
+      <p:sp>
+        <p:nvSpPr>
+          <p:cNvPr id="12" name="Rectangle 11">
+            <a:extLst>
+              <a:ext uri="{FF2B5EF4-FFF2-40B4-BE49-F238E27FC236}">
+                <a16:creationId xmlns:a16="http://schemas.microsoft.com/office/drawing/2014/main" id="{F6AD2C05-6C21-E544-8944-805FC79B1ACB}"/>
+              </a:ext>
+            </a:extLst>
+          </p:cNvPr>
+          <p:cNvSpPr/>
+          <p:nvPr/>
+        </p:nvSpPr>
+        <p:spPr>
+          <a:xfrm>
+            <a:off x="4783403" y="4762404"/>
+            <a:ext cx="1466605" cy="469783"/>
+          </a:xfrm>
+          <a:prstGeom prst="rect">
+            <a:avLst/>
+          </a:prstGeom>
+        </p:spPr>
+        <p:style>
+          <a:lnRef idx="2">
+            <a:schemeClr val="accent1">
+              <a:shade val="15000"/>
+            </a:schemeClr>
+          </a:lnRef>
+          <a:fillRef idx="1">
+            <a:schemeClr val="accent1"/>
+          </a:fillRef>
+          <a:effectRef idx="0">
+            <a:schemeClr val="accent1"/>
+          </a:effectRef>
+          <a:fontRef idx="minor">
+            <a:schemeClr val="lt1"/>
+          </a:fontRef>
+        </p:style>
+        <p:txBody>
+          <a:bodyPr rtlCol="0" anchor="ctr"/>
+          <a:lstStyle/>
+          <a:p>
+            <a:pPr algn="ctr"/>
+            <a:r>
+              <a:rPr lang="en-US" dirty="0"/>
+              <a:t>Save</a:t>
+            </a:r>
+          </a:p>
+        </p:txBody>
+      </p:sp>
+      <p:sp>
+        <p:nvSpPr>
+          <p:cNvPr id="13" name="Rectangle 12">
+            <a:extLst>
+              <a:ext uri="{FF2B5EF4-FFF2-40B4-BE49-F238E27FC236}">
+                <a16:creationId xmlns:a16="http://schemas.microsoft.com/office/drawing/2014/main" id="{53DEC91B-9546-15DF-5CB3-14B20D9866FB}"/>
+              </a:ext>
+            </a:extLst>
+          </p:cNvPr>
+          <p:cNvSpPr/>
+          <p:nvPr/>
+        </p:nvSpPr>
+        <p:spPr>
+          <a:xfrm>
+            <a:off x="6865270" y="4762404"/>
+            <a:ext cx="1466605" cy="469783"/>
+          </a:xfrm>
+          <a:prstGeom prst="rect">
+            <a:avLst/>
+          </a:prstGeom>
+        </p:spPr>
+        <p:style>
+          <a:lnRef idx="2">
+            <a:schemeClr val="accent1">
+              <a:shade val="15000"/>
+            </a:schemeClr>
+          </a:lnRef>
+          <a:fillRef idx="1">
+            <a:schemeClr val="accent1"/>
+          </a:fillRef>
+          <a:effectRef idx="0">
+            <a:schemeClr val="accent1"/>
+          </a:effectRef>
+          <a:fontRef idx="minor">
+            <a:schemeClr val="lt1"/>
+          </a:fontRef>
+        </p:style>
+        <p:txBody>
+          <a:bodyPr rtlCol="0" anchor="ctr"/>
+          <a:lstStyle/>
+          <a:p>
+            <a:pPr algn="ctr"/>
+            <a:r>
+              <a:rPr lang="en-US" dirty="0"/>
+              <a:t>Cancel</a:t>
+            </a:r>
+          </a:p>
+        </p:txBody>
+      </p:sp>
     </p:spTree>
     <p:extLst>
       <p:ext uri="{BB962C8B-B14F-4D97-AF65-F5344CB8AC3E}">

</xml_diff>

<commit_message>
added more boxes for date pickers
</commit_message>
<xml_diff>
--- a/b1.pptx
+++ b/b1.pptx
@@ -122,7 +122,7 @@
 <file path=ppt/revisionInfo.xml><?xml version="1.0" encoding="utf-8"?>
 <p1510:revInfo xmlns:a="http://schemas.openxmlformats.org/drawingml/2006/main" xmlns:r="http://schemas.openxmlformats.org/officeDocument/2006/relationships" xmlns:p1510="http://schemas.microsoft.com/office/powerpoint/2015/10/main">
   <p1510:revLst>
-    <p1510:client id="{C5F0709F-BDA2-4D97-972B-42FAEC705165}" v="71" dt="2026-02-01T04:12:21.060"/>
+    <p1510:client id="{C5F0709F-BDA2-4D97-972B-42FAEC705165}" v="74" dt="2026-02-01T04:14:27.862"/>
   </p1510:revLst>
 </p1510:revInfo>
 </file>
@@ -132,7 +132,7 @@
   <pc:docChgLst>
     <pc:chgData name="Ravi Potes Mangra" userId="f6c3e66e-970a-4dac-abef-28c459f30976" providerId="ADAL" clId="{B2C1E8EB-EB94-44CA-9F50-E86E778B07B8}"/>
     <pc:docChg chg="undo custSel addSld modSld">
-      <pc:chgData name="Ravi Potes Mangra" userId="f6c3e66e-970a-4dac-abef-28c459f30976" providerId="ADAL" clId="{B2C1E8EB-EB94-44CA-9F50-E86E778B07B8}" dt="2026-02-01T04:12:22.829" v="1204" actId="1076"/>
+      <pc:chgData name="Ravi Potes Mangra" userId="f6c3e66e-970a-4dac-abef-28c459f30976" providerId="ADAL" clId="{B2C1E8EB-EB94-44CA-9F50-E86E778B07B8}" dt="2026-02-01T04:14:30.045" v="1210" actId="1076"/>
       <pc:docMkLst>
         <pc:docMk/>
       </pc:docMkLst>
@@ -884,7 +884,7 @@
         </pc:spChg>
       </pc:sldChg>
       <pc:sldChg chg="addSp modSp new mod">
-        <pc:chgData name="Ravi Potes Mangra" userId="f6c3e66e-970a-4dac-abef-28c459f30976" providerId="ADAL" clId="{B2C1E8EB-EB94-44CA-9F50-E86E778B07B8}" dt="2026-02-01T04:12:22.829" v="1204" actId="1076"/>
+        <pc:chgData name="Ravi Potes Mangra" userId="f6c3e66e-970a-4dac-abef-28c459f30976" providerId="ADAL" clId="{B2C1E8EB-EB94-44CA-9F50-E86E778B07B8}" dt="2026-02-01T04:14:30.045" v="1210" actId="1076"/>
         <pc:sldMkLst>
           <pc:docMk/>
           <pc:sldMk cId="2366562482" sldId="261"/>
@@ -983,6 +983,14 @@
             <pc:docMk/>
             <pc:sldMk cId="2366562482" sldId="261"/>
             <ac:spMk id="13" creationId="{53DEC91B-9546-15DF-5CB3-14B20D9866FB}"/>
+          </ac:spMkLst>
+        </pc:spChg>
+        <pc:spChg chg="add mod">
+          <ac:chgData name="Ravi Potes Mangra" userId="f6c3e66e-970a-4dac-abef-28c459f30976" providerId="ADAL" clId="{B2C1E8EB-EB94-44CA-9F50-E86E778B07B8}" dt="2026-02-01T04:14:30.045" v="1210" actId="1076"/>
+          <ac:spMkLst>
+            <pc:docMk/>
+            <pc:sldMk cId="2366562482" sldId="261"/>
+            <ac:spMk id="14" creationId="{90336353-282A-61BA-3C66-70370B44D3A3}"/>
           </ac:spMkLst>
         </pc:spChg>
       </pc:sldChg>
@@ -994,7 +1002,7 @@
         </pc:sldMkLst>
       </pc:sldChg>
       <pc:sldChg chg="addSp modSp new mod">
-        <pc:chgData name="Ravi Potes Mangra" userId="f6c3e66e-970a-4dac-abef-28c459f30976" providerId="ADAL" clId="{B2C1E8EB-EB94-44CA-9F50-E86E778B07B8}" dt="2026-02-01T03:20:39.460" v="839" actId="1076"/>
+        <pc:chgData name="Ravi Potes Mangra" userId="f6c3e66e-970a-4dac-abef-28c459f30976" providerId="ADAL" clId="{B2C1E8EB-EB94-44CA-9F50-E86E778B07B8}" dt="2026-02-01T04:14:16.039" v="1208" actId="1076"/>
         <pc:sldMkLst>
           <pc:docMk/>
           <pc:sldMk cId="4120626109" sldId="263"/>
@@ -1069,6 +1077,22 @@
             <pc:docMk/>
             <pc:sldMk cId="4120626109" sldId="263"/>
             <ac:spMk id="10" creationId="{9988E0EF-31D1-460B-9095-6A1B266010D4}"/>
+          </ac:spMkLst>
+        </pc:spChg>
+        <pc:spChg chg="add mod">
+          <ac:chgData name="Ravi Potes Mangra" userId="f6c3e66e-970a-4dac-abef-28c459f30976" providerId="ADAL" clId="{B2C1E8EB-EB94-44CA-9F50-E86E778B07B8}" dt="2026-02-01T04:14:12.367" v="1206" actId="1076"/>
+          <ac:spMkLst>
+            <pc:docMk/>
+            <pc:sldMk cId="4120626109" sldId="263"/>
+            <ac:spMk id="11" creationId="{382E0A8B-6BC3-1259-E8FC-45937B4A62F7}"/>
+          </ac:spMkLst>
+        </pc:spChg>
+        <pc:spChg chg="add mod">
+          <ac:chgData name="Ravi Potes Mangra" userId="f6c3e66e-970a-4dac-abef-28c459f30976" providerId="ADAL" clId="{B2C1E8EB-EB94-44CA-9F50-E86E778B07B8}" dt="2026-02-01T04:14:16.039" v="1208" actId="1076"/>
+          <ac:spMkLst>
+            <pc:docMk/>
+            <pc:sldMk cId="4120626109" sldId="263"/>
+            <ac:spMk id="12" creationId="{46528C1C-8F8C-0F91-292A-6A1AD364EF4F}"/>
           </ac:spMkLst>
         </pc:spChg>
       </pc:sldChg>
@@ -5428,6 +5452,104 @@
           </a:p>
         </p:txBody>
       </p:sp>
+      <p:sp>
+        <p:nvSpPr>
+          <p:cNvPr id="11" name="Rectangle 10">
+            <a:extLst>
+              <a:ext uri="{FF2B5EF4-FFF2-40B4-BE49-F238E27FC236}">
+                <a16:creationId xmlns:a16="http://schemas.microsoft.com/office/drawing/2014/main" id="{382E0A8B-6BC3-1259-E8FC-45937B4A62F7}"/>
+              </a:ext>
+            </a:extLst>
+          </p:cNvPr>
+          <p:cNvSpPr/>
+          <p:nvPr/>
+        </p:nvSpPr>
+        <p:spPr>
+          <a:xfrm>
+            <a:off x="8360049" y="2117663"/>
+            <a:ext cx="343948" cy="255469"/>
+          </a:xfrm>
+          <a:prstGeom prst="rect">
+            <a:avLst/>
+          </a:prstGeom>
+          <a:solidFill>
+            <a:schemeClr val="bg1"/>
+          </a:solidFill>
+        </p:spPr>
+        <p:style>
+          <a:lnRef idx="2">
+            <a:schemeClr val="accent1">
+              <a:shade val="15000"/>
+            </a:schemeClr>
+          </a:lnRef>
+          <a:fillRef idx="1">
+            <a:schemeClr val="accent1"/>
+          </a:fillRef>
+          <a:effectRef idx="0">
+            <a:schemeClr val="accent1"/>
+          </a:effectRef>
+          <a:fontRef idx="minor">
+            <a:schemeClr val="lt1"/>
+          </a:fontRef>
+        </p:style>
+        <p:txBody>
+          <a:bodyPr rtlCol="0" anchor="ctr"/>
+          <a:lstStyle/>
+          <a:p>
+            <a:pPr algn="ctr"/>
+            <a:endParaRPr lang="en-US"/>
+          </a:p>
+        </p:txBody>
+      </p:sp>
+      <p:sp>
+        <p:nvSpPr>
+          <p:cNvPr id="12" name="Rectangle 11">
+            <a:extLst>
+              <a:ext uri="{FF2B5EF4-FFF2-40B4-BE49-F238E27FC236}">
+                <a16:creationId xmlns:a16="http://schemas.microsoft.com/office/drawing/2014/main" id="{46528C1C-8F8C-0F91-292A-6A1AD364EF4F}"/>
+              </a:ext>
+            </a:extLst>
+          </p:cNvPr>
+          <p:cNvSpPr/>
+          <p:nvPr/>
+        </p:nvSpPr>
+        <p:spPr>
+          <a:xfrm>
+            <a:off x="8360049" y="2827877"/>
+            <a:ext cx="343948" cy="255469"/>
+          </a:xfrm>
+          <a:prstGeom prst="rect">
+            <a:avLst/>
+          </a:prstGeom>
+          <a:solidFill>
+            <a:schemeClr val="bg1"/>
+          </a:solidFill>
+        </p:spPr>
+        <p:style>
+          <a:lnRef idx="2">
+            <a:schemeClr val="accent1">
+              <a:shade val="15000"/>
+            </a:schemeClr>
+          </a:lnRef>
+          <a:fillRef idx="1">
+            <a:schemeClr val="accent1"/>
+          </a:fillRef>
+          <a:effectRef idx="0">
+            <a:schemeClr val="accent1"/>
+          </a:effectRef>
+          <a:fontRef idx="minor">
+            <a:schemeClr val="lt1"/>
+          </a:fontRef>
+        </p:style>
+        <p:txBody>
+          <a:bodyPr rtlCol="0" anchor="ctr"/>
+          <a:lstStyle/>
+          <a:p>
+            <a:pPr algn="ctr"/>
+            <a:endParaRPr lang="en-US"/>
+          </a:p>
+        </p:txBody>
+      </p:sp>
     </p:spTree>
     <p:extLst>
       <p:ext uri="{BB962C8B-B14F-4D97-AF65-F5344CB8AC3E}">
@@ -9206,6 +9328,55 @@
               <a:rPr lang="en-US" dirty="0"/>
               <a:t>Cancel</a:t>
             </a:r>
+          </a:p>
+        </p:txBody>
+      </p:sp>
+      <p:sp>
+        <p:nvSpPr>
+          <p:cNvPr id="14" name="Rectangle 13">
+            <a:extLst>
+              <a:ext uri="{FF2B5EF4-FFF2-40B4-BE49-F238E27FC236}">
+                <a16:creationId xmlns:a16="http://schemas.microsoft.com/office/drawing/2014/main" id="{90336353-282A-61BA-3C66-70370B44D3A3}"/>
+              </a:ext>
+            </a:extLst>
+          </p:cNvPr>
+          <p:cNvSpPr/>
+          <p:nvPr/>
+        </p:nvSpPr>
+        <p:spPr>
+          <a:xfrm>
+            <a:off x="8670945" y="3192323"/>
+            <a:ext cx="343948" cy="255469"/>
+          </a:xfrm>
+          <a:prstGeom prst="rect">
+            <a:avLst/>
+          </a:prstGeom>
+          <a:solidFill>
+            <a:schemeClr val="bg1"/>
+          </a:solidFill>
+        </p:spPr>
+        <p:style>
+          <a:lnRef idx="2">
+            <a:schemeClr val="accent1">
+              <a:shade val="15000"/>
+            </a:schemeClr>
+          </a:lnRef>
+          <a:fillRef idx="1">
+            <a:schemeClr val="accent1"/>
+          </a:fillRef>
+          <a:effectRef idx="0">
+            <a:schemeClr val="accent1"/>
+          </a:effectRef>
+          <a:fontRef idx="minor">
+            <a:schemeClr val="lt1"/>
+          </a:fontRef>
+        </p:style>
+        <p:txBody>
+          <a:bodyPr rtlCol="0" anchor="ctr"/>
+          <a:lstStyle/>
+          <a:p>
+            <a:pPr algn="ctr"/>
+            <a:endParaRPr lang="en-US"/>
           </a:p>
         </p:txBody>
       </p:sp>

</xml_diff>

<commit_message>
B3 - add/modify assessments
</commit_message>
<xml_diff>
--- a/b1.pptx
+++ b/b1.pptx
@@ -12,7 +12,6 @@
     <p:sldId id="259" r:id="rId6"/>
     <p:sldId id="260" r:id="rId7"/>
     <p:sldId id="261" r:id="rId8"/>
-    <p:sldId id="262" r:id="rId9"/>
   </p:sldIdLst>
   <p:sldSz cx="12192000" cy="6858000"/>
   <p:notesSz cx="6858000" cy="9144000"/>
@@ -122,7 +121,7 @@
 <file path=ppt/revisionInfo.xml><?xml version="1.0" encoding="utf-8"?>
 <p1510:revInfo xmlns:a="http://schemas.openxmlformats.org/drawingml/2006/main" xmlns:r="http://schemas.openxmlformats.org/officeDocument/2006/relationships" xmlns:p1510="http://schemas.microsoft.com/office/powerpoint/2015/10/main">
   <p1510:revLst>
-    <p1510:client id="{C5F0709F-BDA2-4D97-972B-42FAEC705165}" v="74" dt="2026-02-01T04:14:27.862"/>
+    <p1510:client id="{C5F0709F-BDA2-4D97-972B-42FAEC705165}" v="77" dt="2026-02-01T22:26:50.831"/>
   </p1510:revLst>
 </p1510:revInfo>
 </file>
@@ -131,13 +130,13 @@
 <pc:chgInfo xmlns:a="http://schemas.openxmlformats.org/drawingml/2006/main" xmlns:r="http://schemas.openxmlformats.org/officeDocument/2006/relationships" xmlns:ac="http://schemas.microsoft.com/office/drawing/2013/main/command" xmlns:pc="http://schemas.microsoft.com/office/powerpoint/2013/main/command">
   <pc:docChgLst>
     <pc:chgData name="Ravi Potes Mangra" userId="f6c3e66e-970a-4dac-abef-28c459f30976" providerId="ADAL" clId="{B2C1E8EB-EB94-44CA-9F50-E86E778B07B8}"/>
-    <pc:docChg chg="undo custSel addSld modSld">
-      <pc:chgData name="Ravi Potes Mangra" userId="f6c3e66e-970a-4dac-abef-28c459f30976" providerId="ADAL" clId="{B2C1E8EB-EB94-44CA-9F50-E86E778B07B8}" dt="2026-02-01T04:14:30.045" v="1210" actId="1076"/>
+    <pc:docChg chg="undo custSel addSld delSld modSld">
+      <pc:chgData name="Ravi Potes Mangra" userId="f6c3e66e-970a-4dac-abef-28c459f30976" providerId="ADAL" clId="{B2C1E8EB-EB94-44CA-9F50-E86E778B07B8}" dt="2026-02-01T22:29:01.430" v="1225" actId="2696"/>
       <pc:docMkLst>
         <pc:docMk/>
       </pc:docMkLst>
       <pc:sldChg chg="addSp modSp mod">
-        <pc:chgData name="Ravi Potes Mangra" userId="f6c3e66e-970a-4dac-abef-28c459f30976" providerId="ADAL" clId="{B2C1E8EB-EB94-44CA-9F50-E86E778B07B8}" dt="2026-02-01T03:54:19.480" v="909" actId="207"/>
+        <pc:chgData name="Ravi Potes Mangra" userId="f6c3e66e-970a-4dac-abef-28c459f30976" providerId="ADAL" clId="{B2C1E8EB-EB94-44CA-9F50-E86E778B07B8}" dt="2026-02-01T22:26:54.136" v="1224" actId="1076"/>
         <pc:sldMkLst>
           <pc:docMk/>
           <pc:sldMk cId="1383786992" sldId="256"/>
@@ -183,7 +182,7 @@
           </ac:spMkLst>
         </pc:spChg>
         <pc:spChg chg="add mod">
-          <ac:chgData name="Ravi Potes Mangra" userId="f6c3e66e-970a-4dac-abef-28c459f30976" providerId="ADAL" clId="{B2C1E8EB-EB94-44CA-9F50-E86E778B07B8}" dt="2026-02-01T03:54:19.480" v="909" actId="207"/>
+          <ac:chgData name="Ravi Potes Mangra" userId="f6c3e66e-970a-4dac-abef-28c459f30976" providerId="ADAL" clId="{B2C1E8EB-EB94-44CA-9F50-E86E778B07B8}" dt="2026-02-01T22:26:54.136" v="1224" actId="1076"/>
           <ac:spMkLst>
             <pc:docMk/>
             <pc:sldMk cId="1383786992" sldId="256"/>
@@ -198,6 +197,22 @@
             <ac:spMk id="8" creationId="{A86CE17F-1C91-71CD-6AFA-DE4A7FACCA15}"/>
           </ac:spMkLst>
         </pc:spChg>
+        <pc:spChg chg="add mod">
+          <ac:chgData name="Ravi Potes Mangra" userId="f6c3e66e-970a-4dac-abef-28c459f30976" providerId="ADAL" clId="{B2C1E8EB-EB94-44CA-9F50-E86E778B07B8}" dt="2026-02-01T22:26:42.727" v="1218" actId="1076"/>
+          <ac:spMkLst>
+            <pc:docMk/>
+            <pc:sldMk cId="1383786992" sldId="256"/>
+            <ac:spMk id="9" creationId="{BB8BC187-1491-FC17-4D82-5E80090DF539}"/>
+          </ac:spMkLst>
+        </pc:spChg>
+        <pc:spChg chg="add mod">
+          <ac:chgData name="Ravi Potes Mangra" userId="f6c3e66e-970a-4dac-abef-28c459f30976" providerId="ADAL" clId="{B2C1E8EB-EB94-44CA-9F50-E86E778B07B8}" dt="2026-02-01T22:26:52.428" v="1223" actId="1076"/>
+          <ac:spMkLst>
+            <pc:docMk/>
+            <pc:sldMk cId="1383786992" sldId="256"/>
+            <ac:spMk id="10" creationId="{112048E7-EC5B-DCEE-464F-728C102AD356}"/>
+          </ac:spMkLst>
+        </pc:spChg>
         <pc:spChg chg="mod">
           <ac:chgData name="Ravi Potes Mangra" userId="f6c3e66e-970a-4dac-abef-28c459f30976" providerId="ADAL" clId="{B2C1E8EB-EB94-44CA-9F50-E86E778B07B8}" dt="2026-02-01T03:18:21.673" v="816" actId="1076"/>
           <ac:spMkLst>
@@ -207,7 +222,7 @@
           </ac:spMkLst>
         </pc:spChg>
         <pc:spChg chg="mod">
-          <ac:chgData name="Ravi Potes Mangra" userId="f6c3e66e-970a-4dac-abef-28c459f30976" providerId="ADAL" clId="{B2C1E8EB-EB94-44CA-9F50-E86E778B07B8}" dt="2026-02-01T03:53:32.453" v="881" actId="1076"/>
+          <ac:chgData name="Ravi Potes Mangra" userId="f6c3e66e-970a-4dac-abef-28c459f30976" providerId="ADAL" clId="{B2C1E8EB-EB94-44CA-9F50-E86E778B07B8}" dt="2026-02-01T22:26:49.256" v="1221" actId="1076"/>
           <ac:spMkLst>
             <pc:docMk/>
             <pc:sldMk cId="1383786992" sldId="256"/>
@@ -215,7 +230,7 @@
           </ac:spMkLst>
         </pc:spChg>
         <pc:spChg chg="mod">
-          <ac:chgData name="Ravi Potes Mangra" userId="f6c3e66e-970a-4dac-abef-28c459f30976" providerId="ADAL" clId="{B2C1E8EB-EB94-44CA-9F50-E86E778B07B8}" dt="2026-02-01T03:53:32.453" v="881" actId="1076"/>
+          <ac:chgData name="Ravi Potes Mangra" userId="f6c3e66e-970a-4dac-abef-28c459f30976" providerId="ADAL" clId="{B2C1E8EB-EB94-44CA-9F50-E86E778B07B8}" dt="2026-02-01T22:26:49.256" v="1221" actId="1076"/>
           <ac:spMkLst>
             <pc:docMk/>
             <pc:sldMk cId="1383786992" sldId="256"/>
@@ -223,7 +238,7 @@
           </ac:spMkLst>
         </pc:spChg>
         <pc:spChg chg="mod">
-          <ac:chgData name="Ravi Potes Mangra" userId="f6c3e66e-970a-4dac-abef-28c459f30976" providerId="ADAL" clId="{B2C1E8EB-EB94-44CA-9F50-E86E778B07B8}" dt="2026-02-01T03:53:32.453" v="881" actId="1076"/>
+          <ac:chgData name="Ravi Potes Mangra" userId="f6c3e66e-970a-4dac-abef-28c459f30976" providerId="ADAL" clId="{B2C1E8EB-EB94-44CA-9F50-E86E778B07B8}" dt="2026-02-01T22:26:49.256" v="1221" actId="1076"/>
           <ac:spMkLst>
             <pc:docMk/>
             <pc:sldMk cId="1383786992" sldId="256"/>
@@ -231,7 +246,7 @@
           </ac:spMkLst>
         </pc:spChg>
         <pc:spChg chg="mod">
-          <ac:chgData name="Ravi Potes Mangra" userId="f6c3e66e-970a-4dac-abef-28c459f30976" providerId="ADAL" clId="{B2C1E8EB-EB94-44CA-9F50-E86E778B07B8}" dt="2026-02-01T03:53:32.453" v="881" actId="1076"/>
+          <ac:chgData name="Ravi Potes Mangra" userId="f6c3e66e-970a-4dac-abef-28c459f30976" providerId="ADAL" clId="{B2C1E8EB-EB94-44CA-9F50-E86E778B07B8}" dt="2026-02-01T22:26:49.256" v="1221" actId="1076"/>
           <ac:spMkLst>
             <pc:docMk/>
             <pc:sldMk cId="1383786992" sldId="256"/>
@@ -239,7 +254,7 @@
           </ac:spMkLst>
         </pc:spChg>
         <pc:spChg chg="mod">
-          <ac:chgData name="Ravi Potes Mangra" userId="f6c3e66e-970a-4dac-abef-28c459f30976" providerId="ADAL" clId="{B2C1E8EB-EB94-44CA-9F50-E86E778B07B8}" dt="2026-02-01T03:53:32.453" v="881" actId="1076"/>
+          <ac:chgData name="Ravi Potes Mangra" userId="f6c3e66e-970a-4dac-abef-28c459f30976" providerId="ADAL" clId="{B2C1E8EB-EB94-44CA-9F50-E86E778B07B8}" dt="2026-02-01T22:26:49.256" v="1221" actId="1076"/>
           <ac:spMkLst>
             <pc:docMk/>
             <pc:sldMk cId="1383786992" sldId="256"/>
@@ -247,7 +262,7 @@
           </ac:spMkLst>
         </pc:spChg>
         <pc:spChg chg="mod">
-          <ac:chgData name="Ravi Potes Mangra" userId="f6c3e66e-970a-4dac-abef-28c459f30976" providerId="ADAL" clId="{B2C1E8EB-EB94-44CA-9F50-E86E778B07B8}" dt="2026-02-01T03:53:32.453" v="881" actId="1076"/>
+          <ac:chgData name="Ravi Potes Mangra" userId="f6c3e66e-970a-4dac-abef-28c459f30976" providerId="ADAL" clId="{B2C1E8EB-EB94-44CA-9F50-E86E778B07B8}" dt="2026-02-01T22:26:49.256" v="1221" actId="1076"/>
           <ac:spMkLst>
             <pc:docMk/>
             <pc:sldMk cId="1383786992" sldId="256"/>
@@ -255,7 +270,7 @@
           </ac:spMkLst>
         </pc:spChg>
         <pc:spChg chg="mod">
-          <ac:chgData name="Ravi Potes Mangra" userId="f6c3e66e-970a-4dac-abef-28c459f30976" providerId="ADAL" clId="{B2C1E8EB-EB94-44CA-9F50-E86E778B07B8}" dt="2026-02-01T03:53:32.453" v="881" actId="1076"/>
+          <ac:chgData name="Ravi Potes Mangra" userId="f6c3e66e-970a-4dac-abef-28c459f30976" providerId="ADAL" clId="{B2C1E8EB-EB94-44CA-9F50-E86E778B07B8}" dt="2026-02-01T22:26:49.256" v="1221" actId="1076"/>
           <ac:spMkLst>
             <pc:docMk/>
             <pc:sldMk cId="1383786992" sldId="256"/>
@@ -263,7 +278,7 @@
           </ac:spMkLst>
         </pc:spChg>
         <pc:spChg chg="mod">
-          <ac:chgData name="Ravi Potes Mangra" userId="f6c3e66e-970a-4dac-abef-28c459f30976" providerId="ADAL" clId="{B2C1E8EB-EB94-44CA-9F50-E86E778B07B8}" dt="2026-02-01T03:53:32.453" v="881" actId="1076"/>
+          <ac:chgData name="Ravi Potes Mangra" userId="f6c3e66e-970a-4dac-abef-28c459f30976" providerId="ADAL" clId="{B2C1E8EB-EB94-44CA-9F50-E86E778B07B8}" dt="2026-02-01T22:26:49.256" v="1221" actId="1076"/>
           <ac:spMkLst>
             <pc:docMk/>
             <pc:sldMk cId="1383786992" sldId="256"/>
@@ -994,8 +1009,8 @@
           </ac:spMkLst>
         </pc:spChg>
       </pc:sldChg>
-      <pc:sldChg chg="new">
-        <pc:chgData name="Ravi Potes Mangra" userId="f6c3e66e-970a-4dac-abef-28c459f30976" providerId="ADAL" clId="{B2C1E8EB-EB94-44CA-9F50-E86E778B07B8}" dt="2026-01-31T21:47:15.784" v="606" actId="680"/>
+      <pc:sldChg chg="new del">
+        <pc:chgData name="Ravi Potes Mangra" userId="f6c3e66e-970a-4dac-abef-28c459f30976" providerId="ADAL" clId="{B2C1E8EB-EB94-44CA-9F50-E86E778B07B8}" dt="2026-02-01T22:29:01.430" v="1225" actId="2696"/>
         <pc:sldMkLst>
           <pc:docMk/>
           <pc:sldMk cId="3733978778" sldId="262"/>
@@ -1248,7 +1263,7 @@
           <a:p>
             <a:fld id="{B2C7AA6C-945C-4335-B31D-C905A40099AC}" type="datetimeFigureOut">
               <a:rPr lang="en-US" smtClean="0"/>
-              <a:t>1/31/2026</a:t>
+              <a:t>2/1/2026</a:t>
             </a:fld>
             <a:endParaRPr lang="en-US"/>
           </a:p>
@@ -1446,7 +1461,7 @@
           <a:p>
             <a:fld id="{B2C7AA6C-945C-4335-B31D-C905A40099AC}" type="datetimeFigureOut">
               <a:rPr lang="en-US" smtClean="0"/>
-              <a:t>1/31/2026</a:t>
+              <a:t>2/1/2026</a:t>
             </a:fld>
             <a:endParaRPr lang="en-US"/>
           </a:p>
@@ -1654,7 +1669,7 @@
           <a:p>
             <a:fld id="{B2C7AA6C-945C-4335-B31D-C905A40099AC}" type="datetimeFigureOut">
               <a:rPr lang="en-US" smtClean="0"/>
-              <a:t>1/31/2026</a:t>
+              <a:t>2/1/2026</a:t>
             </a:fld>
             <a:endParaRPr lang="en-US"/>
           </a:p>
@@ -1852,7 +1867,7 @@
           <a:p>
             <a:fld id="{B2C7AA6C-945C-4335-B31D-C905A40099AC}" type="datetimeFigureOut">
               <a:rPr lang="en-US" smtClean="0"/>
-              <a:t>1/31/2026</a:t>
+              <a:t>2/1/2026</a:t>
             </a:fld>
             <a:endParaRPr lang="en-US"/>
           </a:p>
@@ -2127,7 +2142,7 @@
           <a:p>
             <a:fld id="{B2C7AA6C-945C-4335-B31D-C905A40099AC}" type="datetimeFigureOut">
               <a:rPr lang="en-US" smtClean="0"/>
-              <a:t>1/31/2026</a:t>
+              <a:t>2/1/2026</a:t>
             </a:fld>
             <a:endParaRPr lang="en-US"/>
           </a:p>
@@ -2392,7 +2407,7 @@
           <a:p>
             <a:fld id="{B2C7AA6C-945C-4335-B31D-C905A40099AC}" type="datetimeFigureOut">
               <a:rPr lang="en-US" smtClean="0"/>
-              <a:t>1/31/2026</a:t>
+              <a:t>2/1/2026</a:t>
             </a:fld>
             <a:endParaRPr lang="en-US"/>
           </a:p>
@@ -2804,7 +2819,7 @@
           <a:p>
             <a:fld id="{B2C7AA6C-945C-4335-B31D-C905A40099AC}" type="datetimeFigureOut">
               <a:rPr lang="en-US" smtClean="0"/>
-              <a:t>1/31/2026</a:t>
+              <a:t>2/1/2026</a:t>
             </a:fld>
             <a:endParaRPr lang="en-US"/>
           </a:p>
@@ -2945,7 +2960,7 @@
           <a:p>
             <a:fld id="{B2C7AA6C-945C-4335-B31D-C905A40099AC}" type="datetimeFigureOut">
               <a:rPr lang="en-US" smtClean="0"/>
-              <a:t>1/31/2026</a:t>
+              <a:t>2/1/2026</a:t>
             </a:fld>
             <a:endParaRPr lang="en-US"/>
           </a:p>
@@ -3058,7 +3073,7 @@
           <a:p>
             <a:fld id="{B2C7AA6C-945C-4335-B31D-C905A40099AC}" type="datetimeFigureOut">
               <a:rPr lang="en-US" smtClean="0"/>
-              <a:t>1/31/2026</a:t>
+              <a:t>2/1/2026</a:t>
             </a:fld>
             <a:endParaRPr lang="en-US"/>
           </a:p>
@@ -3369,7 +3384,7 @@
           <a:p>
             <a:fld id="{B2C7AA6C-945C-4335-B31D-C905A40099AC}" type="datetimeFigureOut">
               <a:rPr lang="en-US" smtClean="0"/>
-              <a:t>1/31/2026</a:t>
+              <a:t>2/1/2026</a:t>
             </a:fld>
             <a:endParaRPr lang="en-US"/>
           </a:p>
@@ -3657,7 +3672,7 @@
           <a:p>
             <a:fld id="{B2C7AA6C-945C-4335-B31D-C905A40099AC}" type="datetimeFigureOut">
               <a:rPr lang="en-US" smtClean="0"/>
-              <a:t>1/31/2026</a:t>
+              <a:t>2/1/2026</a:t>
             </a:fld>
             <a:endParaRPr lang="en-US"/>
           </a:p>
@@ -3898,7 +3913,7 @@
           <a:p>
             <a:fld id="{B2C7AA6C-945C-4335-B31D-C905A40099AC}" type="datetimeFigureOut">
               <a:rPr lang="en-US" smtClean="0"/>
-              <a:t>1/31/2026</a:t>
+              <a:t>2/1/2026</a:t>
             </a:fld>
             <a:endParaRPr lang="en-US"/>
           </a:p>
@@ -4532,7 +4547,7 @@
         </p:nvSpPr>
         <p:spPr>
           <a:xfrm>
-            <a:off x="1793007" y="3632960"/>
+            <a:off x="1793007" y="4198380"/>
             <a:ext cx="8877300" cy="518160"/>
           </a:xfrm>
           <a:prstGeom prst="rect">
@@ -4578,7 +4593,7 @@
         </p:nvSpPr>
         <p:spPr>
           <a:xfrm>
-            <a:off x="2196867" y="3737854"/>
+            <a:off x="2196867" y="4303274"/>
             <a:ext cx="1165860" cy="369332"/>
           </a:xfrm>
           <a:prstGeom prst="rect">
@@ -4617,7 +4632,7 @@
         </p:nvSpPr>
         <p:spPr>
           <a:xfrm>
-            <a:off x="5644917" y="3707374"/>
+            <a:off x="5644917" y="4272794"/>
             <a:ext cx="1630680" cy="369332"/>
           </a:xfrm>
           <a:prstGeom prst="rect">
@@ -4656,7 +4671,7 @@
         </p:nvSpPr>
         <p:spPr>
           <a:xfrm>
-            <a:off x="9260607" y="3705588"/>
+            <a:off x="9260607" y="4271008"/>
             <a:ext cx="1630680" cy="369332"/>
           </a:xfrm>
           <a:prstGeom prst="rect">
@@ -4695,7 +4710,7 @@
         </p:nvSpPr>
         <p:spPr>
           <a:xfrm>
-            <a:off x="1793007" y="4633442"/>
+            <a:off x="1793007" y="5154928"/>
             <a:ext cx="8877300" cy="518160"/>
           </a:xfrm>
           <a:prstGeom prst="rect">
@@ -4741,7 +4756,7 @@
         </p:nvSpPr>
         <p:spPr>
           <a:xfrm>
-            <a:off x="2204487" y="4738336"/>
+            <a:off x="2204487" y="5303756"/>
             <a:ext cx="1165860" cy="369332"/>
           </a:xfrm>
           <a:prstGeom prst="rect">
@@ -4780,7 +4795,7 @@
         </p:nvSpPr>
         <p:spPr>
           <a:xfrm>
-            <a:off x="5644917" y="4707856"/>
+            <a:off x="5644917" y="5273276"/>
             <a:ext cx="1630680" cy="369332"/>
           </a:xfrm>
           <a:prstGeom prst="rect">
@@ -4819,7 +4834,7 @@
         </p:nvSpPr>
         <p:spPr>
           <a:xfrm>
-            <a:off x="9260607" y="4706070"/>
+            <a:off x="9260607" y="5271490"/>
             <a:ext cx="1630680" cy="369332"/>
           </a:xfrm>
           <a:prstGeom prst="rect">
@@ -5005,7 +5020,62 @@
         </p:nvSpPr>
         <p:spPr>
           <a:xfrm>
-            <a:off x="3370347" y="3063302"/>
+            <a:off x="3370347" y="3097172"/>
+            <a:ext cx="5753450" cy="404577"/>
+          </a:xfrm>
+          <a:prstGeom prst="rect">
+            <a:avLst/>
+          </a:prstGeom>
+          <a:solidFill>
+            <a:schemeClr val="accent1">
+              <a:lumMod val="20000"/>
+              <a:lumOff val="80000"/>
+            </a:schemeClr>
+          </a:solidFill>
+        </p:spPr>
+        <p:style>
+          <a:lnRef idx="2">
+            <a:schemeClr val="accent4">
+              <a:shade val="15000"/>
+            </a:schemeClr>
+          </a:lnRef>
+          <a:fillRef idx="1">
+            <a:schemeClr val="accent4"/>
+          </a:fillRef>
+          <a:effectRef idx="0">
+            <a:schemeClr val="accent4"/>
+          </a:effectRef>
+          <a:fontRef idx="minor">
+            <a:schemeClr val="lt1"/>
+          </a:fontRef>
+        </p:style>
+        <p:txBody>
+          <a:bodyPr rtlCol="0" anchor="ctr"/>
+          <a:lstStyle/>
+          <a:p>
+            <a:pPr algn="ctr"/>
+            <a:r>
+              <a:rPr lang="en-US" dirty="0"/>
+              <a:t>Assessment</a:t>
+            </a:r>
+          </a:p>
+        </p:txBody>
+      </p:sp>
+      <p:sp>
+        <p:nvSpPr>
+          <p:cNvPr id="10" name="Rectangle 9">
+            <a:extLst>
+              <a:ext uri="{FF2B5EF4-FFF2-40B4-BE49-F238E27FC236}">
+                <a16:creationId xmlns:a16="http://schemas.microsoft.com/office/drawing/2014/main" id="{112048E7-EC5B-DCEE-464F-728C102AD356}"/>
+              </a:ext>
+            </a:extLst>
+          </p:cNvPr>
+          <p:cNvSpPr/>
+          <p:nvPr/>
+        </p:nvSpPr>
+        <p:spPr>
+          <a:xfrm>
+            <a:off x="3370347" y="3647237"/>
             <a:ext cx="5753450" cy="404577"/>
           </a:xfrm>
           <a:prstGeom prst="rect">
@@ -9384,36 +9454,6 @@
     <p:extLst>
       <p:ext uri="{BB962C8B-B14F-4D97-AF65-F5344CB8AC3E}">
         <p14:creationId xmlns:p14="http://schemas.microsoft.com/office/powerpoint/2010/main" val="2366562482"/>
-      </p:ext>
-    </p:extLst>
-  </p:cSld>
-  <p:clrMapOvr>
-    <a:masterClrMapping/>
-  </p:clrMapOvr>
-</p:sld>
-</file>
-
-<file path=ppt/slides/slide8.xml><?xml version="1.0" encoding="utf-8"?>
-<p:sld xmlns:a="http://schemas.openxmlformats.org/drawingml/2006/main" xmlns:r="http://schemas.openxmlformats.org/officeDocument/2006/relationships" xmlns:p="http://schemas.openxmlformats.org/presentationml/2006/main">
-  <p:cSld>
-    <p:spTree>
-      <p:nvGrpSpPr>
-        <p:cNvPr id="1" name=""/>
-        <p:cNvGrpSpPr/>
-        <p:nvPr/>
-      </p:nvGrpSpPr>
-      <p:grpSpPr>
-        <a:xfrm>
-          <a:off x="0" y="0"/>
-          <a:ext cx="0" cy="0"/>
-          <a:chOff x="0" y="0"/>
-          <a:chExt cx="0" cy="0"/>
-        </a:xfrm>
-      </p:grpSpPr>
-    </p:spTree>
-    <p:extLst>
-      <p:ext uri="{BB962C8B-B14F-4D97-AF65-F5344CB8AC3E}">
-        <p14:creationId xmlns:p14="http://schemas.microsoft.com/office/powerpoint/2010/main" val="3733978778"/>
       </p:ext>
     </p:extLst>
   </p:cSld>

</xml_diff>